<commit_message>
Shifted Searchbar.js into Navbar.js component and implemented click function for menu button that opens Sidebar.js
</commit_message>
<xml_diff>
--- a/WhaToEat Concept.pptx
+++ b/WhaToEat Concept.pptx
@@ -8,6 +8,7 @@
     <p:sldId id="256" r:id="rId2"/>
     <p:sldId id="257" r:id="rId3"/>
     <p:sldId id="258" r:id="rId4"/>
+    <p:sldId id="259" r:id="rId5"/>
   </p:sldIdLst>
   <p:sldSz cx="12192000" cy="6858000"/>
   <p:notesSz cx="6858000" cy="9144000"/>
@@ -106,7 +107,208 @@
       </a:defRPr>
     </a:lvl9pPr>
   </p:defaultTextStyle>
+  <p:extLst>
+    <p:ext uri="{EFAFB233-063F-42B5-8137-9DF3F51BA10A}">
+      <p15:sldGuideLst xmlns:p15="http://schemas.microsoft.com/office/powerpoint/2012/main"/>
+    </p:ext>
+  </p:extLst>
 </p:presentation>
+</file>
+
+<file path=ppt/revisionInfo.xml><?xml version="1.0" encoding="utf-8"?>
+<p1510:revInfo xmlns:a="http://schemas.openxmlformats.org/drawingml/2006/main" xmlns:r="http://schemas.openxmlformats.org/officeDocument/2006/relationships" xmlns:p1510="http://schemas.microsoft.com/office/powerpoint/2015/10/main">
+  <p1510:revLst>
+    <p1510:client id="{1D4EBB90-F4CA-4268-AC5D-BBFB91B491A4}" v="6" dt="2022-03-25T16:28:34.840"/>
+  </p1510:revLst>
+</p1510:revInfo>
+</file>
+
+<file path=ppt/changesInfos/changesInfo1.xml><?xml version="1.0" encoding="utf-8"?>
+<pc:chgInfo xmlns:a="http://schemas.openxmlformats.org/drawingml/2006/main" xmlns:r="http://schemas.openxmlformats.org/officeDocument/2006/relationships" xmlns:ac="http://schemas.microsoft.com/office/drawing/2013/main/command" xmlns:pc="http://schemas.microsoft.com/office/powerpoint/2013/main/command">
+  <pc:docChgLst>
+    <pc:chgData name="Zephyr Tay" userId="58c7b28099c6babd" providerId="LiveId" clId="{1D4EBB90-F4CA-4268-AC5D-BBFB91B491A4}"/>
+    <pc:docChg chg="undo custSel addSld modSld">
+      <pc:chgData name="Zephyr Tay" userId="58c7b28099c6babd" providerId="LiveId" clId="{1D4EBB90-F4CA-4268-AC5D-BBFB91B491A4}" dt="2022-03-25T16:28:39.547" v="19" actId="14100"/>
+      <pc:docMkLst>
+        <pc:docMk/>
+      </pc:docMkLst>
+      <pc:sldChg chg="addSp modSp mod">
+        <pc:chgData name="Zephyr Tay" userId="58c7b28099c6babd" providerId="LiveId" clId="{1D4EBB90-F4CA-4268-AC5D-BBFB91B491A4}" dt="2022-03-25T16:28:39.547" v="19" actId="14100"/>
+        <pc:sldMkLst>
+          <pc:docMk/>
+          <pc:sldMk cId="3151931537" sldId="257"/>
+        </pc:sldMkLst>
+        <pc:spChg chg="add mod">
+          <ac:chgData name="Zephyr Tay" userId="58c7b28099c6babd" providerId="LiveId" clId="{1D4EBB90-F4CA-4268-AC5D-BBFB91B491A4}" dt="2022-03-25T16:28:17.274" v="9" actId="1076"/>
+          <ac:spMkLst>
+            <pc:docMk/>
+            <pc:sldMk cId="3151931537" sldId="257"/>
+            <ac:spMk id="26" creationId="{1076C366-D320-452F-AA3F-FB2954D1A4FA}"/>
+          </ac:spMkLst>
+        </pc:spChg>
+        <pc:spChg chg="add mod">
+          <ac:chgData name="Zephyr Tay" userId="58c7b28099c6babd" providerId="LiveId" clId="{1D4EBB90-F4CA-4268-AC5D-BBFB91B491A4}" dt="2022-03-25T16:28:20.780" v="11" actId="1076"/>
+          <ac:spMkLst>
+            <pc:docMk/>
+            <pc:sldMk cId="3151931537" sldId="257"/>
+            <ac:spMk id="27" creationId="{DFB212FF-75A5-4BA7-801B-C28801629291}"/>
+          </ac:spMkLst>
+        </pc:spChg>
+        <pc:spChg chg="add mod">
+          <ac:chgData name="Zephyr Tay" userId="58c7b28099c6babd" providerId="LiveId" clId="{1D4EBB90-F4CA-4268-AC5D-BBFB91B491A4}" dt="2022-03-25T16:28:26.489" v="14" actId="1076"/>
+          <ac:spMkLst>
+            <pc:docMk/>
+            <pc:sldMk cId="3151931537" sldId="257"/>
+            <ac:spMk id="28" creationId="{9DE4F4C7-F8CD-4BB3-A527-AFD9EC6A35F8}"/>
+          </ac:spMkLst>
+        </pc:spChg>
+        <pc:spChg chg="add mod">
+          <ac:chgData name="Zephyr Tay" userId="58c7b28099c6babd" providerId="LiveId" clId="{1D4EBB90-F4CA-4268-AC5D-BBFB91B491A4}" dt="2022-03-25T16:28:32.627" v="16" actId="1076"/>
+          <ac:spMkLst>
+            <pc:docMk/>
+            <pc:sldMk cId="3151931537" sldId="257"/>
+            <ac:spMk id="29" creationId="{A91EB460-89A0-42B0-B678-7828D759334A}"/>
+          </ac:spMkLst>
+        </pc:spChg>
+        <pc:spChg chg="add mod">
+          <ac:chgData name="Zephyr Tay" userId="58c7b28099c6babd" providerId="LiveId" clId="{1D4EBB90-F4CA-4268-AC5D-BBFB91B491A4}" dt="2022-03-25T16:28:39.547" v="19" actId="14100"/>
+          <ac:spMkLst>
+            <pc:docMk/>
+            <pc:sldMk cId="3151931537" sldId="257"/>
+            <ac:spMk id="30" creationId="{2867A751-1CEE-42D6-AA9A-7A04B2371A98}"/>
+          </ac:spMkLst>
+        </pc:spChg>
+      </pc:sldChg>
+      <pc:sldChg chg="addSp modSp new mod">
+        <pc:chgData name="Zephyr Tay" userId="58c7b28099c6babd" providerId="LiveId" clId="{1D4EBB90-F4CA-4268-AC5D-BBFB91B491A4}" dt="2022-03-25T16:21:33.638" v="5" actId="14100"/>
+        <pc:sldMkLst>
+          <pc:docMk/>
+          <pc:sldMk cId="931832636" sldId="259"/>
+        </pc:sldMkLst>
+        <pc:spChg chg="add mod">
+          <ac:chgData name="Zephyr Tay" userId="58c7b28099c6babd" providerId="LiveId" clId="{1D4EBB90-F4CA-4268-AC5D-BBFB91B491A4}" dt="2022-03-25T16:21:33.638" v="5" actId="14100"/>
+          <ac:spMkLst>
+            <pc:docMk/>
+            <pc:sldMk cId="931832636" sldId="259"/>
+            <ac:spMk id="4" creationId="{55D99FD5-7981-4A79-A135-04BA07BF39DE}"/>
+          </ac:spMkLst>
+        </pc:spChg>
+        <pc:spChg chg="add mod">
+          <ac:chgData name="Zephyr Tay" userId="58c7b28099c6babd" providerId="LiveId" clId="{1D4EBB90-F4CA-4268-AC5D-BBFB91B491A4}" dt="2022-03-25T16:21:33.638" v="5" actId="14100"/>
+          <ac:spMkLst>
+            <pc:docMk/>
+            <pc:sldMk cId="931832636" sldId="259"/>
+            <ac:spMk id="5" creationId="{CF88AA70-6ABC-44B1-8C33-6F892A2BA19E}"/>
+          </ac:spMkLst>
+        </pc:spChg>
+        <pc:spChg chg="add mod">
+          <ac:chgData name="Zephyr Tay" userId="58c7b28099c6babd" providerId="LiveId" clId="{1D4EBB90-F4CA-4268-AC5D-BBFB91B491A4}" dt="2022-03-25T16:21:33.638" v="5" actId="14100"/>
+          <ac:spMkLst>
+            <pc:docMk/>
+            <pc:sldMk cId="931832636" sldId="259"/>
+            <ac:spMk id="6" creationId="{E655C7BA-406F-4030-A9E4-BC624F0C4280}"/>
+          </ac:spMkLst>
+        </pc:spChg>
+        <pc:spChg chg="add mod">
+          <ac:chgData name="Zephyr Tay" userId="58c7b28099c6babd" providerId="LiveId" clId="{1D4EBB90-F4CA-4268-AC5D-BBFB91B491A4}" dt="2022-03-25T16:21:33.638" v="5" actId="14100"/>
+          <ac:spMkLst>
+            <pc:docMk/>
+            <pc:sldMk cId="931832636" sldId="259"/>
+            <ac:spMk id="7" creationId="{A01050D9-0E2A-4DD6-8E40-8EA7AF99A35A}"/>
+          </ac:spMkLst>
+        </pc:spChg>
+        <pc:spChg chg="add mod">
+          <ac:chgData name="Zephyr Tay" userId="58c7b28099c6babd" providerId="LiveId" clId="{1D4EBB90-F4CA-4268-AC5D-BBFB91B491A4}" dt="2022-03-25T16:21:33.638" v="5" actId="14100"/>
+          <ac:spMkLst>
+            <pc:docMk/>
+            <pc:sldMk cId="931832636" sldId="259"/>
+            <ac:spMk id="8" creationId="{47EAC040-7759-41C7-A987-B5BC306EE7F3}"/>
+          </ac:spMkLst>
+        </pc:spChg>
+        <pc:spChg chg="add mod">
+          <ac:chgData name="Zephyr Tay" userId="58c7b28099c6babd" providerId="LiveId" clId="{1D4EBB90-F4CA-4268-AC5D-BBFB91B491A4}" dt="2022-03-25T16:21:33.638" v="5" actId="14100"/>
+          <ac:spMkLst>
+            <pc:docMk/>
+            <pc:sldMk cId="931832636" sldId="259"/>
+            <ac:spMk id="10" creationId="{E44E1CCF-1CBC-43FF-9789-76808B4E516E}"/>
+          </ac:spMkLst>
+        </pc:spChg>
+        <pc:spChg chg="add mod">
+          <ac:chgData name="Zephyr Tay" userId="58c7b28099c6babd" providerId="LiveId" clId="{1D4EBB90-F4CA-4268-AC5D-BBFB91B491A4}" dt="2022-03-25T16:21:33.638" v="5" actId="14100"/>
+          <ac:spMkLst>
+            <pc:docMk/>
+            <pc:sldMk cId="931832636" sldId="259"/>
+            <ac:spMk id="11" creationId="{2497D38E-59D1-4890-9D46-A5777F0C9758}"/>
+          </ac:spMkLst>
+        </pc:spChg>
+        <pc:spChg chg="add mod">
+          <ac:chgData name="Zephyr Tay" userId="58c7b28099c6babd" providerId="LiveId" clId="{1D4EBB90-F4CA-4268-AC5D-BBFB91B491A4}" dt="2022-03-25T16:21:33.638" v="5" actId="14100"/>
+          <ac:spMkLst>
+            <pc:docMk/>
+            <pc:sldMk cId="931832636" sldId="259"/>
+            <ac:spMk id="12" creationId="{4D825D4A-BDD8-48BE-BA76-5430EC08C5B3}"/>
+          </ac:spMkLst>
+        </pc:spChg>
+        <pc:spChg chg="add mod">
+          <ac:chgData name="Zephyr Tay" userId="58c7b28099c6babd" providerId="LiveId" clId="{1D4EBB90-F4CA-4268-AC5D-BBFB91B491A4}" dt="2022-03-25T16:21:33.638" v="5" actId="14100"/>
+          <ac:spMkLst>
+            <pc:docMk/>
+            <pc:sldMk cId="931832636" sldId="259"/>
+            <ac:spMk id="13" creationId="{C8B15CC4-61A3-4C26-8D2B-B71EA5E45D32}"/>
+          </ac:spMkLst>
+        </pc:spChg>
+        <pc:spChg chg="add mod">
+          <ac:chgData name="Zephyr Tay" userId="58c7b28099c6babd" providerId="LiveId" clId="{1D4EBB90-F4CA-4268-AC5D-BBFB91B491A4}" dt="2022-03-25T16:21:33.638" v="5" actId="14100"/>
+          <ac:spMkLst>
+            <pc:docMk/>
+            <pc:sldMk cId="931832636" sldId="259"/>
+            <ac:spMk id="14" creationId="{37CA127F-A6E4-473E-ADE4-0821FC377D5F}"/>
+          </ac:spMkLst>
+        </pc:spChg>
+        <pc:spChg chg="add mod">
+          <ac:chgData name="Zephyr Tay" userId="58c7b28099c6babd" providerId="LiveId" clId="{1D4EBB90-F4CA-4268-AC5D-BBFB91B491A4}" dt="2022-03-25T16:21:33.638" v="5" actId="14100"/>
+          <ac:spMkLst>
+            <pc:docMk/>
+            <pc:sldMk cId="931832636" sldId="259"/>
+            <ac:spMk id="15" creationId="{13E6E3DD-DFF9-49A4-9E52-39FC72630958}"/>
+          </ac:spMkLst>
+        </pc:spChg>
+        <pc:spChg chg="add mod">
+          <ac:chgData name="Zephyr Tay" userId="58c7b28099c6babd" providerId="LiveId" clId="{1D4EBB90-F4CA-4268-AC5D-BBFB91B491A4}" dt="2022-03-25T16:21:33.638" v="5" actId="14100"/>
+          <ac:spMkLst>
+            <pc:docMk/>
+            <pc:sldMk cId="931832636" sldId="259"/>
+            <ac:spMk id="16" creationId="{86EE309D-D885-4ADC-A817-7330CE5D33F4}"/>
+          </ac:spMkLst>
+        </pc:spChg>
+        <pc:spChg chg="add mod">
+          <ac:chgData name="Zephyr Tay" userId="58c7b28099c6babd" providerId="LiveId" clId="{1D4EBB90-F4CA-4268-AC5D-BBFB91B491A4}" dt="2022-03-25T16:21:33.638" v="5" actId="14100"/>
+          <ac:spMkLst>
+            <pc:docMk/>
+            <pc:sldMk cId="931832636" sldId="259"/>
+            <ac:spMk id="17" creationId="{FF60BFF8-8DEB-42FC-B3BE-0B68AC77397D}"/>
+          </ac:spMkLst>
+        </pc:spChg>
+        <pc:spChg chg="add mod">
+          <ac:chgData name="Zephyr Tay" userId="58c7b28099c6babd" providerId="LiveId" clId="{1D4EBB90-F4CA-4268-AC5D-BBFB91B491A4}" dt="2022-03-25T16:21:33.638" v="5" actId="14100"/>
+          <ac:spMkLst>
+            <pc:docMk/>
+            <pc:sldMk cId="931832636" sldId="259"/>
+            <ac:spMk id="18" creationId="{1D7D370B-69B1-413B-9A9C-9F48ECDE4B72}"/>
+          </ac:spMkLst>
+        </pc:spChg>
+        <pc:cxnChg chg="add mod">
+          <ac:chgData name="Zephyr Tay" userId="58c7b28099c6babd" providerId="LiveId" clId="{1D4EBB90-F4CA-4268-AC5D-BBFB91B491A4}" dt="2022-03-25T16:21:33.638" v="5" actId="14100"/>
+          <ac:cxnSpMkLst>
+            <pc:docMk/>
+            <pc:sldMk cId="931832636" sldId="259"/>
+            <ac:cxnSpMk id="9" creationId="{B3B1026C-9C3A-4AEE-8CF8-C6069871B386}"/>
+          </ac:cxnSpMkLst>
+        </pc:cxnChg>
+      </pc:sldChg>
+    </pc:docChg>
+  </pc:docChgLst>
+</pc:chgInfo>
 </file>
 
 <file path=ppt/slideLayouts/slideLayout1.xml><?xml version="1.0" encoding="utf-8"?>
@@ -258,7 +460,7 @@
           <a:p>
             <a:fld id="{51803F4B-9C4D-4BE8-8CC0-3C3D11FC2AA4}" type="datetimeFigureOut">
               <a:rPr lang="LID4096" smtClean="0"/>
-              <a:t>03/21/2022</a:t>
+              <a:t>03/26/2022</a:t>
             </a:fld>
             <a:endParaRPr lang="LID4096"/>
           </a:p>
@@ -458,7 +660,7 @@
           <a:p>
             <a:fld id="{51803F4B-9C4D-4BE8-8CC0-3C3D11FC2AA4}" type="datetimeFigureOut">
               <a:rPr lang="LID4096" smtClean="0"/>
-              <a:t>03/21/2022</a:t>
+              <a:t>03/26/2022</a:t>
             </a:fld>
             <a:endParaRPr lang="LID4096"/>
           </a:p>
@@ -668,7 +870,7 @@
           <a:p>
             <a:fld id="{51803F4B-9C4D-4BE8-8CC0-3C3D11FC2AA4}" type="datetimeFigureOut">
               <a:rPr lang="LID4096" smtClean="0"/>
-              <a:t>03/21/2022</a:t>
+              <a:t>03/26/2022</a:t>
             </a:fld>
             <a:endParaRPr lang="LID4096"/>
           </a:p>
@@ -868,7 +1070,7 @@
           <a:p>
             <a:fld id="{51803F4B-9C4D-4BE8-8CC0-3C3D11FC2AA4}" type="datetimeFigureOut">
               <a:rPr lang="LID4096" smtClean="0"/>
-              <a:t>03/21/2022</a:t>
+              <a:t>03/26/2022</a:t>
             </a:fld>
             <a:endParaRPr lang="LID4096"/>
           </a:p>
@@ -1144,7 +1346,7 @@
           <a:p>
             <a:fld id="{51803F4B-9C4D-4BE8-8CC0-3C3D11FC2AA4}" type="datetimeFigureOut">
               <a:rPr lang="LID4096" smtClean="0"/>
-              <a:t>03/21/2022</a:t>
+              <a:t>03/26/2022</a:t>
             </a:fld>
             <a:endParaRPr lang="LID4096"/>
           </a:p>
@@ -1412,7 +1614,7 @@
           <a:p>
             <a:fld id="{51803F4B-9C4D-4BE8-8CC0-3C3D11FC2AA4}" type="datetimeFigureOut">
               <a:rPr lang="LID4096" smtClean="0"/>
-              <a:t>03/21/2022</a:t>
+              <a:t>03/26/2022</a:t>
             </a:fld>
             <a:endParaRPr lang="LID4096"/>
           </a:p>
@@ -1827,7 +2029,7 @@
           <a:p>
             <a:fld id="{51803F4B-9C4D-4BE8-8CC0-3C3D11FC2AA4}" type="datetimeFigureOut">
               <a:rPr lang="LID4096" smtClean="0"/>
-              <a:t>03/21/2022</a:t>
+              <a:t>03/26/2022</a:t>
             </a:fld>
             <a:endParaRPr lang="LID4096"/>
           </a:p>
@@ -1969,7 +2171,7 @@
           <a:p>
             <a:fld id="{51803F4B-9C4D-4BE8-8CC0-3C3D11FC2AA4}" type="datetimeFigureOut">
               <a:rPr lang="LID4096" smtClean="0"/>
-              <a:t>03/21/2022</a:t>
+              <a:t>03/26/2022</a:t>
             </a:fld>
             <a:endParaRPr lang="LID4096"/>
           </a:p>
@@ -2082,7 +2284,7 @@
           <a:p>
             <a:fld id="{51803F4B-9C4D-4BE8-8CC0-3C3D11FC2AA4}" type="datetimeFigureOut">
               <a:rPr lang="LID4096" smtClean="0"/>
-              <a:t>03/21/2022</a:t>
+              <a:t>03/26/2022</a:t>
             </a:fld>
             <a:endParaRPr lang="LID4096"/>
           </a:p>
@@ -2395,7 +2597,7 @@
           <a:p>
             <a:fld id="{51803F4B-9C4D-4BE8-8CC0-3C3D11FC2AA4}" type="datetimeFigureOut">
               <a:rPr lang="LID4096" smtClean="0"/>
-              <a:t>03/21/2022</a:t>
+              <a:t>03/26/2022</a:t>
             </a:fld>
             <a:endParaRPr lang="LID4096"/>
           </a:p>
@@ -2684,7 +2886,7 @@
           <a:p>
             <a:fld id="{51803F4B-9C4D-4BE8-8CC0-3C3D11FC2AA4}" type="datetimeFigureOut">
               <a:rPr lang="LID4096" smtClean="0"/>
-              <a:t>03/21/2022</a:t>
+              <a:t>03/26/2022</a:t>
             </a:fld>
             <a:endParaRPr lang="LID4096"/>
           </a:p>
@@ -2927,7 +3129,7 @@
           <a:p>
             <a:fld id="{51803F4B-9C4D-4BE8-8CC0-3C3D11FC2AA4}" type="datetimeFigureOut">
               <a:rPr lang="LID4096" smtClean="0"/>
-              <a:t>03/21/2022</a:t>
+              <a:t>03/26/2022</a:t>
             </a:fld>
             <a:endParaRPr lang="LID4096"/>
           </a:p>
@@ -4605,6 +4807,296 @@
           </a:p>
         </p:txBody>
       </p:sp>
+      <p:sp>
+        <p:nvSpPr>
+          <p:cNvPr id="26" name="Rectangle 25">
+            <a:extLst>
+              <a:ext uri="{FF2B5EF4-FFF2-40B4-BE49-F238E27FC236}">
+                <a16:creationId xmlns:a16="http://schemas.microsoft.com/office/drawing/2014/main" id="{1076C366-D320-452F-AA3F-FB2954D1A4FA}"/>
+              </a:ext>
+            </a:extLst>
+          </p:cNvPr>
+          <p:cNvSpPr/>
+          <p:nvPr/>
+        </p:nvSpPr>
+        <p:spPr>
+          <a:xfrm>
+            <a:off x="9008758" y="-326082"/>
+            <a:ext cx="2974694" cy="1490905"/>
+          </a:xfrm>
+          <a:prstGeom prst="rect">
+            <a:avLst/>
+          </a:prstGeom>
+          <a:solidFill>
+            <a:schemeClr val="bg1"/>
+          </a:solidFill>
+          <a:ln>
+            <a:noFill/>
+          </a:ln>
+          <a:effectLst>
+            <a:outerShdw blurRad="50800" dist="38100" sx="101000" sy="101000" algn="l" rotWithShape="0">
+              <a:prstClr val="black">
+                <a:alpha val="40000"/>
+              </a:prstClr>
+            </a:outerShdw>
+          </a:effectLst>
+        </p:spPr>
+        <p:style>
+          <a:lnRef idx="2">
+            <a:schemeClr val="accent1">
+              <a:shade val="50000"/>
+            </a:schemeClr>
+          </a:lnRef>
+          <a:fillRef idx="1">
+            <a:schemeClr val="accent1"/>
+          </a:fillRef>
+          <a:effectRef idx="0">
+            <a:schemeClr val="accent1"/>
+          </a:effectRef>
+          <a:fontRef idx="minor">
+            <a:schemeClr val="lt1"/>
+          </a:fontRef>
+        </p:style>
+        <p:txBody>
+          <a:bodyPr rtlCol="0" anchor="ctr"/>
+          <a:lstStyle/>
+          <a:p>
+            <a:endParaRPr lang="LID4096" dirty="0"/>
+          </a:p>
+        </p:txBody>
+      </p:sp>
+      <p:sp>
+        <p:nvSpPr>
+          <p:cNvPr id="27" name="Rectangle 26">
+            <a:extLst>
+              <a:ext uri="{FF2B5EF4-FFF2-40B4-BE49-F238E27FC236}">
+                <a16:creationId xmlns:a16="http://schemas.microsoft.com/office/drawing/2014/main" id="{DFB212FF-75A5-4BA7-801B-C28801629291}"/>
+              </a:ext>
+            </a:extLst>
+          </p:cNvPr>
+          <p:cNvSpPr/>
+          <p:nvPr/>
+        </p:nvSpPr>
+        <p:spPr>
+          <a:xfrm>
+            <a:off x="9008758" y="1380976"/>
+            <a:ext cx="2974694" cy="1490905"/>
+          </a:xfrm>
+          <a:prstGeom prst="rect">
+            <a:avLst/>
+          </a:prstGeom>
+          <a:solidFill>
+            <a:schemeClr val="bg1"/>
+          </a:solidFill>
+          <a:ln>
+            <a:noFill/>
+          </a:ln>
+          <a:effectLst>
+            <a:outerShdw blurRad="50800" dist="38100" sx="101000" sy="101000" algn="l" rotWithShape="0">
+              <a:prstClr val="black">
+                <a:alpha val="40000"/>
+              </a:prstClr>
+            </a:outerShdw>
+          </a:effectLst>
+        </p:spPr>
+        <p:style>
+          <a:lnRef idx="2">
+            <a:schemeClr val="accent1">
+              <a:shade val="50000"/>
+            </a:schemeClr>
+          </a:lnRef>
+          <a:fillRef idx="1">
+            <a:schemeClr val="accent1"/>
+          </a:fillRef>
+          <a:effectRef idx="0">
+            <a:schemeClr val="accent1"/>
+          </a:effectRef>
+          <a:fontRef idx="minor">
+            <a:schemeClr val="lt1"/>
+          </a:fontRef>
+        </p:style>
+        <p:txBody>
+          <a:bodyPr rtlCol="0" anchor="ctr"/>
+          <a:lstStyle/>
+          <a:p>
+            <a:endParaRPr lang="LID4096" dirty="0"/>
+          </a:p>
+        </p:txBody>
+      </p:sp>
+      <p:sp>
+        <p:nvSpPr>
+          <p:cNvPr id="28" name="Rectangle 27">
+            <a:extLst>
+              <a:ext uri="{FF2B5EF4-FFF2-40B4-BE49-F238E27FC236}">
+                <a16:creationId xmlns:a16="http://schemas.microsoft.com/office/drawing/2014/main" id="{9DE4F4C7-F8CD-4BB3-A527-AFD9EC6A35F8}"/>
+              </a:ext>
+            </a:extLst>
+          </p:cNvPr>
+          <p:cNvSpPr/>
+          <p:nvPr/>
+        </p:nvSpPr>
+        <p:spPr>
+          <a:xfrm>
+            <a:off x="9008758" y="3088034"/>
+            <a:ext cx="2974694" cy="1490905"/>
+          </a:xfrm>
+          <a:prstGeom prst="rect">
+            <a:avLst/>
+          </a:prstGeom>
+          <a:solidFill>
+            <a:schemeClr val="bg1"/>
+          </a:solidFill>
+          <a:ln>
+            <a:noFill/>
+          </a:ln>
+          <a:effectLst>
+            <a:outerShdw blurRad="50800" dist="38100" sx="101000" sy="101000" algn="l" rotWithShape="0">
+              <a:prstClr val="black">
+                <a:alpha val="40000"/>
+              </a:prstClr>
+            </a:outerShdw>
+          </a:effectLst>
+        </p:spPr>
+        <p:style>
+          <a:lnRef idx="2">
+            <a:schemeClr val="accent1">
+              <a:shade val="50000"/>
+            </a:schemeClr>
+          </a:lnRef>
+          <a:fillRef idx="1">
+            <a:schemeClr val="accent1"/>
+          </a:fillRef>
+          <a:effectRef idx="0">
+            <a:schemeClr val="accent1"/>
+          </a:effectRef>
+          <a:fontRef idx="minor">
+            <a:schemeClr val="lt1"/>
+          </a:fontRef>
+        </p:style>
+        <p:txBody>
+          <a:bodyPr rtlCol="0" anchor="ctr"/>
+          <a:lstStyle/>
+          <a:p>
+            <a:endParaRPr lang="LID4096" dirty="0"/>
+          </a:p>
+        </p:txBody>
+      </p:sp>
+      <p:sp>
+        <p:nvSpPr>
+          <p:cNvPr id="29" name="Rectangle 28">
+            <a:extLst>
+              <a:ext uri="{FF2B5EF4-FFF2-40B4-BE49-F238E27FC236}">
+                <a16:creationId xmlns:a16="http://schemas.microsoft.com/office/drawing/2014/main" id="{A91EB460-89A0-42B0-B678-7828D759334A}"/>
+              </a:ext>
+            </a:extLst>
+          </p:cNvPr>
+          <p:cNvSpPr/>
+          <p:nvPr/>
+        </p:nvSpPr>
+        <p:spPr>
+          <a:xfrm>
+            <a:off x="9008758" y="4818812"/>
+            <a:ext cx="2974694" cy="1490905"/>
+          </a:xfrm>
+          <a:prstGeom prst="rect">
+            <a:avLst/>
+          </a:prstGeom>
+          <a:solidFill>
+            <a:schemeClr val="bg1"/>
+          </a:solidFill>
+          <a:ln>
+            <a:noFill/>
+          </a:ln>
+          <a:effectLst>
+            <a:outerShdw blurRad="50800" dist="38100" sx="101000" sy="101000" algn="l" rotWithShape="0">
+              <a:prstClr val="black">
+                <a:alpha val="40000"/>
+              </a:prstClr>
+            </a:outerShdw>
+          </a:effectLst>
+        </p:spPr>
+        <p:style>
+          <a:lnRef idx="2">
+            <a:schemeClr val="accent1">
+              <a:shade val="50000"/>
+            </a:schemeClr>
+          </a:lnRef>
+          <a:fillRef idx="1">
+            <a:schemeClr val="accent1"/>
+          </a:fillRef>
+          <a:effectRef idx="0">
+            <a:schemeClr val="accent1"/>
+          </a:effectRef>
+          <a:fontRef idx="minor">
+            <a:schemeClr val="lt1"/>
+          </a:fontRef>
+        </p:style>
+        <p:txBody>
+          <a:bodyPr rtlCol="0" anchor="ctr"/>
+          <a:lstStyle/>
+          <a:p>
+            <a:endParaRPr lang="LID4096" dirty="0"/>
+          </a:p>
+        </p:txBody>
+      </p:sp>
+      <p:sp>
+        <p:nvSpPr>
+          <p:cNvPr id="30" name="Rectangle 29">
+            <a:extLst>
+              <a:ext uri="{FF2B5EF4-FFF2-40B4-BE49-F238E27FC236}">
+                <a16:creationId xmlns:a16="http://schemas.microsoft.com/office/drawing/2014/main" id="{2867A751-1CEE-42D6-AA9A-7A04B2371A98}"/>
+              </a:ext>
+            </a:extLst>
+          </p:cNvPr>
+          <p:cNvSpPr/>
+          <p:nvPr/>
+        </p:nvSpPr>
+        <p:spPr>
+          <a:xfrm>
+            <a:off x="9008758" y="6549591"/>
+            <a:ext cx="2974694" cy="1170624"/>
+          </a:xfrm>
+          <a:prstGeom prst="rect">
+            <a:avLst/>
+          </a:prstGeom>
+          <a:solidFill>
+            <a:schemeClr val="bg1"/>
+          </a:solidFill>
+          <a:ln>
+            <a:noFill/>
+          </a:ln>
+          <a:effectLst>
+            <a:outerShdw blurRad="50800" dist="38100" sx="101000" sy="101000" algn="l" rotWithShape="0">
+              <a:prstClr val="black">
+                <a:alpha val="40000"/>
+              </a:prstClr>
+            </a:outerShdw>
+          </a:effectLst>
+        </p:spPr>
+        <p:style>
+          <a:lnRef idx="2">
+            <a:schemeClr val="accent1">
+              <a:shade val="50000"/>
+            </a:schemeClr>
+          </a:lnRef>
+          <a:fillRef idx="1">
+            <a:schemeClr val="accent1"/>
+          </a:fillRef>
+          <a:effectRef idx="0">
+            <a:schemeClr val="accent1"/>
+          </a:effectRef>
+          <a:fontRef idx="minor">
+            <a:schemeClr val="lt1"/>
+          </a:fontRef>
+        </p:style>
+        <p:txBody>
+          <a:bodyPr rtlCol="0" anchor="ctr"/>
+          <a:lstStyle/>
+          <a:p>
+            <a:endParaRPr lang="LID4096" dirty="0"/>
+          </a:p>
+        </p:txBody>
+      </p:sp>
     </p:spTree>
     <p:extLst>
       <p:ext uri="{BB962C8B-B14F-4D97-AF65-F5344CB8AC3E}">
@@ -4704,6 +5196,898 @@
     <p:extLst>
       <p:ext uri="{BB962C8B-B14F-4D97-AF65-F5344CB8AC3E}">
         <p14:creationId xmlns:p14="http://schemas.microsoft.com/office/powerpoint/2010/main" val="723555658"/>
+      </p:ext>
+    </p:extLst>
+  </p:cSld>
+  <p:clrMapOvr>
+    <a:masterClrMapping/>
+  </p:clrMapOvr>
+</p:sld>
+</file>
+
+<file path=ppt/slides/slide4.xml><?xml version="1.0" encoding="utf-8"?>
+<p:sld xmlns:a="http://schemas.openxmlformats.org/drawingml/2006/main" xmlns:r="http://schemas.openxmlformats.org/officeDocument/2006/relationships" xmlns:p="http://schemas.openxmlformats.org/presentationml/2006/main">
+  <p:cSld>
+    <p:spTree>
+      <p:nvGrpSpPr>
+        <p:cNvPr id="1" name=""/>
+        <p:cNvGrpSpPr/>
+        <p:nvPr/>
+      </p:nvGrpSpPr>
+      <p:grpSpPr>
+        <a:xfrm>
+          <a:off x="0" y="0"/>
+          <a:ext cx="0" cy="0"/>
+          <a:chOff x="0" y="0"/>
+          <a:chExt cx="0" cy="0"/>
+        </a:xfrm>
+      </p:grpSpPr>
+      <p:sp>
+        <p:nvSpPr>
+          <p:cNvPr id="2" name="Title 1">
+            <a:extLst>
+              <a:ext uri="{FF2B5EF4-FFF2-40B4-BE49-F238E27FC236}">
+                <a16:creationId xmlns:a16="http://schemas.microsoft.com/office/drawing/2014/main" id="{CECD7753-200C-4BC6-A903-A523C540B60D}"/>
+              </a:ext>
+            </a:extLst>
+          </p:cNvPr>
+          <p:cNvSpPr>
+            <a:spLocks noGrp="1"/>
+          </p:cNvSpPr>
+          <p:nvPr>
+            <p:ph type="title"/>
+          </p:nvPr>
+        </p:nvSpPr>
+        <p:spPr/>
+        <p:txBody>
+          <a:bodyPr/>
+          <a:lstStyle/>
+          <a:p>
+            <a:endParaRPr lang="en-GB" dirty="0"/>
+          </a:p>
+        </p:txBody>
+      </p:sp>
+      <p:sp>
+        <p:nvSpPr>
+          <p:cNvPr id="3" name="Content Placeholder 2">
+            <a:extLst>
+              <a:ext uri="{FF2B5EF4-FFF2-40B4-BE49-F238E27FC236}">
+                <a16:creationId xmlns:a16="http://schemas.microsoft.com/office/drawing/2014/main" id="{067DDC76-B3EC-4DFB-87BE-AB817AD96F04}"/>
+              </a:ext>
+            </a:extLst>
+          </p:cNvPr>
+          <p:cNvSpPr>
+            <a:spLocks noGrp="1"/>
+          </p:cNvSpPr>
+          <p:nvPr>
+            <p:ph idx="1"/>
+          </p:nvPr>
+        </p:nvSpPr>
+        <p:spPr/>
+        <p:txBody>
+          <a:bodyPr/>
+          <a:lstStyle/>
+          <a:p>
+            <a:endParaRPr lang="en-GB" dirty="0"/>
+          </a:p>
+        </p:txBody>
+      </p:sp>
+      <p:sp>
+        <p:nvSpPr>
+          <p:cNvPr id="4" name="Rectangle: Rounded Corners 3">
+            <a:extLst>
+              <a:ext uri="{FF2B5EF4-FFF2-40B4-BE49-F238E27FC236}">
+                <a16:creationId xmlns:a16="http://schemas.microsoft.com/office/drawing/2014/main" id="{55D99FD5-7981-4A79-A135-04BA07BF39DE}"/>
+              </a:ext>
+            </a:extLst>
+          </p:cNvPr>
+          <p:cNvSpPr/>
+          <p:nvPr/>
+        </p:nvSpPr>
+        <p:spPr>
+          <a:xfrm>
+            <a:off x="523528" y="201295"/>
+            <a:ext cx="289367" cy="45719"/>
+          </a:xfrm>
+          <a:prstGeom prst="roundRect">
+            <a:avLst/>
+          </a:prstGeom>
+        </p:spPr>
+        <p:style>
+          <a:lnRef idx="2">
+            <a:schemeClr val="accent1">
+              <a:shade val="50000"/>
+            </a:schemeClr>
+          </a:lnRef>
+          <a:fillRef idx="1">
+            <a:schemeClr val="accent1"/>
+          </a:fillRef>
+          <a:effectRef idx="0">
+            <a:schemeClr val="accent1"/>
+          </a:effectRef>
+          <a:fontRef idx="minor">
+            <a:schemeClr val="lt1"/>
+          </a:fontRef>
+        </p:style>
+        <p:txBody>
+          <a:bodyPr rtlCol="0" anchor="ctr"/>
+          <a:lstStyle/>
+          <a:p>
+            <a:pPr algn="ctr"/>
+            <a:endParaRPr lang="LID4096"/>
+          </a:p>
+        </p:txBody>
+      </p:sp>
+      <p:sp>
+        <p:nvSpPr>
+          <p:cNvPr id="5" name="Rectangle: Rounded Corners 4">
+            <a:extLst>
+              <a:ext uri="{FF2B5EF4-FFF2-40B4-BE49-F238E27FC236}">
+                <a16:creationId xmlns:a16="http://schemas.microsoft.com/office/drawing/2014/main" id="{CF88AA70-6ABC-44B1-8C33-6F892A2BA19E}"/>
+              </a:ext>
+            </a:extLst>
+          </p:cNvPr>
+          <p:cNvSpPr/>
+          <p:nvPr/>
+        </p:nvSpPr>
+        <p:spPr>
+          <a:xfrm>
+            <a:off x="523529" y="307976"/>
+            <a:ext cx="289367" cy="45719"/>
+          </a:xfrm>
+          <a:prstGeom prst="roundRect">
+            <a:avLst/>
+          </a:prstGeom>
+        </p:spPr>
+        <p:style>
+          <a:lnRef idx="2">
+            <a:schemeClr val="accent1">
+              <a:shade val="50000"/>
+            </a:schemeClr>
+          </a:lnRef>
+          <a:fillRef idx="1">
+            <a:schemeClr val="accent1"/>
+          </a:fillRef>
+          <a:effectRef idx="0">
+            <a:schemeClr val="accent1"/>
+          </a:effectRef>
+          <a:fontRef idx="minor">
+            <a:schemeClr val="lt1"/>
+          </a:fontRef>
+        </p:style>
+        <p:txBody>
+          <a:bodyPr rtlCol="0" anchor="ctr"/>
+          <a:lstStyle/>
+          <a:p>
+            <a:pPr algn="ctr"/>
+            <a:endParaRPr lang="LID4096"/>
+          </a:p>
+        </p:txBody>
+      </p:sp>
+      <p:sp>
+        <p:nvSpPr>
+          <p:cNvPr id="6" name="Rectangle: Rounded Corners 5">
+            <a:extLst>
+              <a:ext uri="{FF2B5EF4-FFF2-40B4-BE49-F238E27FC236}">
+                <a16:creationId xmlns:a16="http://schemas.microsoft.com/office/drawing/2014/main" id="{E655C7BA-406F-4030-A9E4-BC624F0C4280}"/>
+              </a:ext>
+            </a:extLst>
+          </p:cNvPr>
+          <p:cNvSpPr/>
+          <p:nvPr/>
+        </p:nvSpPr>
+        <p:spPr>
+          <a:xfrm>
+            <a:off x="523528" y="414657"/>
+            <a:ext cx="289367" cy="45719"/>
+          </a:xfrm>
+          <a:prstGeom prst="roundRect">
+            <a:avLst/>
+          </a:prstGeom>
+        </p:spPr>
+        <p:style>
+          <a:lnRef idx="2">
+            <a:schemeClr val="accent1">
+              <a:shade val="50000"/>
+            </a:schemeClr>
+          </a:lnRef>
+          <a:fillRef idx="1">
+            <a:schemeClr val="accent1"/>
+          </a:fillRef>
+          <a:effectRef idx="0">
+            <a:schemeClr val="accent1"/>
+          </a:effectRef>
+          <a:fontRef idx="minor">
+            <a:schemeClr val="lt1"/>
+          </a:fontRef>
+        </p:style>
+        <p:txBody>
+          <a:bodyPr rtlCol="0" anchor="ctr"/>
+          <a:lstStyle/>
+          <a:p>
+            <a:pPr algn="ctr"/>
+            <a:endParaRPr lang="LID4096"/>
+          </a:p>
+        </p:txBody>
+      </p:sp>
+      <p:sp>
+        <p:nvSpPr>
+          <p:cNvPr id="7" name="Rectangle 6">
+            <a:extLst>
+              <a:ext uri="{FF2B5EF4-FFF2-40B4-BE49-F238E27FC236}">
+                <a16:creationId xmlns:a16="http://schemas.microsoft.com/office/drawing/2014/main" id="{A01050D9-0E2A-4DD6-8E40-8EA7AF99A35A}"/>
+              </a:ext>
+            </a:extLst>
+          </p:cNvPr>
+          <p:cNvSpPr/>
+          <p:nvPr/>
+        </p:nvSpPr>
+        <p:spPr>
+          <a:xfrm>
+            <a:off x="0" y="-403412"/>
+            <a:ext cx="2974694" cy="8123626"/>
+          </a:xfrm>
+          <a:prstGeom prst="rect">
+            <a:avLst/>
+          </a:prstGeom>
+          <a:solidFill>
+            <a:schemeClr val="bg1"/>
+          </a:solidFill>
+          <a:ln>
+            <a:noFill/>
+          </a:ln>
+          <a:effectLst>
+            <a:outerShdw blurRad="50800" dist="38100" sx="101000" sy="101000" algn="l" rotWithShape="0">
+              <a:prstClr val="black">
+                <a:alpha val="40000"/>
+              </a:prstClr>
+            </a:outerShdw>
+          </a:effectLst>
+        </p:spPr>
+        <p:style>
+          <a:lnRef idx="2">
+            <a:schemeClr val="accent1">
+              <a:shade val="50000"/>
+            </a:schemeClr>
+          </a:lnRef>
+          <a:fillRef idx="1">
+            <a:schemeClr val="accent1"/>
+          </a:fillRef>
+          <a:effectRef idx="0">
+            <a:schemeClr val="accent1"/>
+          </a:effectRef>
+          <a:fontRef idx="minor">
+            <a:schemeClr val="lt1"/>
+          </a:fontRef>
+        </p:style>
+        <p:txBody>
+          <a:bodyPr rtlCol="0" anchor="ctr"/>
+          <a:lstStyle/>
+          <a:p>
+            <a:endParaRPr lang="LID4096" dirty="0"/>
+          </a:p>
+        </p:txBody>
+      </p:sp>
+      <p:sp>
+        <p:nvSpPr>
+          <p:cNvPr id="8" name="TextBox 7">
+            <a:extLst>
+              <a:ext uri="{FF2B5EF4-FFF2-40B4-BE49-F238E27FC236}">
+                <a16:creationId xmlns:a16="http://schemas.microsoft.com/office/drawing/2014/main" id="{47EAC040-7759-41C7-A987-B5BC306EE7F3}"/>
+              </a:ext>
+            </a:extLst>
+          </p:cNvPr>
+          <p:cNvSpPr txBox="1"/>
+          <p:nvPr/>
+        </p:nvSpPr>
+        <p:spPr>
+          <a:xfrm>
+            <a:off x="540613" y="-253628"/>
+            <a:ext cx="1893467" cy="523220"/>
+          </a:xfrm>
+          <a:prstGeom prst="rect">
+            <a:avLst/>
+          </a:prstGeom>
+          <a:noFill/>
+        </p:spPr>
+        <p:txBody>
+          <a:bodyPr wrap="square" rtlCol="0">
+            <a:spAutoFit/>
+          </a:bodyPr>
+          <a:lstStyle/>
+          <a:p>
+            <a:r>
+              <a:rPr lang="en-US" sz="2800" b="1" dirty="0">
+                <a:solidFill>
+                  <a:schemeClr val="accent4">
+                    <a:lumMod val="40000"/>
+                    <a:lumOff val="60000"/>
+                  </a:schemeClr>
+                </a:solidFill>
+                <a:latin typeface="Aharoni" panose="02010803020104030203" pitchFamily="2" charset="-79"/>
+                <a:cs typeface="Aharoni" panose="02010803020104030203" pitchFamily="2" charset="-79"/>
+              </a:rPr>
+              <a:t>WhaToEat</a:t>
+            </a:r>
+            <a:endParaRPr lang="LID4096" sz="2800" b="1" dirty="0">
+              <a:solidFill>
+                <a:schemeClr val="accent4">
+                  <a:lumMod val="40000"/>
+                  <a:lumOff val="60000"/>
+                </a:schemeClr>
+              </a:solidFill>
+              <a:latin typeface="Aharoni" panose="02010803020104030203" pitchFamily="2" charset="-79"/>
+              <a:cs typeface="Aharoni" panose="02010803020104030203" pitchFamily="2" charset="-79"/>
+            </a:endParaRPr>
+          </a:p>
+        </p:txBody>
+      </p:sp>
+      <p:cxnSp>
+        <p:nvCxnSpPr>
+          <p:cNvPr id="9" name="Straight Connector 8">
+            <a:extLst>
+              <a:ext uri="{FF2B5EF4-FFF2-40B4-BE49-F238E27FC236}">
+                <a16:creationId xmlns:a16="http://schemas.microsoft.com/office/drawing/2014/main" id="{B3B1026C-9C3A-4AEE-8CF8-C6069871B386}"/>
+              </a:ext>
+            </a:extLst>
+          </p:cNvPr>
+          <p:cNvCxnSpPr>
+            <a:cxnSpLocks/>
+          </p:cNvCxnSpPr>
+          <p:nvPr/>
+        </p:nvCxnSpPr>
+        <p:spPr>
+          <a:xfrm>
+            <a:off x="449713" y="269592"/>
+            <a:ext cx="2075265" cy="0"/>
+          </a:xfrm>
+          <a:prstGeom prst="line">
+            <a:avLst/>
+          </a:prstGeom>
+          <a:ln>
+            <a:solidFill>
+              <a:schemeClr val="accent4">
+                <a:lumMod val="60000"/>
+                <a:lumOff val="40000"/>
+              </a:schemeClr>
+            </a:solidFill>
+          </a:ln>
+        </p:spPr>
+        <p:style>
+          <a:lnRef idx="1">
+            <a:schemeClr val="accent1"/>
+          </a:lnRef>
+          <a:fillRef idx="0">
+            <a:schemeClr val="accent1"/>
+          </a:fillRef>
+          <a:effectRef idx="0">
+            <a:schemeClr val="accent1"/>
+          </a:effectRef>
+          <a:fontRef idx="minor">
+            <a:schemeClr val="tx1"/>
+          </a:fontRef>
+        </p:style>
+      </p:cxnSp>
+      <p:sp>
+        <p:nvSpPr>
+          <p:cNvPr id="10" name="Rectangle: Rounded Corners 9">
+            <a:extLst>
+              <a:ext uri="{FF2B5EF4-FFF2-40B4-BE49-F238E27FC236}">
+                <a16:creationId xmlns:a16="http://schemas.microsoft.com/office/drawing/2014/main" id="{E44E1CCF-1CBC-43FF-9789-76808B4E516E}"/>
+              </a:ext>
+            </a:extLst>
+          </p:cNvPr>
+          <p:cNvSpPr/>
+          <p:nvPr/>
+        </p:nvSpPr>
+        <p:spPr>
+          <a:xfrm>
+            <a:off x="449713" y="857736"/>
+            <a:ext cx="2075265" cy="523240"/>
+          </a:xfrm>
+          <a:prstGeom prst="roundRect">
+            <a:avLst>
+              <a:gd name="adj" fmla="val 11400"/>
+            </a:avLst>
+          </a:prstGeom>
+          <a:solidFill>
+            <a:schemeClr val="bg1"/>
+          </a:solidFill>
+          <a:ln>
+            <a:solidFill>
+              <a:schemeClr val="tx1"/>
+            </a:solidFill>
+          </a:ln>
+        </p:spPr>
+        <p:style>
+          <a:lnRef idx="2">
+            <a:schemeClr val="accent1">
+              <a:shade val="50000"/>
+            </a:schemeClr>
+          </a:lnRef>
+          <a:fillRef idx="1">
+            <a:schemeClr val="accent1"/>
+          </a:fillRef>
+          <a:effectRef idx="0">
+            <a:schemeClr val="accent1"/>
+          </a:effectRef>
+          <a:fontRef idx="minor">
+            <a:schemeClr val="lt1"/>
+          </a:fontRef>
+        </p:style>
+        <p:txBody>
+          <a:bodyPr rtlCol="0" anchor="ctr"/>
+          <a:lstStyle/>
+          <a:p>
+            <a:r>
+              <a:rPr lang="en-US" sz="2000" dirty="0">
+                <a:solidFill>
+                  <a:schemeClr val="bg1">
+                    <a:lumMod val="65000"/>
+                  </a:schemeClr>
+                </a:solidFill>
+              </a:rPr>
+              <a:t>Food Type</a:t>
+            </a:r>
+            <a:endParaRPr lang="LID4096" sz="2000" dirty="0">
+              <a:solidFill>
+                <a:schemeClr val="bg1">
+                  <a:lumMod val="65000"/>
+                </a:schemeClr>
+              </a:solidFill>
+            </a:endParaRPr>
+          </a:p>
+        </p:txBody>
+      </p:sp>
+      <p:sp>
+        <p:nvSpPr>
+          <p:cNvPr id="11" name="TextBox 10">
+            <a:extLst>
+              <a:ext uri="{FF2B5EF4-FFF2-40B4-BE49-F238E27FC236}">
+                <a16:creationId xmlns:a16="http://schemas.microsoft.com/office/drawing/2014/main" id="{2497D38E-59D1-4890-9D46-A5777F0C9758}"/>
+              </a:ext>
+            </a:extLst>
+          </p:cNvPr>
+          <p:cNvSpPr txBox="1"/>
+          <p:nvPr/>
+        </p:nvSpPr>
+        <p:spPr>
+          <a:xfrm>
+            <a:off x="358815" y="456354"/>
+            <a:ext cx="752065" cy="369332"/>
+          </a:xfrm>
+          <a:prstGeom prst="rect">
+            <a:avLst/>
+          </a:prstGeom>
+          <a:noFill/>
+        </p:spPr>
+        <p:txBody>
+          <a:bodyPr wrap="square" rtlCol="0">
+            <a:spAutoFit/>
+          </a:bodyPr>
+          <a:lstStyle/>
+          <a:p>
+            <a:r>
+              <a:rPr lang="en-US" dirty="0"/>
+              <a:t>Filters</a:t>
+            </a:r>
+            <a:endParaRPr lang="LID4096" dirty="0"/>
+          </a:p>
+        </p:txBody>
+      </p:sp>
+      <p:sp>
+        <p:nvSpPr>
+          <p:cNvPr id="12" name="Rectangle: Rounded Corners 11">
+            <a:extLst>
+              <a:ext uri="{FF2B5EF4-FFF2-40B4-BE49-F238E27FC236}">
+                <a16:creationId xmlns:a16="http://schemas.microsoft.com/office/drawing/2014/main" id="{4D825D4A-BDD8-48BE-BA76-5430EC08C5B3}"/>
+              </a:ext>
+            </a:extLst>
+          </p:cNvPr>
+          <p:cNvSpPr/>
+          <p:nvPr/>
+        </p:nvSpPr>
+        <p:spPr>
+          <a:xfrm>
+            <a:off x="449713" y="1507847"/>
+            <a:ext cx="2075265" cy="523240"/>
+          </a:xfrm>
+          <a:prstGeom prst="roundRect">
+            <a:avLst>
+              <a:gd name="adj" fmla="val 11400"/>
+            </a:avLst>
+          </a:prstGeom>
+          <a:solidFill>
+            <a:schemeClr val="bg1"/>
+          </a:solidFill>
+          <a:ln>
+            <a:solidFill>
+              <a:schemeClr val="tx1"/>
+            </a:solidFill>
+          </a:ln>
+        </p:spPr>
+        <p:style>
+          <a:lnRef idx="2">
+            <a:schemeClr val="accent1">
+              <a:shade val="50000"/>
+            </a:schemeClr>
+          </a:lnRef>
+          <a:fillRef idx="1">
+            <a:schemeClr val="accent1"/>
+          </a:fillRef>
+          <a:effectRef idx="0">
+            <a:schemeClr val="accent1"/>
+          </a:effectRef>
+          <a:fontRef idx="minor">
+            <a:schemeClr val="lt1"/>
+          </a:fontRef>
+        </p:style>
+        <p:txBody>
+          <a:bodyPr rtlCol="0" anchor="ctr"/>
+          <a:lstStyle/>
+          <a:p>
+            <a:r>
+              <a:rPr lang="en-US" sz="2000" dirty="0">
+                <a:solidFill>
+                  <a:schemeClr val="bg1">
+                    <a:lumMod val="65000"/>
+                  </a:schemeClr>
+                </a:solidFill>
+              </a:rPr>
+              <a:t>Spiciness</a:t>
+            </a:r>
+            <a:endParaRPr lang="LID4096" sz="2000" dirty="0">
+              <a:solidFill>
+                <a:schemeClr val="bg1">
+                  <a:lumMod val="65000"/>
+                </a:schemeClr>
+              </a:solidFill>
+            </a:endParaRPr>
+          </a:p>
+        </p:txBody>
+      </p:sp>
+      <p:sp>
+        <p:nvSpPr>
+          <p:cNvPr id="13" name="Rectangle: Rounded Corners 12">
+            <a:extLst>
+              <a:ext uri="{FF2B5EF4-FFF2-40B4-BE49-F238E27FC236}">
+                <a16:creationId xmlns:a16="http://schemas.microsoft.com/office/drawing/2014/main" id="{C8B15CC4-61A3-4C26-8D2B-B71EA5E45D32}"/>
+              </a:ext>
+            </a:extLst>
+          </p:cNvPr>
+          <p:cNvSpPr/>
+          <p:nvPr/>
+        </p:nvSpPr>
+        <p:spPr>
+          <a:xfrm>
+            <a:off x="449711" y="2157958"/>
+            <a:ext cx="2075265" cy="523240"/>
+          </a:xfrm>
+          <a:prstGeom prst="roundRect">
+            <a:avLst>
+              <a:gd name="adj" fmla="val 11400"/>
+            </a:avLst>
+          </a:prstGeom>
+          <a:solidFill>
+            <a:schemeClr val="bg1"/>
+          </a:solidFill>
+          <a:ln>
+            <a:solidFill>
+              <a:schemeClr val="tx1"/>
+            </a:solidFill>
+          </a:ln>
+        </p:spPr>
+        <p:style>
+          <a:lnRef idx="2">
+            <a:schemeClr val="accent1">
+              <a:shade val="50000"/>
+            </a:schemeClr>
+          </a:lnRef>
+          <a:fillRef idx="1">
+            <a:schemeClr val="accent1"/>
+          </a:fillRef>
+          <a:effectRef idx="0">
+            <a:schemeClr val="accent1"/>
+          </a:effectRef>
+          <a:fontRef idx="minor">
+            <a:schemeClr val="lt1"/>
+          </a:fontRef>
+        </p:style>
+        <p:txBody>
+          <a:bodyPr rtlCol="0" anchor="ctr"/>
+          <a:lstStyle/>
+          <a:p>
+            <a:r>
+              <a:rPr lang="en-US" sz="2000" dirty="0">
+                <a:solidFill>
+                  <a:schemeClr val="bg1">
+                    <a:lumMod val="65000"/>
+                  </a:schemeClr>
+                </a:solidFill>
+              </a:rPr>
+              <a:t>Soup or Dry</a:t>
+            </a:r>
+            <a:endParaRPr lang="LID4096" sz="2000" dirty="0">
+              <a:solidFill>
+                <a:schemeClr val="bg1">
+                  <a:lumMod val="65000"/>
+                </a:schemeClr>
+              </a:solidFill>
+            </a:endParaRPr>
+          </a:p>
+        </p:txBody>
+      </p:sp>
+      <p:sp>
+        <p:nvSpPr>
+          <p:cNvPr id="14" name="Rectangle: Rounded Corners 13">
+            <a:extLst>
+              <a:ext uri="{FF2B5EF4-FFF2-40B4-BE49-F238E27FC236}">
+                <a16:creationId xmlns:a16="http://schemas.microsoft.com/office/drawing/2014/main" id="{37CA127F-A6E4-473E-ADE4-0821FC377D5F}"/>
+              </a:ext>
+            </a:extLst>
+          </p:cNvPr>
+          <p:cNvSpPr/>
+          <p:nvPr/>
+        </p:nvSpPr>
+        <p:spPr>
+          <a:xfrm>
+            <a:off x="449710" y="2850343"/>
+            <a:ext cx="2075265" cy="523240"/>
+          </a:xfrm>
+          <a:prstGeom prst="roundRect">
+            <a:avLst>
+              <a:gd name="adj" fmla="val 11400"/>
+            </a:avLst>
+          </a:prstGeom>
+          <a:solidFill>
+            <a:schemeClr val="bg1"/>
+          </a:solidFill>
+          <a:ln>
+            <a:solidFill>
+              <a:schemeClr val="tx1"/>
+            </a:solidFill>
+          </a:ln>
+        </p:spPr>
+        <p:style>
+          <a:lnRef idx="2">
+            <a:schemeClr val="accent1">
+              <a:shade val="50000"/>
+            </a:schemeClr>
+          </a:lnRef>
+          <a:fillRef idx="1">
+            <a:schemeClr val="accent1"/>
+          </a:fillRef>
+          <a:effectRef idx="0">
+            <a:schemeClr val="accent1"/>
+          </a:effectRef>
+          <a:fontRef idx="minor">
+            <a:schemeClr val="lt1"/>
+          </a:fontRef>
+        </p:style>
+        <p:txBody>
+          <a:bodyPr rtlCol="0" anchor="ctr"/>
+          <a:lstStyle/>
+          <a:p>
+            <a:r>
+              <a:rPr lang="en-US" sz="2000" dirty="0">
+                <a:solidFill>
+                  <a:schemeClr val="bg1">
+                    <a:lumMod val="65000"/>
+                  </a:schemeClr>
+                </a:solidFill>
+              </a:rPr>
+              <a:t>Hot or Cold</a:t>
+            </a:r>
+            <a:endParaRPr lang="LID4096" sz="2000" dirty="0">
+              <a:solidFill>
+                <a:schemeClr val="bg1">
+                  <a:lumMod val="65000"/>
+                </a:schemeClr>
+              </a:solidFill>
+            </a:endParaRPr>
+          </a:p>
+        </p:txBody>
+      </p:sp>
+      <p:sp>
+        <p:nvSpPr>
+          <p:cNvPr id="15" name="Isosceles Triangle 14">
+            <a:extLst>
+              <a:ext uri="{FF2B5EF4-FFF2-40B4-BE49-F238E27FC236}">
+                <a16:creationId xmlns:a16="http://schemas.microsoft.com/office/drawing/2014/main" id="{13E6E3DD-DFF9-49A4-9E52-39FC72630958}"/>
+              </a:ext>
+            </a:extLst>
+          </p:cNvPr>
+          <p:cNvSpPr/>
+          <p:nvPr/>
+        </p:nvSpPr>
+        <p:spPr>
+          <a:xfrm rot="10800000">
+            <a:off x="2281905" y="1088848"/>
+            <a:ext cx="142293" cy="92658"/>
+          </a:xfrm>
+          <a:prstGeom prst="triangle">
+            <a:avLst/>
+          </a:prstGeom>
+          <a:solidFill>
+            <a:schemeClr val="tx1"/>
+          </a:solidFill>
+        </p:spPr>
+        <p:style>
+          <a:lnRef idx="2">
+            <a:schemeClr val="accent1">
+              <a:shade val="50000"/>
+            </a:schemeClr>
+          </a:lnRef>
+          <a:fillRef idx="1">
+            <a:schemeClr val="accent1"/>
+          </a:fillRef>
+          <a:effectRef idx="0">
+            <a:schemeClr val="accent1"/>
+          </a:effectRef>
+          <a:fontRef idx="minor">
+            <a:schemeClr val="lt1"/>
+          </a:fontRef>
+        </p:style>
+        <p:txBody>
+          <a:bodyPr rtlCol="0" anchor="ctr"/>
+          <a:lstStyle/>
+          <a:p>
+            <a:pPr algn="ctr"/>
+            <a:endParaRPr lang="LID4096"/>
+          </a:p>
+        </p:txBody>
+      </p:sp>
+      <p:sp>
+        <p:nvSpPr>
+          <p:cNvPr id="16" name="Isosceles Triangle 15">
+            <a:extLst>
+              <a:ext uri="{FF2B5EF4-FFF2-40B4-BE49-F238E27FC236}">
+                <a16:creationId xmlns:a16="http://schemas.microsoft.com/office/drawing/2014/main" id="{86EE309D-D885-4ADC-A817-7330CE5D33F4}"/>
+              </a:ext>
+            </a:extLst>
+          </p:cNvPr>
+          <p:cNvSpPr/>
+          <p:nvPr/>
+        </p:nvSpPr>
+        <p:spPr>
+          <a:xfrm rot="10800000">
+            <a:off x="2281906" y="1738959"/>
+            <a:ext cx="142293" cy="92658"/>
+          </a:xfrm>
+          <a:prstGeom prst="triangle">
+            <a:avLst/>
+          </a:prstGeom>
+          <a:solidFill>
+            <a:schemeClr val="tx1"/>
+          </a:solidFill>
+        </p:spPr>
+        <p:style>
+          <a:lnRef idx="2">
+            <a:schemeClr val="accent1">
+              <a:shade val="50000"/>
+            </a:schemeClr>
+          </a:lnRef>
+          <a:fillRef idx="1">
+            <a:schemeClr val="accent1"/>
+          </a:fillRef>
+          <a:effectRef idx="0">
+            <a:schemeClr val="accent1"/>
+          </a:effectRef>
+          <a:fontRef idx="minor">
+            <a:schemeClr val="lt1"/>
+          </a:fontRef>
+        </p:style>
+        <p:txBody>
+          <a:bodyPr rtlCol="0" anchor="ctr"/>
+          <a:lstStyle/>
+          <a:p>
+            <a:pPr algn="ctr"/>
+            <a:endParaRPr lang="LID4096"/>
+          </a:p>
+        </p:txBody>
+      </p:sp>
+      <p:sp>
+        <p:nvSpPr>
+          <p:cNvPr id="17" name="Isosceles Triangle 16">
+            <a:extLst>
+              <a:ext uri="{FF2B5EF4-FFF2-40B4-BE49-F238E27FC236}">
+                <a16:creationId xmlns:a16="http://schemas.microsoft.com/office/drawing/2014/main" id="{FF60BFF8-8DEB-42FC-B3BE-0B68AC77397D}"/>
+              </a:ext>
+            </a:extLst>
+          </p:cNvPr>
+          <p:cNvSpPr/>
+          <p:nvPr/>
+        </p:nvSpPr>
+        <p:spPr>
+          <a:xfrm rot="10800000">
+            <a:off x="2281906" y="2394386"/>
+            <a:ext cx="142293" cy="92658"/>
+          </a:xfrm>
+          <a:prstGeom prst="triangle">
+            <a:avLst/>
+          </a:prstGeom>
+          <a:solidFill>
+            <a:schemeClr val="tx1"/>
+          </a:solidFill>
+        </p:spPr>
+        <p:style>
+          <a:lnRef idx="2">
+            <a:schemeClr val="accent1">
+              <a:shade val="50000"/>
+            </a:schemeClr>
+          </a:lnRef>
+          <a:fillRef idx="1">
+            <a:schemeClr val="accent1"/>
+          </a:fillRef>
+          <a:effectRef idx="0">
+            <a:schemeClr val="accent1"/>
+          </a:effectRef>
+          <a:fontRef idx="minor">
+            <a:schemeClr val="lt1"/>
+          </a:fontRef>
+        </p:style>
+        <p:txBody>
+          <a:bodyPr rtlCol="0" anchor="ctr"/>
+          <a:lstStyle/>
+          <a:p>
+            <a:pPr algn="ctr"/>
+            <a:endParaRPr lang="LID4096"/>
+          </a:p>
+        </p:txBody>
+      </p:sp>
+      <p:sp>
+        <p:nvSpPr>
+          <p:cNvPr id="18" name="Isosceles Triangle 17">
+            <a:extLst>
+              <a:ext uri="{FF2B5EF4-FFF2-40B4-BE49-F238E27FC236}">
+                <a16:creationId xmlns:a16="http://schemas.microsoft.com/office/drawing/2014/main" id="{1D7D370B-69B1-413B-9A9C-9F48ECDE4B72}"/>
+              </a:ext>
+            </a:extLst>
+          </p:cNvPr>
+          <p:cNvSpPr/>
+          <p:nvPr/>
+        </p:nvSpPr>
+        <p:spPr>
+          <a:xfrm rot="10800000">
+            <a:off x="2281906" y="3065634"/>
+            <a:ext cx="142293" cy="92658"/>
+          </a:xfrm>
+          <a:prstGeom prst="triangle">
+            <a:avLst/>
+          </a:prstGeom>
+          <a:solidFill>
+            <a:schemeClr val="tx1"/>
+          </a:solidFill>
+        </p:spPr>
+        <p:style>
+          <a:lnRef idx="2">
+            <a:schemeClr val="accent1">
+              <a:shade val="50000"/>
+            </a:schemeClr>
+          </a:lnRef>
+          <a:fillRef idx="1">
+            <a:schemeClr val="accent1"/>
+          </a:fillRef>
+          <a:effectRef idx="0">
+            <a:schemeClr val="accent1"/>
+          </a:effectRef>
+          <a:fontRef idx="minor">
+            <a:schemeClr val="lt1"/>
+          </a:fontRef>
+        </p:style>
+        <p:txBody>
+          <a:bodyPr rtlCol="0" anchor="ctr"/>
+          <a:lstStyle/>
+          <a:p>
+            <a:pPr algn="ctr"/>
+            <a:endParaRPr lang="LID4096"/>
+          </a:p>
+        </p:txBody>
+      </p:sp>
+    </p:spTree>
+    <p:extLst>
+      <p:ext uri="{BB962C8B-B14F-4D97-AF65-F5344CB8AC3E}">
+        <p14:creationId xmlns:p14="http://schemas.microsoft.com/office/powerpoint/2010/main" val="931832636"/>
       </p:ext>
     </p:extLst>
   </p:cSld>

</xml_diff>

<commit_message>
changed open and closing of sidebars, added logo to left sidebar, changed fonts used by body
</commit_message>
<xml_diff>
--- a/WhaToEat Concept.pptx
+++ b/WhaToEat Concept.pptx
@@ -9,6 +9,7 @@
     <p:sldId id="257" r:id="rId3"/>
     <p:sldId id="258" r:id="rId4"/>
     <p:sldId id="259" r:id="rId5"/>
+    <p:sldId id="260" r:id="rId6"/>
   </p:sldIdLst>
   <p:sldSz cx="12192000" cy="6858000"/>
   <p:notesSz cx="6858000" cy="9144000"/>
@@ -118,7 +119,7 @@
 <file path=ppt/revisionInfo.xml><?xml version="1.0" encoding="utf-8"?>
 <p1510:revInfo xmlns:a="http://schemas.openxmlformats.org/drawingml/2006/main" xmlns:r="http://schemas.openxmlformats.org/officeDocument/2006/relationships" xmlns:p1510="http://schemas.microsoft.com/office/powerpoint/2015/10/main">
   <p1510:revLst>
-    <p1510:client id="{1D4EBB90-F4CA-4268-AC5D-BBFB91B491A4}" v="6" dt="2022-03-25T16:28:34.840"/>
+    <p1510:client id="{1D4EBB90-F4CA-4268-AC5D-BBFB91B491A4}" v="12" dt="2022-04-10T13:26:00.478"/>
   </p1510:revLst>
 </p1510:revInfo>
 </file>
@@ -128,7 +129,7 @@
   <pc:docChgLst>
     <pc:chgData name="Zephyr Tay" userId="58c7b28099c6babd" providerId="LiveId" clId="{1D4EBB90-F4CA-4268-AC5D-BBFB91B491A4}"/>
     <pc:docChg chg="undo custSel addSld modSld">
-      <pc:chgData name="Zephyr Tay" userId="58c7b28099c6babd" providerId="LiveId" clId="{1D4EBB90-F4CA-4268-AC5D-BBFB91B491A4}" dt="2022-03-25T16:28:39.547" v="19" actId="14100"/>
+      <pc:chgData name="Zephyr Tay" userId="58c7b28099c6babd" providerId="LiveId" clId="{1D4EBB90-F4CA-4268-AC5D-BBFB91B491A4}" dt="2022-04-10T13:26:00.478" v="92" actId="164"/>
       <pc:docMkLst>
         <pc:docMk/>
       </pc:docMkLst>
@@ -306,6 +307,213 @@
           </ac:cxnSpMkLst>
         </pc:cxnChg>
       </pc:sldChg>
+      <pc:sldChg chg="addSp delSp modSp new mod">
+        <pc:chgData name="Zephyr Tay" userId="58c7b28099c6babd" providerId="LiveId" clId="{1D4EBB90-F4CA-4268-AC5D-BBFB91B491A4}" dt="2022-04-10T13:26:00.478" v="92" actId="164"/>
+        <pc:sldMkLst>
+          <pc:docMk/>
+          <pc:sldMk cId="2877060498" sldId="260"/>
+        </pc:sldMkLst>
+        <pc:spChg chg="del mod">
+          <ac:chgData name="Zephyr Tay" userId="58c7b28099c6babd" providerId="LiveId" clId="{1D4EBB90-F4CA-4268-AC5D-BBFB91B491A4}" dt="2022-04-10T13:24:21.105" v="72" actId="478"/>
+          <ac:spMkLst>
+            <pc:docMk/>
+            <pc:sldMk cId="2877060498" sldId="260"/>
+            <ac:spMk id="2" creationId="{AC6CC5BB-7059-4AC0-B9F9-6F6A59B305AC}"/>
+          </ac:spMkLst>
+        </pc:spChg>
+        <pc:spChg chg="del">
+          <ac:chgData name="Zephyr Tay" userId="58c7b28099c6babd" providerId="LiveId" clId="{1D4EBB90-F4CA-4268-AC5D-BBFB91B491A4}" dt="2022-04-10T13:11:39.290" v="29" actId="478"/>
+          <ac:spMkLst>
+            <pc:docMk/>
+            <pc:sldMk cId="2877060498" sldId="260"/>
+            <ac:spMk id="3" creationId="{4057F319-D7D0-401C-AADB-DF10DEED83A2}"/>
+          </ac:spMkLst>
+        </pc:spChg>
+        <pc:spChg chg="add mod">
+          <ac:chgData name="Zephyr Tay" userId="58c7b28099c6babd" providerId="LiveId" clId="{1D4EBB90-F4CA-4268-AC5D-BBFB91B491A4}" dt="2022-04-10T13:26:00.478" v="92" actId="164"/>
+          <ac:spMkLst>
+            <pc:docMk/>
+            <pc:sldMk cId="2877060498" sldId="260"/>
+            <ac:spMk id="3" creationId="{EA4CDE6C-54CD-4429-AF03-253EA66A1CE9}"/>
+          </ac:spMkLst>
+        </pc:spChg>
+        <pc:spChg chg="mod">
+          <ac:chgData name="Zephyr Tay" userId="58c7b28099c6babd" providerId="LiveId" clId="{1D4EBB90-F4CA-4268-AC5D-BBFB91B491A4}" dt="2022-04-10T13:25:34.857" v="91" actId="164"/>
+          <ac:spMkLst>
+            <pc:docMk/>
+            <pc:sldMk cId="2877060498" sldId="260"/>
+            <ac:spMk id="5" creationId="{55E1048D-FC3C-4015-B82A-AD89B91E62F1}"/>
+          </ac:spMkLst>
+        </pc:spChg>
+        <pc:spChg chg="mod">
+          <ac:chgData name="Zephyr Tay" userId="58c7b28099c6babd" providerId="LiveId" clId="{1D4EBB90-F4CA-4268-AC5D-BBFB91B491A4}" dt="2022-04-10T13:25:34.857" v="91" actId="164"/>
+          <ac:spMkLst>
+            <pc:docMk/>
+            <pc:sldMk cId="2877060498" sldId="260"/>
+            <ac:spMk id="6" creationId="{9AE37522-6F3C-4F42-8F04-60016D999167}"/>
+          </ac:spMkLst>
+        </pc:spChg>
+        <pc:spChg chg="mod">
+          <ac:chgData name="Zephyr Tay" userId="58c7b28099c6babd" providerId="LiveId" clId="{1D4EBB90-F4CA-4268-AC5D-BBFB91B491A4}" dt="2022-04-10T13:25:34.857" v="91" actId="164"/>
+          <ac:spMkLst>
+            <pc:docMk/>
+            <pc:sldMk cId="2877060498" sldId="260"/>
+            <ac:spMk id="7" creationId="{8EBC48F4-A834-4B16-B48D-3FB31A7BB3C1}"/>
+          </ac:spMkLst>
+        </pc:spChg>
+        <pc:spChg chg="mod">
+          <ac:chgData name="Zephyr Tay" userId="58c7b28099c6babd" providerId="LiveId" clId="{1D4EBB90-F4CA-4268-AC5D-BBFB91B491A4}" dt="2022-04-10T13:25:34.857" v="91" actId="164"/>
+          <ac:spMkLst>
+            <pc:docMk/>
+            <pc:sldMk cId="2877060498" sldId="260"/>
+            <ac:spMk id="8" creationId="{B316D677-A372-4D6E-B735-EB22BBF16E12}"/>
+          </ac:spMkLst>
+        </pc:spChg>
+        <pc:spChg chg="mod">
+          <ac:chgData name="Zephyr Tay" userId="58c7b28099c6babd" providerId="LiveId" clId="{1D4EBB90-F4CA-4268-AC5D-BBFB91B491A4}" dt="2022-04-10T13:25:34.857" v="91" actId="164"/>
+          <ac:spMkLst>
+            <pc:docMk/>
+            <pc:sldMk cId="2877060498" sldId="260"/>
+            <ac:spMk id="11" creationId="{3913C00B-83EB-47AD-B8A2-DF0D563BF220}"/>
+          </ac:spMkLst>
+        </pc:spChg>
+        <pc:spChg chg="mod">
+          <ac:chgData name="Zephyr Tay" userId="58c7b28099c6babd" providerId="LiveId" clId="{1D4EBB90-F4CA-4268-AC5D-BBFB91B491A4}" dt="2022-04-10T13:25:34.857" v="91" actId="164"/>
+          <ac:spMkLst>
+            <pc:docMk/>
+            <pc:sldMk cId="2877060498" sldId="260"/>
+            <ac:spMk id="12" creationId="{C6DD215C-687D-42FD-95E4-0E6E1A3EA882}"/>
+          </ac:spMkLst>
+        </pc:spChg>
+        <pc:spChg chg="mod">
+          <ac:chgData name="Zephyr Tay" userId="58c7b28099c6babd" providerId="LiveId" clId="{1D4EBB90-F4CA-4268-AC5D-BBFB91B491A4}" dt="2022-04-10T13:25:34.857" v="91" actId="164"/>
+          <ac:spMkLst>
+            <pc:docMk/>
+            <pc:sldMk cId="2877060498" sldId="260"/>
+            <ac:spMk id="13" creationId="{6AA834D6-AA7E-49DF-9C00-F391E1D97C7E}"/>
+          </ac:spMkLst>
+        </pc:spChg>
+        <pc:spChg chg="mod">
+          <ac:chgData name="Zephyr Tay" userId="58c7b28099c6babd" providerId="LiveId" clId="{1D4EBB90-F4CA-4268-AC5D-BBFB91B491A4}" dt="2022-04-10T13:25:34.857" v="91" actId="164"/>
+          <ac:spMkLst>
+            <pc:docMk/>
+            <pc:sldMk cId="2877060498" sldId="260"/>
+            <ac:spMk id="16" creationId="{C2192827-509A-4D02-95E7-2C788E9B89BF}"/>
+          </ac:spMkLst>
+        </pc:spChg>
+        <pc:spChg chg="mod">
+          <ac:chgData name="Zephyr Tay" userId="58c7b28099c6babd" providerId="LiveId" clId="{1D4EBB90-F4CA-4268-AC5D-BBFB91B491A4}" dt="2022-04-10T13:25:34.857" v="91" actId="164"/>
+          <ac:spMkLst>
+            <pc:docMk/>
+            <pc:sldMk cId="2877060498" sldId="260"/>
+            <ac:spMk id="17" creationId="{8F1C702F-22CB-4E26-80CA-1673BB8C97BB}"/>
+          </ac:spMkLst>
+        </pc:spChg>
+        <pc:spChg chg="mod">
+          <ac:chgData name="Zephyr Tay" userId="58c7b28099c6babd" providerId="LiveId" clId="{1D4EBB90-F4CA-4268-AC5D-BBFB91B491A4}" dt="2022-04-10T13:25:34.857" v="91" actId="164"/>
+          <ac:spMkLst>
+            <pc:docMk/>
+            <pc:sldMk cId="2877060498" sldId="260"/>
+            <ac:spMk id="18" creationId="{2323797F-0CFA-4F7C-BC48-DE5BFFA2427D}"/>
+          </ac:spMkLst>
+        </pc:spChg>
+        <pc:spChg chg="mod">
+          <ac:chgData name="Zephyr Tay" userId="58c7b28099c6babd" providerId="LiveId" clId="{1D4EBB90-F4CA-4268-AC5D-BBFB91B491A4}" dt="2022-04-10T13:25:34.857" v="91" actId="164"/>
+          <ac:spMkLst>
+            <pc:docMk/>
+            <pc:sldMk cId="2877060498" sldId="260"/>
+            <ac:spMk id="19" creationId="{433A8925-06C1-4261-95C0-449A655C5427}"/>
+          </ac:spMkLst>
+        </pc:spChg>
+        <pc:spChg chg="mod">
+          <ac:chgData name="Zephyr Tay" userId="58c7b28099c6babd" providerId="LiveId" clId="{1D4EBB90-F4CA-4268-AC5D-BBFB91B491A4}" dt="2022-04-10T13:25:34.857" v="91" actId="164"/>
+          <ac:spMkLst>
+            <pc:docMk/>
+            <pc:sldMk cId="2877060498" sldId="260"/>
+            <ac:spMk id="20" creationId="{0761F922-46A2-4494-A023-0C2B1A6BFAF9}"/>
+          </ac:spMkLst>
+        </pc:spChg>
+        <pc:spChg chg="mod">
+          <ac:chgData name="Zephyr Tay" userId="58c7b28099c6babd" providerId="LiveId" clId="{1D4EBB90-F4CA-4268-AC5D-BBFB91B491A4}" dt="2022-04-10T13:25:34.857" v="91" actId="164"/>
+          <ac:spMkLst>
+            <pc:docMk/>
+            <pc:sldMk cId="2877060498" sldId="260"/>
+            <ac:spMk id="21" creationId="{AB0C96EA-B728-416B-9758-29CEC6C0D4B3}"/>
+          </ac:spMkLst>
+        </pc:spChg>
+        <pc:spChg chg="mod">
+          <ac:chgData name="Zephyr Tay" userId="58c7b28099c6babd" providerId="LiveId" clId="{1D4EBB90-F4CA-4268-AC5D-BBFB91B491A4}" dt="2022-04-10T13:25:34.857" v="91" actId="164"/>
+          <ac:spMkLst>
+            <pc:docMk/>
+            <pc:sldMk cId="2877060498" sldId="260"/>
+            <ac:spMk id="22" creationId="{2F0A605E-9CCC-4EA6-BD23-80C0BB94BA6F}"/>
+          </ac:spMkLst>
+        </pc:spChg>
+        <pc:spChg chg="add del mod">
+          <ac:chgData name="Zephyr Tay" userId="58c7b28099c6babd" providerId="LiveId" clId="{1D4EBB90-F4CA-4268-AC5D-BBFB91B491A4}" dt="2022-04-10T13:24:22.793" v="73" actId="478"/>
+          <ac:spMkLst>
+            <pc:docMk/>
+            <pc:sldMk cId="2877060498" sldId="260"/>
+            <ac:spMk id="24" creationId="{776D0B98-A2F5-4964-8CEB-F04D2062470F}"/>
+          </ac:spMkLst>
+        </pc:spChg>
+        <pc:grpChg chg="add mod">
+          <ac:chgData name="Zephyr Tay" userId="58c7b28099c6babd" providerId="LiveId" clId="{1D4EBB90-F4CA-4268-AC5D-BBFB91B491A4}" dt="2022-04-10T13:26:00.478" v="92" actId="164"/>
+          <ac:grpSpMkLst>
+            <pc:docMk/>
+            <pc:sldMk cId="2877060498" sldId="260"/>
+            <ac:grpSpMk id="4" creationId="{EADEA9CF-517C-406D-801A-2B42E5D54964}"/>
+          </ac:grpSpMkLst>
+        </pc:grpChg>
+        <pc:grpChg chg="mod">
+          <ac:chgData name="Zephyr Tay" userId="58c7b28099c6babd" providerId="LiveId" clId="{1D4EBB90-F4CA-4268-AC5D-BBFB91B491A4}" dt="2022-04-10T13:25:34.857" v="91" actId="164"/>
+          <ac:grpSpMkLst>
+            <pc:docMk/>
+            <pc:sldMk cId="2877060498" sldId="260"/>
+            <ac:grpSpMk id="9" creationId="{C5937E39-0EA2-47B3-8595-106332142919}"/>
+          </ac:grpSpMkLst>
+        </pc:grpChg>
+        <pc:grpChg chg="mod">
+          <ac:chgData name="Zephyr Tay" userId="58c7b28099c6babd" providerId="LiveId" clId="{1D4EBB90-F4CA-4268-AC5D-BBFB91B491A4}" dt="2022-04-10T13:25:34.857" v="91" actId="164"/>
+          <ac:grpSpMkLst>
+            <pc:docMk/>
+            <pc:sldMk cId="2877060498" sldId="260"/>
+            <ac:grpSpMk id="10" creationId="{37DA398B-0A13-41B6-8C40-B5EAD7BF7757}"/>
+          </ac:grpSpMkLst>
+        </pc:grpChg>
+        <pc:grpChg chg="mod">
+          <ac:chgData name="Zephyr Tay" userId="58c7b28099c6babd" providerId="LiveId" clId="{1D4EBB90-F4CA-4268-AC5D-BBFB91B491A4}" dt="2022-04-10T13:25:34.857" v="91" actId="164"/>
+          <ac:grpSpMkLst>
+            <pc:docMk/>
+            <pc:sldMk cId="2877060498" sldId="260"/>
+            <ac:grpSpMk id="14" creationId="{74AD9CC1-D223-4619-B665-B615ECE10661}"/>
+          </ac:grpSpMkLst>
+        </pc:grpChg>
+        <pc:grpChg chg="mod">
+          <ac:chgData name="Zephyr Tay" userId="58c7b28099c6babd" providerId="LiveId" clId="{1D4EBB90-F4CA-4268-AC5D-BBFB91B491A4}" dt="2022-04-10T13:25:34.857" v="91" actId="164"/>
+          <ac:grpSpMkLst>
+            <pc:docMk/>
+            <pc:sldMk cId="2877060498" sldId="260"/>
+            <ac:grpSpMk id="15" creationId="{2B7E2776-C4EF-45DF-869A-EF81D99A5B2E}"/>
+          </ac:grpSpMkLst>
+        </pc:grpChg>
+        <pc:grpChg chg="add mod">
+          <ac:chgData name="Zephyr Tay" userId="58c7b28099c6babd" providerId="LiveId" clId="{1D4EBB90-F4CA-4268-AC5D-BBFB91B491A4}" dt="2022-04-10T13:25:34.857" v="91" actId="164"/>
+          <ac:grpSpMkLst>
+            <pc:docMk/>
+            <pc:sldMk cId="2877060498" sldId="260"/>
+            <ac:grpSpMk id="25" creationId="{5E5B6E8A-288B-4095-96C2-F8CE7451A46F}"/>
+          </ac:grpSpMkLst>
+        </pc:grpChg>
+        <pc:grpChg chg="add mod">
+          <ac:chgData name="Zephyr Tay" userId="58c7b28099c6babd" providerId="LiveId" clId="{1D4EBB90-F4CA-4268-AC5D-BBFB91B491A4}" dt="2022-04-10T13:26:00.478" v="92" actId="164"/>
+          <ac:grpSpMkLst>
+            <pc:docMk/>
+            <pc:sldMk cId="2877060498" sldId="260"/>
+            <ac:grpSpMk id="26" creationId="{D532645E-419A-47F9-9039-2B8DF49FF87B}"/>
+          </ac:grpSpMkLst>
+        </pc:grpChg>
+      </pc:sldChg>
     </pc:docChg>
   </pc:docChgLst>
 </pc:chgInfo>
@@ -460,7 +668,7 @@
           <a:p>
             <a:fld id="{51803F4B-9C4D-4BE8-8CC0-3C3D11FC2AA4}" type="datetimeFigureOut">
               <a:rPr lang="LID4096" smtClean="0"/>
-              <a:t>03/26/2022</a:t>
+              <a:t>04/10/2022</a:t>
             </a:fld>
             <a:endParaRPr lang="LID4096"/>
           </a:p>
@@ -660,7 +868,7 @@
           <a:p>
             <a:fld id="{51803F4B-9C4D-4BE8-8CC0-3C3D11FC2AA4}" type="datetimeFigureOut">
               <a:rPr lang="LID4096" smtClean="0"/>
-              <a:t>03/26/2022</a:t>
+              <a:t>04/10/2022</a:t>
             </a:fld>
             <a:endParaRPr lang="LID4096"/>
           </a:p>
@@ -870,7 +1078,7 @@
           <a:p>
             <a:fld id="{51803F4B-9C4D-4BE8-8CC0-3C3D11FC2AA4}" type="datetimeFigureOut">
               <a:rPr lang="LID4096" smtClean="0"/>
-              <a:t>03/26/2022</a:t>
+              <a:t>04/10/2022</a:t>
             </a:fld>
             <a:endParaRPr lang="LID4096"/>
           </a:p>
@@ -1070,7 +1278,7 @@
           <a:p>
             <a:fld id="{51803F4B-9C4D-4BE8-8CC0-3C3D11FC2AA4}" type="datetimeFigureOut">
               <a:rPr lang="LID4096" smtClean="0"/>
-              <a:t>03/26/2022</a:t>
+              <a:t>04/10/2022</a:t>
             </a:fld>
             <a:endParaRPr lang="LID4096"/>
           </a:p>
@@ -1346,7 +1554,7 @@
           <a:p>
             <a:fld id="{51803F4B-9C4D-4BE8-8CC0-3C3D11FC2AA4}" type="datetimeFigureOut">
               <a:rPr lang="LID4096" smtClean="0"/>
-              <a:t>03/26/2022</a:t>
+              <a:t>04/10/2022</a:t>
             </a:fld>
             <a:endParaRPr lang="LID4096"/>
           </a:p>
@@ -1614,7 +1822,7 @@
           <a:p>
             <a:fld id="{51803F4B-9C4D-4BE8-8CC0-3C3D11FC2AA4}" type="datetimeFigureOut">
               <a:rPr lang="LID4096" smtClean="0"/>
-              <a:t>03/26/2022</a:t>
+              <a:t>04/10/2022</a:t>
             </a:fld>
             <a:endParaRPr lang="LID4096"/>
           </a:p>
@@ -2029,7 +2237,7 @@
           <a:p>
             <a:fld id="{51803F4B-9C4D-4BE8-8CC0-3C3D11FC2AA4}" type="datetimeFigureOut">
               <a:rPr lang="LID4096" smtClean="0"/>
-              <a:t>03/26/2022</a:t>
+              <a:t>04/10/2022</a:t>
             </a:fld>
             <a:endParaRPr lang="LID4096"/>
           </a:p>
@@ -2171,7 +2379,7 @@
           <a:p>
             <a:fld id="{51803F4B-9C4D-4BE8-8CC0-3C3D11FC2AA4}" type="datetimeFigureOut">
               <a:rPr lang="LID4096" smtClean="0"/>
-              <a:t>03/26/2022</a:t>
+              <a:t>04/10/2022</a:t>
             </a:fld>
             <a:endParaRPr lang="LID4096"/>
           </a:p>
@@ -2284,7 +2492,7 @@
           <a:p>
             <a:fld id="{51803F4B-9C4D-4BE8-8CC0-3C3D11FC2AA4}" type="datetimeFigureOut">
               <a:rPr lang="LID4096" smtClean="0"/>
-              <a:t>03/26/2022</a:t>
+              <a:t>04/10/2022</a:t>
             </a:fld>
             <a:endParaRPr lang="LID4096"/>
           </a:p>
@@ -2597,7 +2805,7 @@
           <a:p>
             <a:fld id="{51803F4B-9C4D-4BE8-8CC0-3C3D11FC2AA4}" type="datetimeFigureOut">
               <a:rPr lang="LID4096" smtClean="0"/>
-              <a:t>03/26/2022</a:t>
+              <a:t>04/10/2022</a:t>
             </a:fld>
             <a:endParaRPr lang="LID4096"/>
           </a:p>
@@ -2886,7 +3094,7 @@
           <a:p>
             <a:fld id="{51803F4B-9C4D-4BE8-8CC0-3C3D11FC2AA4}" type="datetimeFigureOut">
               <a:rPr lang="LID4096" smtClean="0"/>
-              <a:t>03/26/2022</a:t>
+              <a:t>04/10/2022</a:t>
             </a:fld>
             <a:endParaRPr lang="LID4096"/>
           </a:p>
@@ -3129,7 +3337,7 @@
           <a:p>
             <a:fld id="{51803F4B-9C4D-4BE8-8CC0-3C3D11FC2AA4}" type="datetimeFigureOut">
               <a:rPr lang="LID4096" smtClean="0"/>
-              <a:t>03/26/2022</a:t>
+              <a:t>04/10/2022</a:t>
             </a:fld>
             <a:endParaRPr lang="LID4096"/>
           </a:p>
@@ -6097,6 +6305,954 @@
 </p:sld>
 </file>
 
+<file path=ppt/slides/slide5.xml><?xml version="1.0" encoding="utf-8"?>
+<p:sld xmlns:a="http://schemas.openxmlformats.org/drawingml/2006/main" xmlns:r="http://schemas.openxmlformats.org/officeDocument/2006/relationships" xmlns:p="http://schemas.openxmlformats.org/presentationml/2006/main">
+  <p:cSld>
+    <p:spTree>
+      <p:nvGrpSpPr>
+        <p:cNvPr id="1" name=""/>
+        <p:cNvGrpSpPr/>
+        <p:nvPr/>
+      </p:nvGrpSpPr>
+      <p:grpSpPr>
+        <a:xfrm>
+          <a:off x="0" y="0"/>
+          <a:ext cx="0" cy="0"/>
+          <a:chOff x="0" y="0"/>
+          <a:chExt cx="0" cy="0"/>
+        </a:xfrm>
+      </p:grpSpPr>
+      <p:grpSp>
+        <p:nvGrpSpPr>
+          <p:cNvPr id="26" name="Group 25">
+            <a:extLst>
+              <a:ext uri="{FF2B5EF4-FFF2-40B4-BE49-F238E27FC236}">
+                <a16:creationId xmlns:a16="http://schemas.microsoft.com/office/drawing/2014/main" id="{D532645E-419A-47F9-9039-2B8DF49FF87B}"/>
+              </a:ext>
+            </a:extLst>
+          </p:cNvPr>
+          <p:cNvGrpSpPr/>
+          <p:nvPr/>
+        </p:nvGrpSpPr>
+        <p:grpSpPr>
+          <a:xfrm>
+            <a:off x="1223931" y="2197849"/>
+            <a:ext cx="10319985" cy="2317001"/>
+            <a:chOff x="1223931" y="2197849"/>
+            <a:chExt cx="10319985" cy="2317001"/>
+          </a:xfrm>
+        </p:grpSpPr>
+        <p:grpSp>
+          <p:nvGrpSpPr>
+            <p:cNvPr id="4" name="Group 3">
+              <a:extLst>
+                <a:ext uri="{FF2B5EF4-FFF2-40B4-BE49-F238E27FC236}">
+                  <a16:creationId xmlns:a16="http://schemas.microsoft.com/office/drawing/2014/main" id="{EADEA9CF-517C-406D-801A-2B42E5D54964}"/>
+                </a:ext>
+              </a:extLst>
+            </p:cNvPr>
+            <p:cNvGrpSpPr/>
+            <p:nvPr/>
+          </p:nvGrpSpPr>
+          <p:grpSpPr>
+            <a:xfrm>
+              <a:off x="1223931" y="2197849"/>
+              <a:ext cx="2979956" cy="2317001"/>
+              <a:chOff x="3337262" y="1688099"/>
+              <a:chExt cx="3266211" cy="2539573"/>
+            </a:xfrm>
+          </p:grpSpPr>
+          <p:sp>
+            <p:nvSpPr>
+              <p:cNvPr id="5" name="Rectangle: Rounded Corners 4">
+                <a:extLst>
+                  <a:ext uri="{FF2B5EF4-FFF2-40B4-BE49-F238E27FC236}">
+                    <a16:creationId xmlns:a16="http://schemas.microsoft.com/office/drawing/2014/main" id="{55E1048D-FC3C-4015-B82A-AD89B91E62F1}"/>
+                  </a:ext>
+                </a:extLst>
+              </p:cNvPr>
+              <p:cNvSpPr/>
+              <p:nvPr/>
+            </p:nvSpPr>
+            <p:spPr>
+              <a:xfrm>
+                <a:off x="3536855" y="2173058"/>
+                <a:ext cx="115050" cy="1427933"/>
+              </a:xfrm>
+              <a:prstGeom prst="roundRect">
+                <a:avLst/>
+              </a:prstGeom>
+              <a:solidFill>
+                <a:srgbClr val="4A1D2E"/>
+              </a:solidFill>
+              <a:ln>
+                <a:noFill/>
+              </a:ln>
+            </p:spPr>
+            <p:style>
+              <a:lnRef idx="2">
+                <a:schemeClr val="accent1">
+                  <a:shade val="50000"/>
+                </a:schemeClr>
+              </a:lnRef>
+              <a:fillRef idx="1">
+                <a:schemeClr val="accent1"/>
+              </a:fillRef>
+              <a:effectRef idx="0">
+                <a:schemeClr val="accent1"/>
+              </a:effectRef>
+              <a:fontRef idx="minor">
+                <a:schemeClr val="lt1"/>
+              </a:fontRef>
+            </p:style>
+            <p:txBody>
+              <a:bodyPr rtlCol="0" anchor="ctr"/>
+              <a:lstStyle/>
+              <a:p>
+                <a:pPr algn="ctr"/>
+                <a:endParaRPr lang="en-GB"/>
+              </a:p>
+            </p:txBody>
+          </p:sp>
+          <p:sp>
+            <p:nvSpPr>
+              <p:cNvPr id="6" name="Rectangle: Rounded Corners 5">
+                <a:extLst>
+                  <a:ext uri="{FF2B5EF4-FFF2-40B4-BE49-F238E27FC236}">
+                    <a16:creationId xmlns:a16="http://schemas.microsoft.com/office/drawing/2014/main" id="{9AE37522-6F3C-4F42-8F04-60016D999167}"/>
+                  </a:ext>
+                </a:extLst>
+              </p:cNvPr>
+              <p:cNvSpPr/>
+              <p:nvPr/>
+            </p:nvSpPr>
+            <p:spPr>
+              <a:xfrm rot="5400000">
+                <a:off x="3514284" y="1998517"/>
+                <a:ext cx="160192" cy="509274"/>
+              </a:xfrm>
+              <a:prstGeom prst="roundRect">
+                <a:avLst>
+                  <a:gd name="adj" fmla="val 50000"/>
+                </a:avLst>
+              </a:prstGeom>
+              <a:solidFill>
+                <a:srgbClr val="4A1D2E"/>
+              </a:solidFill>
+              <a:ln>
+                <a:noFill/>
+              </a:ln>
+            </p:spPr>
+            <p:style>
+              <a:lnRef idx="2">
+                <a:schemeClr val="accent1">
+                  <a:shade val="50000"/>
+                </a:schemeClr>
+              </a:lnRef>
+              <a:fillRef idx="1">
+                <a:schemeClr val="accent1"/>
+              </a:fillRef>
+              <a:effectRef idx="0">
+                <a:schemeClr val="accent1"/>
+              </a:effectRef>
+              <a:fontRef idx="minor">
+                <a:schemeClr val="lt1"/>
+              </a:fontRef>
+            </p:style>
+            <p:txBody>
+              <a:bodyPr rtlCol="0" anchor="ctr"/>
+              <a:lstStyle/>
+              <a:p>
+                <a:pPr algn="ctr"/>
+                <a:endParaRPr lang="en-GB"/>
+              </a:p>
+            </p:txBody>
+          </p:sp>
+          <p:sp>
+            <p:nvSpPr>
+              <p:cNvPr id="7" name="Rectangle: Rounded Corners 6">
+                <a:extLst>
+                  <a:ext uri="{FF2B5EF4-FFF2-40B4-BE49-F238E27FC236}">
+                    <a16:creationId xmlns:a16="http://schemas.microsoft.com/office/drawing/2014/main" id="{8EBC48F4-A834-4B16-B48D-3FB31A7BB3C1}"/>
+                  </a:ext>
+                </a:extLst>
+              </p:cNvPr>
+              <p:cNvSpPr/>
+              <p:nvPr/>
+            </p:nvSpPr>
+            <p:spPr>
+              <a:xfrm>
+                <a:off x="3556486" y="1817372"/>
+                <a:ext cx="79971" cy="570389"/>
+              </a:xfrm>
+              <a:prstGeom prst="roundRect">
+                <a:avLst/>
+              </a:prstGeom>
+              <a:solidFill>
+                <a:srgbClr val="4A1D2E"/>
+              </a:solidFill>
+              <a:ln>
+                <a:noFill/>
+              </a:ln>
+            </p:spPr>
+            <p:style>
+              <a:lnRef idx="2">
+                <a:schemeClr val="accent1">
+                  <a:shade val="50000"/>
+                </a:schemeClr>
+              </a:lnRef>
+              <a:fillRef idx="1">
+                <a:schemeClr val="accent1"/>
+              </a:fillRef>
+              <a:effectRef idx="0">
+                <a:schemeClr val="accent1"/>
+              </a:effectRef>
+              <a:fontRef idx="minor">
+                <a:schemeClr val="lt1"/>
+              </a:fontRef>
+            </p:style>
+            <p:txBody>
+              <a:bodyPr rtlCol="0" anchor="ctr"/>
+              <a:lstStyle/>
+              <a:p>
+                <a:pPr algn="ctr"/>
+                <a:endParaRPr lang="en-GB"/>
+              </a:p>
+            </p:txBody>
+          </p:sp>
+          <p:sp>
+            <p:nvSpPr>
+              <p:cNvPr id="8" name="Rectangle: Rounded Corners 7">
+                <a:extLst>
+                  <a:ext uri="{FF2B5EF4-FFF2-40B4-BE49-F238E27FC236}">
+                    <a16:creationId xmlns:a16="http://schemas.microsoft.com/office/drawing/2014/main" id="{B316D677-A372-4D6E-B735-EB22BBF16E12}"/>
+                  </a:ext>
+                </a:extLst>
+              </p:cNvPr>
+              <p:cNvSpPr/>
+              <p:nvPr/>
+            </p:nvSpPr>
+            <p:spPr>
+              <a:xfrm>
+                <a:off x="3337262" y="1817372"/>
+                <a:ext cx="79971" cy="463404"/>
+              </a:xfrm>
+              <a:prstGeom prst="roundRect">
+                <a:avLst/>
+              </a:prstGeom>
+              <a:solidFill>
+                <a:srgbClr val="4A1D2E"/>
+              </a:solidFill>
+              <a:ln>
+                <a:noFill/>
+              </a:ln>
+            </p:spPr>
+            <p:style>
+              <a:lnRef idx="2">
+                <a:schemeClr val="accent1">
+                  <a:shade val="50000"/>
+                </a:schemeClr>
+              </a:lnRef>
+              <a:fillRef idx="1">
+                <a:schemeClr val="accent1"/>
+              </a:fillRef>
+              <a:effectRef idx="0">
+                <a:schemeClr val="accent1"/>
+              </a:effectRef>
+              <a:fontRef idx="minor">
+                <a:schemeClr val="lt1"/>
+              </a:fontRef>
+            </p:style>
+            <p:txBody>
+              <a:bodyPr rtlCol="0" anchor="ctr"/>
+              <a:lstStyle/>
+              <a:p>
+                <a:pPr algn="ctr"/>
+                <a:endParaRPr lang="en-GB"/>
+              </a:p>
+            </p:txBody>
+          </p:sp>
+          <p:grpSp>
+            <p:nvGrpSpPr>
+              <p:cNvPr id="9" name="Group 8">
+                <a:extLst>
+                  <a:ext uri="{FF2B5EF4-FFF2-40B4-BE49-F238E27FC236}">
+                    <a16:creationId xmlns:a16="http://schemas.microsoft.com/office/drawing/2014/main" id="{C5937E39-0EA2-47B3-8595-106332142919}"/>
+                  </a:ext>
+                </a:extLst>
+              </p:cNvPr>
+              <p:cNvGrpSpPr/>
+              <p:nvPr/>
+            </p:nvGrpSpPr>
+            <p:grpSpPr>
+              <a:xfrm>
+                <a:off x="6103631" y="1817372"/>
+                <a:ext cx="499842" cy="1784161"/>
+                <a:chOff x="6103631" y="1817372"/>
+                <a:chExt cx="499842" cy="1784161"/>
+              </a:xfrm>
+            </p:grpSpPr>
+            <p:sp>
+              <p:nvSpPr>
+                <p:cNvPr id="21" name="Oval 20">
+                  <a:extLst>
+                    <a:ext uri="{FF2B5EF4-FFF2-40B4-BE49-F238E27FC236}">
+                      <a16:creationId xmlns:a16="http://schemas.microsoft.com/office/drawing/2014/main" id="{AB0C96EA-B728-416B-9758-29CEC6C0D4B3}"/>
+                    </a:ext>
+                  </a:extLst>
+                </p:cNvPr>
+                <p:cNvSpPr/>
+                <p:nvPr/>
+              </p:nvSpPr>
+              <p:spPr>
+                <a:xfrm>
+                  <a:off x="6103631" y="1817372"/>
+                  <a:ext cx="499842" cy="621584"/>
+                </a:xfrm>
+                <a:prstGeom prst="ellipse">
+                  <a:avLst/>
+                </a:prstGeom>
+                <a:solidFill>
+                  <a:srgbClr val="4A1D2E"/>
+                </a:solidFill>
+                <a:ln>
+                  <a:noFill/>
+                </a:ln>
+              </p:spPr>
+              <p:style>
+                <a:lnRef idx="2">
+                  <a:schemeClr val="accent1">
+                    <a:shade val="50000"/>
+                  </a:schemeClr>
+                </a:lnRef>
+                <a:fillRef idx="1">
+                  <a:schemeClr val="accent1"/>
+                </a:fillRef>
+                <a:effectRef idx="0">
+                  <a:schemeClr val="accent1"/>
+                </a:effectRef>
+                <a:fontRef idx="minor">
+                  <a:schemeClr val="lt1"/>
+                </a:fontRef>
+              </p:style>
+              <p:txBody>
+                <a:bodyPr rtlCol="0" anchor="ctr"/>
+                <a:lstStyle/>
+                <a:p>
+                  <a:pPr algn="ctr"/>
+                  <a:endParaRPr lang="en-GB"/>
+                </a:p>
+              </p:txBody>
+            </p:sp>
+            <p:sp>
+              <p:nvSpPr>
+                <p:cNvPr id="22" name="Rectangle: Rounded Corners 21">
+                  <a:extLst>
+                    <a:ext uri="{FF2B5EF4-FFF2-40B4-BE49-F238E27FC236}">
+                      <a16:creationId xmlns:a16="http://schemas.microsoft.com/office/drawing/2014/main" id="{2F0A605E-9CCC-4EA6-BD23-80C0BB94BA6F}"/>
+                    </a:ext>
+                  </a:extLst>
+                </p:cNvPr>
+                <p:cNvSpPr/>
+                <p:nvPr/>
+              </p:nvSpPr>
+              <p:spPr>
+                <a:xfrm>
+                  <a:off x="6296027" y="2173600"/>
+                  <a:ext cx="115050" cy="1427933"/>
+                </a:xfrm>
+                <a:prstGeom prst="roundRect">
+                  <a:avLst/>
+                </a:prstGeom>
+                <a:solidFill>
+                  <a:srgbClr val="4A1D2E"/>
+                </a:solidFill>
+                <a:ln>
+                  <a:noFill/>
+                </a:ln>
+              </p:spPr>
+              <p:style>
+                <a:lnRef idx="2">
+                  <a:schemeClr val="accent1">
+                    <a:shade val="50000"/>
+                  </a:schemeClr>
+                </a:lnRef>
+                <a:fillRef idx="1">
+                  <a:schemeClr val="accent1"/>
+                </a:fillRef>
+                <a:effectRef idx="0">
+                  <a:schemeClr val="accent1"/>
+                </a:effectRef>
+                <a:fontRef idx="minor">
+                  <a:schemeClr val="lt1"/>
+                </a:fontRef>
+              </p:style>
+              <p:txBody>
+                <a:bodyPr rtlCol="0" anchor="ctr"/>
+                <a:lstStyle/>
+                <a:p>
+                  <a:pPr algn="ctr"/>
+                  <a:endParaRPr lang="en-GB"/>
+                </a:p>
+              </p:txBody>
+            </p:sp>
+          </p:grpSp>
+          <p:grpSp>
+            <p:nvGrpSpPr>
+              <p:cNvPr id="10" name="Group 9">
+                <a:extLst>
+                  <a:ext uri="{FF2B5EF4-FFF2-40B4-BE49-F238E27FC236}">
+                    <a16:creationId xmlns:a16="http://schemas.microsoft.com/office/drawing/2014/main" id="{37DA398B-0A13-41B6-8C40-B5EAD7BF7757}"/>
+                  </a:ext>
+                </a:extLst>
+              </p:cNvPr>
+              <p:cNvGrpSpPr/>
+              <p:nvPr/>
+            </p:nvGrpSpPr>
+            <p:grpSpPr>
+              <a:xfrm>
+                <a:off x="3769046" y="1688099"/>
+                <a:ext cx="2319325" cy="2539573"/>
+                <a:chOff x="3769046" y="1688099"/>
+                <a:chExt cx="2319325" cy="2539573"/>
+              </a:xfrm>
+            </p:grpSpPr>
+            <p:sp>
+              <p:nvSpPr>
+                <p:cNvPr id="11" name="Oval 10">
+                  <a:extLst>
+                    <a:ext uri="{FF2B5EF4-FFF2-40B4-BE49-F238E27FC236}">
+                      <a16:creationId xmlns:a16="http://schemas.microsoft.com/office/drawing/2014/main" id="{3913C00B-83EB-47AD-B8A2-DF0D563BF220}"/>
+                    </a:ext>
+                  </a:extLst>
+                </p:cNvPr>
+                <p:cNvSpPr/>
+                <p:nvPr/>
+              </p:nvSpPr>
+              <p:spPr>
+                <a:xfrm>
+                  <a:off x="4208145" y="2001337"/>
+                  <a:ext cx="1561013" cy="1561013"/>
+                </a:xfrm>
+                <a:prstGeom prst="ellipse">
+                  <a:avLst/>
+                </a:prstGeom>
+                <a:solidFill>
+                  <a:srgbClr val="4A1D2E"/>
+                </a:solidFill>
+                <a:ln>
+                  <a:noFill/>
+                </a:ln>
+              </p:spPr>
+              <p:style>
+                <a:lnRef idx="2">
+                  <a:schemeClr val="accent1">
+                    <a:shade val="50000"/>
+                  </a:schemeClr>
+                </a:lnRef>
+                <a:fillRef idx="1">
+                  <a:schemeClr val="accent1"/>
+                </a:fillRef>
+                <a:effectRef idx="0">
+                  <a:schemeClr val="accent1"/>
+                </a:effectRef>
+                <a:fontRef idx="minor">
+                  <a:schemeClr val="lt1"/>
+                </a:fontRef>
+              </p:style>
+              <p:txBody>
+                <a:bodyPr rtlCol="0" anchor="ctr"/>
+                <a:lstStyle/>
+                <a:p>
+                  <a:pPr algn="ctr"/>
+                  <a:endParaRPr lang="en-GB" dirty="0"/>
+                </a:p>
+              </p:txBody>
+            </p:sp>
+            <p:sp>
+              <p:nvSpPr>
+                <p:cNvPr id="12" name="Circle: Hollow 11">
+                  <a:extLst>
+                    <a:ext uri="{FF2B5EF4-FFF2-40B4-BE49-F238E27FC236}">
+                      <a16:creationId xmlns:a16="http://schemas.microsoft.com/office/drawing/2014/main" id="{C6DD215C-687D-42FD-95E4-0E6E1A3EA882}"/>
+                    </a:ext>
+                  </a:extLst>
+                </p:cNvPr>
+                <p:cNvSpPr/>
+                <p:nvPr/>
+              </p:nvSpPr>
+              <p:spPr>
+                <a:xfrm>
+                  <a:off x="3888930" y="1688099"/>
+                  <a:ext cx="2199441" cy="2187487"/>
+                </a:xfrm>
+                <a:prstGeom prst="donut">
+                  <a:avLst>
+                    <a:gd name="adj" fmla="val 12510"/>
+                  </a:avLst>
+                </a:prstGeom>
+                <a:solidFill>
+                  <a:srgbClr val="4A1D2E"/>
+                </a:solidFill>
+                <a:ln>
+                  <a:noFill/>
+                </a:ln>
+              </p:spPr>
+              <p:style>
+                <a:lnRef idx="2">
+                  <a:schemeClr val="accent1">
+                    <a:shade val="50000"/>
+                  </a:schemeClr>
+                </a:lnRef>
+                <a:fillRef idx="1">
+                  <a:schemeClr val="accent1"/>
+                </a:fillRef>
+                <a:effectRef idx="0">
+                  <a:schemeClr val="accent1"/>
+                </a:effectRef>
+                <a:fontRef idx="minor">
+                  <a:schemeClr val="lt1"/>
+                </a:fontRef>
+              </p:style>
+              <p:txBody>
+                <a:bodyPr rtlCol="0" anchor="ctr"/>
+                <a:lstStyle/>
+                <a:p>
+                  <a:pPr algn="ctr"/>
+                  <a:endParaRPr lang="en-GB" dirty="0">
+                    <a:solidFill>
+                      <a:schemeClr val="tx1"/>
+                    </a:solidFill>
+                  </a:endParaRPr>
+                </a:p>
+              </p:txBody>
+            </p:sp>
+            <p:sp>
+              <p:nvSpPr>
+                <p:cNvPr id="13" name="Rectangle: Rounded Corners 12">
+                  <a:extLst>
+                    <a:ext uri="{FF2B5EF4-FFF2-40B4-BE49-F238E27FC236}">
+                      <a16:creationId xmlns:a16="http://schemas.microsoft.com/office/drawing/2014/main" id="{6AA834D6-AA7E-49DF-9C00-F391E1D97C7E}"/>
+                    </a:ext>
+                  </a:extLst>
+                </p:cNvPr>
+                <p:cNvSpPr/>
+                <p:nvPr/>
+              </p:nvSpPr>
+              <p:spPr>
+                <a:xfrm>
+                  <a:off x="3769046" y="1817372"/>
+                  <a:ext cx="79971" cy="463404"/>
+                </a:xfrm>
+                <a:prstGeom prst="roundRect">
+                  <a:avLst/>
+                </a:prstGeom>
+                <a:solidFill>
+                  <a:srgbClr val="4A1D2E"/>
+                </a:solidFill>
+                <a:ln>
+                  <a:noFill/>
+                </a:ln>
+              </p:spPr>
+              <p:style>
+                <a:lnRef idx="2">
+                  <a:schemeClr val="accent1">
+                    <a:shade val="50000"/>
+                  </a:schemeClr>
+                </a:lnRef>
+                <a:fillRef idx="1">
+                  <a:schemeClr val="accent1"/>
+                </a:fillRef>
+                <a:effectRef idx="0">
+                  <a:schemeClr val="accent1"/>
+                </a:effectRef>
+                <a:fontRef idx="minor">
+                  <a:schemeClr val="lt1"/>
+                </a:fontRef>
+              </p:style>
+              <p:txBody>
+                <a:bodyPr rtlCol="0" anchor="ctr"/>
+                <a:lstStyle/>
+                <a:p>
+                  <a:pPr algn="ctr"/>
+                  <a:endParaRPr lang="en-GB"/>
+                </a:p>
+              </p:txBody>
+            </p:sp>
+            <p:grpSp>
+              <p:nvGrpSpPr>
+                <p:cNvPr id="14" name="Group 13">
+                  <a:extLst>
+                    <a:ext uri="{FF2B5EF4-FFF2-40B4-BE49-F238E27FC236}">
+                      <a16:creationId xmlns:a16="http://schemas.microsoft.com/office/drawing/2014/main" id="{74AD9CC1-D223-4619-B665-B615ECE10661}"/>
+                    </a:ext>
+                  </a:extLst>
+                </p:cNvPr>
+                <p:cNvGrpSpPr/>
+                <p:nvPr/>
+              </p:nvGrpSpPr>
+              <p:grpSpPr>
+                <a:xfrm>
+                  <a:off x="4528445" y="3210264"/>
+                  <a:ext cx="1336911" cy="1017408"/>
+                  <a:chOff x="4616788" y="3185709"/>
+                  <a:chExt cx="1336911" cy="1017408"/>
+                </a:xfrm>
+              </p:grpSpPr>
+              <p:grpSp>
+                <p:nvGrpSpPr>
+                  <p:cNvPr id="15" name="Group 14">
+                    <a:extLst>
+                      <a:ext uri="{FF2B5EF4-FFF2-40B4-BE49-F238E27FC236}">
+                        <a16:creationId xmlns:a16="http://schemas.microsoft.com/office/drawing/2014/main" id="{2B7E2776-C4EF-45DF-869A-EF81D99A5B2E}"/>
+                      </a:ext>
+                    </a:extLst>
+                  </p:cNvPr>
+                  <p:cNvGrpSpPr/>
+                  <p:nvPr/>
+                </p:nvGrpSpPr>
+                <p:grpSpPr>
+                  <a:xfrm rot="20814620">
+                    <a:off x="4616788" y="3185709"/>
+                    <a:ext cx="1336911" cy="753283"/>
+                    <a:chOff x="4394285" y="3218982"/>
+                    <a:chExt cx="1336911" cy="753283"/>
+                  </a:xfrm>
+                </p:grpSpPr>
+                <p:sp>
+                  <p:nvSpPr>
+                    <p:cNvPr id="17" name="Oval 16">
+                      <a:extLst>
+                        <a:ext uri="{FF2B5EF4-FFF2-40B4-BE49-F238E27FC236}">
+                          <a16:creationId xmlns:a16="http://schemas.microsoft.com/office/drawing/2014/main" id="{8F1C702F-22CB-4E26-80CA-1673BB8C97BB}"/>
+                        </a:ext>
+                      </a:extLst>
+                    </p:cNvPr>
+                    <p:cNvSpPr/>
+                    <p:nvPr/>
+                  </p:nvSpPr>
+                  <p:spPr>
+                    <a:xfrm rot="2502191">
+                      <a:off x="4394285" y="3484179"/>
+                      <a:ext cx="686735" cy="488086"/>
+                    </a:xfrm>
+                    <a:prstGeom prst="ellipse">
+                      <a:avLst/>
+                    </a:prstGeom>
+                    <a:solidFill>
+                      <a:schemeClr val="bg1"/>
+                    </a:solidFill>
+                    <a:ln>
+                      <a:solidFill>
+                        <a:schemeClr val="bg1"/>
+                      </a:solidFill>
+                    </a:ln>
+                  </p:spPr>
+                  <p:style>
+                    <a:lnRef idx="2">
+                      <a:schemeClr val="accent1">
+                        <a:shade val="50000"/>
+                      </a:schemeClr>
+                    </a:lnRef>
+                    <a:fillRef idx="1">
+                      <a:schemeClr val="accent1"/>
+                    </a:fillRef>
+                    <a:effectRef idx="0">
+                      <a:schemeClr val="accent1"/>
+                    </a:effectRef>
+                    <a:fontRef idx="minor">
+                      <a:schemeClr val="lt1"/>
+                    </a:fontRef>
+                  </p:style>
+                  <p:txBody>
+                    <a:bodyPr rtlCol="0" anchor="ctr"/>
+                    <a:lstStyle/>
+                    <a:p>
+                      <a:pPr algn="ctr"/>
+                      <a:endParaRPr lang="en-GB"/>
+                    </a:p>
+                  </p:txBody>
+                </p:sp>
+                <p:sp>
+                  <p:nvSpPr>
+                    <p:cNvPr id="18" name="Oval 17">
+                      <a:extLst>
+                        <a:ext uri="{FF2B5EF4-FFF2-40B4-BE49-F238E27FC236}">
+                          <a16:creationId xmlns:a16="http://schemas.microsoft.com/office/drawing/2014/main" id="{2323797F-0CFA-4F7C-BC48-DE5BFFA2427D}"/>
+                        </a:ext>
+                      </a:extLst>
+                    </p:cNvPr>
+                    <p:cNvSpPr/>
+                    <p:nvPr/>
+                  </p:nvSpPr>
+                  <p:spPr>
+                    <a:xfrm rot="4311166">
+                      <a:off x="4601303" y="3318307"/>
+                      <a:ext cx="686735" cy="488086"/>
+                    </a:xfrm>
+                    <a:prstGeom prst="ellipse">
+                      <a:avLst/>
+                    </a:prstGeom>
+                    <a:solidFill>
+                      <a:schemeClr val="bg1"/>
+                    </a:solidFill>
+                    <a:ln>
+                      <a:solidFill>
+                        <a:schemeClr val="bg1"/>
+                      </a:solidFill>
+                    </a:ln>
+                  </p:spPr>
+                  <p:style>
+                    <a:lnRef idx="2">
+                      <a:schemeClr val="accent1">
+                        <a:shade val="50000"/>
+                      </a:schemeClr>
+                    </a:lnRef>
+                    <a:fillRef idx="1">
+                      <a:schemeClr val="accent1"/>
+                    </a:fillRef>
+                    <a:effectRef idx="0">
+                      <a:schemeClr val="accent1"/>
+                    </a:effectRef>
+                    <a:fontRef idx="minor">
+                      <a:schemeClr val="lt1"/>
+                    </a:fontRef>
+                  </p:style>
+                  <p:txBody>
+                    <a:bodyPr rtlCol="0" anchor="ctr"/>
+                    <a:lstStyle/>
+                    <a:p>
+                      <a:pPr algn="ctr"/>
+                      <a:endParaRPr lang="en-GB"/>
+                    </a:p>
+                  </p:txBody>
+                </p:sp>
+                <p:sp>
+                  <p:nvSpPr>
+                    <p:cNvPr id="19" name="Oval 18">
+                      <a:extLst>
+                        <a:ext uri="{FF2B5EF4-FFF2-40B4-BE49-F238E27FC236}">
+                          <a16:creationId xmlns:a16="http://schemas.microsoft.com/office/drawing/2014/main" id="{433A8925-06C1-4261-95C0-449A655C5427}"/>
+                        </a:ext>
+                      </a:extLst>
+                    </p:cNvPr>
+                    <p:cNvSpPr/>
+                    <p:nvPr/>
+                  </p:nvSpPr>
+                  <p:spPr>
+                    <a:xfrm rot="5400000">
+                      <a:off x="4876576" y="3331518"/>
+                      <a:ext cx="686735" cy="488086"/>
+                    </a:xfrm>
+                    <a:prstGeom prst="ellipse">
+                      <a:avLst/>
+                    </a:prstGeom>
+                    <a:solidFill>
+                      <a:schemeClr val="bg1"/>
+                    </a:solidFill>
+                    <a:ln>
+                      <a:solidFill>
+                        <a:schemeClr val="bg1"/>
+                      </a:solidFill>
+                    </a:ln>
+                  </p:spPr>
+                  <p:style>
+                    <a:lnRef idx="2">
+                      <a:schemeClr val="accent1">
+                        <a:shade val="50000"/>
+                      </a:schemeClr>
+                    </a:lnRef>
+                    <a:fillRef idx="1">
+                      <a:schemeClr val="accent1"/>
+                    </a:fillRef>
+                    <a:effectRef idx="0">
+                      <a:schemeClr val="accent1"/>
+                    </a:effectRef>
+                    <a:fontRef idx="minor">
+                      <a:schemeClr val="lt1"/>
+                    </a:fontRef>
+                  </p:style>
+                  <p:txBody>
+                    <a:bodyPr rtlCol="0" anchor="ctr"/>
+                    <a:lstStyle/>
+                    <a:p>
+                      <a:pPr algn="ctr"/>
+                      <a:endParaRPr lang="en-GB"/>
+                    </a:p>
+                  </p:txBody>
+                </p:sp>
+                <p:sp>
+                  <p:nvSpPr>
+                    <p:cNvPr id="20" name="Oval 19">
+                      <a:extLst>
+                        <a:ext uri="{FF2B5EF4-FFF2-40B4-BE49-F238E27FC236}">
+                          <a16:creationId xmlns:a16="http://schemas.microsoft.com/office/drawing/2014/main" id="{0761F922-46A2-4494-A023-0C2B1A6BFAF9}"/>
+                        </a:ext>
+                      </a:extLst>
+                    </p:cNvPr>
+                    <p:cNvSpPr/>
+                    <p:nvPr/>
+                  </p:nvSpPr>
+                  <p:spPr>
+                    <a:xfrm rot="8646639">
+                      <a:off x="5044461" y="3419131"/>
+                      <a:ext cx="686735" cy="488086"/>
+                    </a:xfrm>
+                    <a:prstGeom prst="ellipse">
+                      <a:avLst/>
+                    </a:prstGeom>
+                    <a:solidFill>
+                      <a:schemeClr val="bg1"/>
+                    </a:solidFill>
+                    <a:ln>
+                      <a:solidFill>
+                        <a:schemeClr val="bg1"/>
+                      </a:solidFill>
+                    </a:ln>
+                  </p:spPr>
+                  <p:style>
+                    <a:lnRef idx="2">
+                      <a:schemeClr val="accent1">
+                        <a:shade val="50000"/>
+                      </a:schemeClr>
+                    </a:lnRef>
+                    <a:fillRef idx="1">
+                      <a:schemeClr val="accent1"/>
+                    </a:fillRef>
+                    <a:effectRef idx="0">
+                      <a:schemeClr val="accent1"/>
+                    </a:effectRef>
+                    <a:fontRef idx="minor">
+                      <a:schemeClr val="lt1"/>
+                    </a:fontRef>
+                  </p:style>
+                  <p:txBody>
+                    <a:bodyPr rtlCol="0" anchor="ctr"/>
+                    <a:lstStyle/>
+                    <a:p>
+                      <a:pPr algn="ctr"/>
+                      <a:endParaRPr lang="en-GB"/>
+                    </a:p>
+                  </p:txBody>
+                </p:sp>
+              </p:grpSp>
+              <p:sp>
+                <p:nvSpPr>
+                  <p:cNvPr id="16" name="Oval 15">
+                    <a:extLst>
+                      <a:ext uri="{FF2B5EF4-FFF2-40B4-BE49-F238E27FC236}">
+                        <a16:creationId xmlns:a16="http://schemas.microsoft.com/office/drawing/2014/main" id="{C2192827-509A-4D02-95E7-2C788E9B89BF}"/>
+                      </a:ext>
+                    </a:extLst>
+                  </p:cNvPr>
+                  <p:cNvSpPr/>
+                  <p:nvPr/>
+                </p:nvSpPr>
+                <p:spPr>
+                  <a:xfrm rot="10189688">
+                    <a:off x="5074047" y="3715031"/>
+                    <a:ext cx="686735" cy="488086"/>
+                  </a:xfrm>
+                  <a:prstGeom prst="ellipse">
+                    <a:avLst/>
+                  </a:prstGeom>
+                  <a:solidFill>
+                    <a:schemeClr val="bg1"/>
+                  </a:solidFill>
+                  <a:ln>
+                    <a:solidFill>
+                      <a:schemeClr val="bg1"/>
+                    </a:solidFill>
+                  </a:ln>
+                </p:spPr>
+                <p:style>
+                  <a:lnRef idx="2">
+                    <a:schemeClr val="accent1">
+                      <a:shade val="50000"/>
+                    </a:schemeClr>
+                  </a:lnRef>
+                  <a:fillRef idx="1">
+                    <a:schemeClr val="accent1"/>
+                  </a:fillRef>
+                  <a:effectRef idx="0">
+                    <a:schemeClr val="accent1"/>
+                  </a:effectRef>
+                  <a:fontRef idx="minor">
+                    <a:schemeClr val="lt1"/>
+                  </a:fontRef>
+                </p:style>
+                <p:txBody>
+                  <a:bodyPr rtlCol="0" anchor="ctr"/>
+                  <a:lstStyle/>
+                  <a:p>
+                    <a:pPr algn="ctr"/>
+                    <a:endParaRPr lang="en-GB"/>
+                  </a:p>
+                </p:txBody>
+              </p:sp>
+            </p:grpSp>
+          </p:grpSp>
+        </p:grpSp>
+        <p:sp>
+          <p:nvSpPr>
+            <p:cNvPr id="3" name="TextBox 2">
+              <a:extLst>
+                <a:ext uri="{FF2B5EF4-FFF2-40B4-BE49-F238E27FC236}">
+                  <a16:creationId xmlns:a16="http://schemas.microsoft.com/office/drawing/2014/main" id="{EA4CDE6C-54CD-4429-AF03-253EA66A1CE9}"/>
+                </a:ext>
+              </a:extLst>
+            </p:cNvPr>
+            <p:cNvSpPr txBox="1"/>
+            <p:nvPr/>
+          </p:nvSpPr>
+          <p:spPr>
+            <a:xfrm>
+              <a:off x="4284132" y="2318913"/>
+              <a:ext cx="7259784" cy="1862048"/>
+            </a:xfrm>
+            <a:prstGeom prst="rect">
+              <a:avLst/>
+            </a:prstGeom>
+            <a:noFill/>
+          </p:spPr>
+          <p:txBody>
+            <a:bodyPr wrap="square" rtlCol="0">
+              <a:spAutoFit/>
+            </a:bodyPr>
+            <a:lstStyle/>
+            <a:p>
+              <a:r>
+                <a:rPr lang="en-US" sz="11500" dirty="0">
+                  <a:solidFill>
+                    <a:srgbClr val="4A1D2E"/>
+                  </a:solidFill>
+                  <a:latin typeface="Righteous" panose="02010506000000020000" pitchFamily="2" charset="0"/>
+                </a:rPr>
+                <a:t>WhaToEat</a:t>
+              </a:r>
+              <a:endParaRPr lang="en-GB" sz="11500" dirty="0">
+                <a:solidFill>
+                  <a:srgbClr val="4A1D2E"/>
+                </a:solidFill>
+                <a:latin typeface="Righteous" panose="02010506000000020000" pitchFamily="2" charset="0"/>
+              </a:endParaRPr>
+            </a:p>
+          </p:txBody>
+        </p:sp>
+      </p:grpSp>
+    </p:spTree>
+    <p:extLst>
+      <p:ext uri="{BB962C8B-B14F-4D97-AF65-F5344CB8AC3E}">
+        <p14:creationId xmlns:p14="http://schemas.microsoft.com/office/powerpoint/2010/main" val="2877060498"/>
+      </p:ext>
+    </p:extLst>
+  </p:cSld>
+  <p:clrMapOvr>
+    <a:masterClrMapping/>
+  </p:clrMapOvr>
+</p:sld>
+</file>
+
 <file path=ppt/theme/theme1.xml><?xml version="1.0" encoding="utf-8"?>
 <a:theme xmlns:a="http://schemas.openxmlformats.org/drawingml/2006/main" name="Office Theme">
   <a:themeElements>

</xml_diff>

<commit_message>
added filters with 3 options each
</commit_message>
<xml_diff>
--- a/WhaToEat Concept.pptx
+++ b/WhaToEat Concept.pptx
@@ -7,8 +7,8 @@
   <p:sldIdLst>
     <p:sldId id="256" r:id="rId2"/>
     <p:sldId id="257" r:id="rId3"/>
-    <p:sldId id="258" r:id="rId4"/>
-    <p:sldId id="259" r:id="rId5"/>
+    <p:sldId id="261" r:id="rId4"/>
+    <p:sldId id="258" r:id="rId5"/>
     <p:sldId id="260" r:id="rId6"/>
   </p:sldIdLst>
   <p:sldSz cx="12192000" cy="6858000"/>
@@ -668,7 +668,7 @@
           <a:p>
             <a:fld id="{51803F4B-9C4D-4BE8-8CC0-3C3D11FC2AA4}" type="datetimeFigureOut">
               <a:rPr lang="LID4096" smtClean="0"/>
-              <a:t>04/10/2022</a:t>
+              <a:t>04/11/2022</a:t>
             </a:fld>
             <a:endParaRPr lang="LID4096"/>
           </a:p>
@@ -868,7 +868,7 @@
           <a:p>
             <a:fld id="{51803F4B-9C4D-4BE8-8CC0-3C3D11FC2AA4}" type="datetimeFigureOut">
               <a:rPr lang="LID4096" smtClean="0"/>
-              <a:t>04/10/2022</a:t>
+              <a:t>04/11/2022</a:t>
             </a:fld>
             <a:endParaRPr lang="LID4096"/>
           </a:p>
@@ -1078,7 +1078,7 @@
           <a:p>
             <a:fld id="{51803F4B-9C4D-4BE8-8CC0-3C3D11FC2AA4}" type="datetimeFigureOut">
               <a:rPr lang="LID4096" smtClean="0"/>
-              <a:t>04/10/2022</a:t>
+              <a:t>04/11/2022</a:t>
             </a:fld>
             <a:endParaRPr lang="LID4096"/>
           </a:p>
@@ -1278,7 +1278,7 @@
           <a:p>
             <a:fld id="{51803F4B-9C4D-4BE8-8CC0-3C3D11FC2AA4}" type="datetimeFigureOut">
               <a:rPr lang="LID4096" smtClean="0"/>
-              <a:t>04/10/2022</a:t>
+              <a:t>04/11/2022</a:t>
             </a:fld>
             <a:endParaRPr lang="LID4096"/>
           </a:p>
@@ -1554,7 +1554,7 @@
           <a:p>
             <a:fld id="{51803F4B-9C4D-4BE8-8CC0-3C3D11FC2AA4}" type="datetimeFigureOut">
               <a:rPr lang="LID4096" smtClean="0"/>
-              <a:t>04/10/2022</a:t>
+              <a:t>04/11/2022</a:t>
             </a:fld>
             <a:endParaRPr lang="LID4096"/>
           </a:p>
@@ -1822,7 +1822,7 @@
           <a:p>
             <a:fld id="{51803F4B-9C4D-4BE8-8CC0-3C3D11FC2AA4}" type="datetimeFigureOut">
               <a:rPr lang="LID4096" smtClean="0"/>
-              <a:t>04/10/2022</a:t>
+              <a:t>04/11/2022</a:t>
             </a:fld>
             <a:endParaRPr lang="LID4096"/>
           </a:p>
@@ -2237,7 +2237,7 @@
           <a:p>
             <a:fld id="{51803F4B-9C4D-4BE8-8CC0-3C3D11FC2AA4}" type="datetimeFigureOut">
               <a:rPr lang="LID4096" smtClean="0"/>
-              <a:t>04/10/2022</a:t>
+              <a:t>04/11/2022</a:t>
             </a:fld>
             <a:endParaRPr lang="LID4096"/>
           </a:p>
@@ -2379,7 +2379,7 @@
           <a:p>
             <a:fld id="{51803F4B-9C4D-4BE8-8CC0-3C3D11FC2AA4}" type="datetimeFigureOut">
               <a:rPr lang="LID4096" smtClean="0"/>
-              <a:t>04/10/2022</a:t>
+              <a:t>04/11/2022</a:t>
             </a:fld>
             <a:endParaRPr lang="LID4096"/>
           </a:p>
@@ -2492,7 +2492,7 @@
           <a:p>
             <a:fld id="{51803F4B-9C4D-4BE8-8CC0-3C3D11FC2AA4}" type="datetimeFigureOut">
               <a:rPr lang="LID4096" smtClean="0"/>
-              <a:t>04/10/2022</a:t>
+              <a:t>04/11/2022</a:t>
             </a:fld>
             <a:endParaRPr lang="LID4096"/>
           </a:p>
@@ -2805,7 +2805,7 @@
           <a:p>
             <a:fld id="{51803F4B-9C4D-4BE8-8CC0-3C3D11FC2AA4}" type="datetimeFigureOut">
               <a:rPr lang="LID4096" smtClean="0"/>
-              <a:t>04/10/2022</a:t>
+              <a:t>04/11/2022</a:t>
             </a:fld>
             <a:endParaRPr lang="LID4096"/>
           </a:p>
@@ -3094,7 +3094,7 @@
           <a:p>
             <a:fld id="{51803F4B-9C4D-4BE8-8CC0-3C3D11FC2AA4}" type="datetimeFigureOut">
               <a:rPr lang="LID4096" smtClean="0"/>
-              <a:t>04/10/2022</a:t>
+              <a:t>04/11/2022</a:t>
             </a:fld>
             <a:endParaRPr lang="LID4096"/>
           </a:p>
@@ -3337,7 +3337,7 @@
           <a:p>
             <a:fld id="{51803F4B-9C4D-4BE8-8CC0-3C3D11FC2AA4}" type="datetimeFigureOut">
               <a:rPr lang="LID4096" smtClean="0"/>
-              <a:t>04/10/2022</a:t>
+              <a:t>04/11/2022</a:t>
             </a:fld>
             <a:endParaRPr lang="LID4096"/>
           </a:p>
@@ -5340,7 +5340,7 @@
           <p:cNvPr id="5" name="Picture 4">
             <a:extLst>
               <a:ext uri="{FF2B5EF4-FFF2-40B4-BE49-F238E27FC236}">
-                <a16:creationId xmlns:a16="http://schemas.microsoft.com/office/drawing/2014/main" id="{B10385B6-97EE-45F8-AEF1-4E55F71E8839}"/>
+                <a16:creationId xmlns:a16="http://schemas.microsoft.com/office/drawing/2014/main" id="{B191CCC8-ED8B-4DF6-B43B-117FC4DBE1A2}"/>
               </a:ext>
             </a:extLst>
           </p:cNvPr>
@@ -5357,8 +5357,8 @@
         </p:blipFill>
         <p:spPr>
           <a:xfrm>
-            <a:off x="791455" y="1713052"/>
-            <a:ext cx="3658811" cy="2472637"/>
+            <a:off x="0" y="-403412"/>
+            <a:ext cx="12192000" cy="8123626"/>
           </a:xfrm>
           <a:prstGeom prst="rect">
             <a:avLst/>
@@ -5367,10 +5367,313 @@
       </p:pic>
       <p:sp>
         <p:nvSpPr>
-          <p:cNvPr id="6" name="TextBox 5">
-            <a:extLst>
-              <a:ext uri="{FF2B5EF4-FFF2-40B4-BE49-F238E27FC236}">
-                <a16:creationId xmlns:a16="http://schemas.microsoft.com/office/drawing/2014/main" id="{64EB9670-728D-4FD4-B856-1404B9C4036A}"/>
+          <p:cNvPr id="6" name="Rectangle: Rounded Corners 5">
+            <a:extLst>
+              <a:ext uri="{FF2B5EF4-FFF2-40B4-BE49-F238E27FC236}">
+                <a16:creationId xmlns:a16="http://schemas.microsoft.com/office/drawing/2014/main" id="{ECEDE53C-8C50-4DC2-A239-3B83EEF50B9B}"/>
+              </a:ext>
+            </a:extLst>
+          </p:cNvPr>
+          <p:cNvSpPr/>
+          <p:nvPr/>
+        </p:nvSpPr>
+        <p:spPr>
+          <a:xfrm>
+            <a:off x="358815" y="69215"/>
+            <a:ext cx="3379808" cy="523240"/>
+          </a:xfrm>
+          <a:prstGeom prst="roundRect">
+            <a:avLst/>
+          </a:prstGeom>
+          <a:solidFill>
+            <a:schemeClr val="bg1"/>
+          </a:solidFill>
+          <a:ln>
+            <a:solidFill>
+              <a:schemeClr val="tx1"/>
+            </a:solidFill>
+          </a:ln>
+        </p:spPr>
+        <p:style>
+          <a:lnRef idx="2">
+            <a:schemeClr val="accent1">
+              <a:shade val="50000"/>
+            </a:schemeClr>
+          </a:lnRef>
+          <a:fillRef idx="1">
+            <a:schemeClr val="accent1"/>
+          </a:fillRef>
+          <a:effectRef idx="0">
+            <a:schemeClr val="accent1"/>
+          </a:effectRef>
+          <a:fontRef idx="minor">
+            <a:schemeClr val="lt1"/>
+          </a:fontRef>
+        </p:style>
+        <p:txBody>
+          <a:bodyPr rtlCol="0" anchor="ctr"/>
+          <a:lstStyle/>
+          <a:p>
+            <a:r>
+              <a:rPr lang="en-US" sz="2000" dirty="0">
+                <a:solidFill>
+                  <a:schemeClr val="tx1"/>
+                </a:solidFill>
+              </a:rPr>
+              <a:t>         </a:t>
+            </a:r>
+            <a:r>
+              <a:rPr lang="en-US" sz="2000" dirty="0">
+                <a:solidFill>
+                  <a:schemeClr val="bg1">
+                    <a:lumMod val="85000"/>
+                  </a:schemeClr>
+                </a:solidFill>
+              </a:rPr>
+              <a:t>Search for food         |</a:t>
+            </a:r>
+            <a:endParaRPr lang="LID4096" sz="2000" dirty="0">
+              <a:solidFill>
+                <a:schemeClr val="bg1">
+                  <a:lumMod val="85000"/>
+                </a:schemeClr>
+              </a:solidFill>
+            </a:endParaRPr>
+          </a:p>
+        </p:txBody>
+      </p:sp>
+      <p:sp>
+        <p:nvSpPr>
+          <p:cNvPr id="7" name="Rectangle: Rounded Corners 6">
+            <a:extLst>
+              <a:ext uri="{FF2B5EF4-FFF2-40B4-BE49-F238E27FC236}">
+                <a16:creationId xmlns:a16="http://schemas.microsoft.com/office/drawing/2014/main" id="{257D565B-00C2-49FF-BA43-0235A21745DC}"/>
+              </a:ext>
+            </a:extLst>
+          </p:cNvPr>
+          <p:cNvSpPr/>
+          <p:nvPr/>
+        </p:nvSpPr>
+        <p:spPr>
+          <a:xfrm>
+            <a:off x="523528" y="201295"/>
+            <a:ext cx="289367" cy="45719"/>
+          </a:xfrm>
+          <a:prstGeom prst="roundRect">
+            <a:avLst/>
+          </a:prstGeom>
+        </p:spPr>
+        <p:style>
+          <a:lnRef idx="2">
+            <a:schemeClr val="accent1">
+              <a:shade val="50000"/>
+            </a:schemeClr>
+          </a:lnRef>
+          <a:fillRef idx="1">
+            <a:schemeClr val="accent1"/>
+          </a:fillRef>
+          <a:effectRef idx="0">
+            <a:schemeClr val="accent1"/>
+          </a:effectRef>
+          <a:fontRef idx="minor">
+            <a:schemeClr val="lt1"/>
+          </a:fontRef>
+        </p:style>
+        <p:txBody>
+          <a:bodyPr rtlCol="0" anchor="ctr"/>
+          <a:lstStyle/>
+          <a:p>
+            <a:pPr algn="ctr"/>
+            <a:endParaRPr lang="LID4096"/>
+          </a:p>
+        </p:txBody>
+      </p:sp>
+      <p:sp>
+        <p:nvSpPr>
+          <p:cNvPr id="8" name="Rectangle: Rounded Corners 7">
+            <a:extLst>
+              <a:ext uri="{FF2B5EF4-FFF2-40B4-BE49-F238E27FC236}">
+                <a16:creationId xmlns:a16="http://schemas.microsoft.com/office/drawing/2014/main" id="{283980BD-96EA-4D87-B53F-2D678E65357B}"/>
+              </a:ext>
+            </a:extLst>
+          </p:cNvPr>
+          <p:cNvSpPr/>
+          <p:nvPr/>
+        </p:nvSpPr>
+        <p:spPr>
+          <a:xfrm>
+            <a:off x="523529" y="307976"/>
+            <a:ext cx="289367" cy="45719"/>
+          </a:xfrm>
+          <a:prstGeom prst="roundRect">
+            <a:avLst/>
+          </a:prstGeom>
+        </p:spPr>
+        <p:style>
+          <a:lnRef idx="2">
+            <a:schemeClr val="accent1">
+              <a:shade val="50000"/>
+            </a:schemeClr>
+          </a:lnRef>
+          <a:fillRef idx="1">
+            <a:schemeClr val="accent1"/>
+          </a:fillRef>
+          <a:effectRef idx="0">
+            <a:schemeClr val="accent1"/>
+          </a:effectRef>
+          <a:fontRef idx="minor">
+            <a:schemeClr val="lt1"/>
+          </a:fontRef>
+        </p:style>
+        <p:txBody>
+          <a:bodyPr rtlCol="0" anchor="ctr"/>
+          <a:lstStyle/>
+          <a:p>
+            <a:pPr algn="ctr"/>
+            <a:endParaRPr lang="LID4096"/>
+          </a:p>
+        </p:txBody>
+      </p:sp>
+      <p:sp>
+        <p:nvSpPr>
+          <p:cNvPr id="9" name="Rectangle: Rounded Corners 8">
+            <a:extLst>
+              <a:ext uri="{FF2B5EF4-FFF2-40B4-BE49-F238E27FC236}">
+                <a16:creationId xmlns:a16="http://schemas.microsoft.com/office/drawing/2014/main" id="{92650047-0BCF-4AFA-9AFD-80F3A9AFBB1B}"/>
+              </a:ext>
+            </a:extLst>
+          </p:cNvPr>
+          <p:cNvSpPr/>
+          <p:nvPr/>
+        </p:nvSpPr>
+        <p:spPr>
+          <a:xfrm>
+            <a:off x="523528" y="414657"/>
+            <a:ext cx="289367" cy="45719"/>
+          </a:xfrm>
+          <a:prstGeom prst="roundRect">
+            <a:avLst/>
+          </a:prstGeom>
+        </p:spPr>
+        <p:style>
+          <a:lnRef idx="2">
+            <a:schemeClr val="accent1">
+              <a:shade val="50000"/>
+            </a:schemeClr>
+          </a:lnRef>
+          <a:fillRef idx="1">
+            <a:schemeClr val="accent1"/>
+          </a:fillRef>
+          <a:effectRef idx="0">
+            <a:schemeClr val="accent1"/>
+          </a:effectRef>
+          <a:fontRef idx="minor">
+            <a:schemeClr val="lt1"/>
+          </a:fontRef>
+        </p:style>
+        <p:txBody>
+          <a:bodyPr rtlCol="0" anchor="ctr"/>
+          <a:lstStyle/>
+          <a:p>
+            <a:pPr algn="ctr"/>
+            <a:endParaRPr lang="LID4096"/>
+          </a:p>
+        </p:txBody>
+      </p:sp>
+      <p:pic>
+        <p:nvPicPr>
+          <p:cNvPr id="13" name="Picture 12">
+            <a:extLst>
+              <a:ext uri="{FF2B5EF4-FFF2-40B4-BE49-F238E27FC236}">
+                <a16:creationId xmlns:a16="http://schemas.microsoft.com/office/drawing/2014/main" id="{EEE56BAA-6734-49E5-9455-FE7EE7323B5D}"/>
+              </a:ext>
+            </a:extLst>
+          </p:cNvPr>
+          <p:cNvPicPr>
+            <a:picLocks noChangeAspect="1"/>
+          </p:cNvPicPr>
+          <p:nvPr/>
+        </p:nvPicPr>
+        <p:blipFill>
+          <a:blip r:embed="rId3"/>
+          <a:stretch>
+            <a:fillRect/>
+          </a:stretch>
+        </p:blipFill>
+        <p:spPr>
+          <a:xfrm flipH="1">
+            <a:off x="3287016" y="184600"/>
+            <a:ext cx="303804" cy="303804"/>
+          </a:xfrm>
+          <a:prstGeom prst="rect">
+            <a:avLst/>
+          </a:prstGeom>
+        </p:spPr>
+      </p:pic>
+      <p:sp>
+        <p:nvSpPr>
+          <p:cNvPr id="2" name="Rectangle 1">
+            <a:extLst>
+              <a:ext uri="{FF2B5EF4-FFF2-40B4-BE49-F238E27FC236}">
+                <a16:creationId xmlns:a16="http://schemas.microsoft.com/office/drawing/2014/main" id="{8193E574-30F7-4995-97BC-36B432EBFCB8}"/>
+              </a:ext>
+            </a:extLst>
+          </p:cNvPr>
+          <p:cNvSpPr/>
+          <p:nvPr/>
+        </p:nvSpPr>
+        <p:spPr>
+          <a:xfrm>
+            <a:off x="0" y="-403412"/>
+            <a:ext cx="2974694" cy="8123626"/>
+          </a:xfrm>
+          <a:prstGeom prst="rect">
+            <a:avLst/>
+          </a:prstGeom>
+          <a:solidFill>
+            <a:schemeClr val="bg1"/>
+          </a:solidFill>
+          <a:ln>
+            <a:noFill/>
+          </a:ln>
+          <a:effectLst>
+            <a:outerShdw blurRad="50800" dist="38100" sx="101000" sy="101000" algn="l" rotWithShape="0">
+              <a:prstClr val="black">
+                <a:alpha val="40000"/>
+              </a:prstClr>
+            </a:outerShdw>
+          </a:effectLst>
+        </p:spPr>
+        <p:style>
+          <a:lnRef idx="2">
+            <a:schemeClr val="accent1">
+              <a:shade val="50000"/>
+            </a:schemeClr>
+          </a:lnRef>
+          <a:fillRef idx="1">
+            <a:schemeClr val="accent1"/>
+          </a:fillRef>
+          <a:effectRef idx="0">
+            <a:schemeClr val="accent1"/>
+          </a:effectRef>
+          <a:fontRef idx="minor">
+            <a:schemeClr val="lt1"/>
+          </a:fontRef>
+        </p:style>
+        <p:txBody>
+          <a:bodyPr rtlCol="0" anchor="ctr"/>
+          <a:lstStyle/>
+          <a:p>
+            <a:endParaRPr lang="LID4096" dirty="0"/>
+          </a:p>
+        </p:txBody>
+      </p:sp>
+      <p:sp>
+        <p:nvSpPr>
+          <p:cNvPr id="3" name="TextBox 2">
+            <a:extLst>
+              <a:ext uri="{FF2B5EF4-FFF2-40B4-BE49-F238E27FC236}">
+                <a16:creationId xmlns:a16="http://schemas.microsoft.com/office/drawing/2014/main" id="{00CB4CBC-CCD9-407B-B0DF-A79C180CFCFB}"/>
               </a:ext>
             </a:extLst>
           </p:cNvPr>
@@ -5379,8 +5682,8 @@
         </p:nvSpPr>
         <p:spPr>
           <a:xfrm>
-            <a:off x="2032654" y="4185689"/>
-            <a:ext cx="1176412" cy="369332"/>
+            <a:off x="540613" y="-253628"/>
+            <a:ext cx="1893467" cy="523220"/>
           </a:xfrm>
           <a:prstGeom prst="rect">
             <a:avLst/>
@@ -5394,16 +5697,1349 @@
           <a:lstStyle/>
           <a:p>
             <a:r>
+              <a:rPr lang="en-US" sz="2800" b="1" dirty="0">
+                <a:solidFill>
+                  <a:schemeClr val="accent4">
+                    <a:lumMod val="40000"/>
+                    <a:lumOff val="60000"/>
+                  </a:schemeClr>
+                </a:solidFill>
+                <a:latin typeface="Aharoni" panose="02010803020104030203" pitchFamily="2" charset="-79"/>
+                <a:cs typeface="Aharoni" panose="02010803020104030203" pitchFamily="2" charset="-79"/>
+              </a:rPr>
+              <a:t>WhaToEat</a:t>
+            </a:r>
+            <a:endParaRPr lang="LID4096" sz="2800" b="1" dirty="0">
+              <a:solidFill>
+                <a:schemeClr val="accent4">
+                  <a:lumMod val="40000"/>
+                  <a:lumOff val="60000"/>
+                </a:schemeClr>
+              </a:solidFill>
+              <a:latin typeface="Aharoni" panose="02010803020104030203" pitchFamily="2" charset="-79"/>
+              <a:cs typeface="Aharoni" panose="02010803020104030203" pitchFamily="2" charset="-79"/>
+            </a:endParaRPr>
+          </a:p>
+        </p:txBody>
+      </p:sp>
+      <p:cxnSp>
+        <p:nvCxnSpPr>
+          <p:cNvPr id="10" name="Straight Connector 9">
+            <a:extLst>
+              <a:ext uri="{FF2B5EF4-FFF2-40B4-BE49-F238E27FC236}">
+                <a16:creationId xmlns:a16="http://schemas.microsoft.com/office/drawing/2014/main" id="{73D6D7A0-9731-46BE-B3A1-2D464BB34214}"/>
+              </a:ext>
+            </a:extLst>
+          </p:cNvPr>
+          <p:cNvCxnSpPr/>
+          <p:nvPr/>
+        </p:nvCxnSpPr>
+        <p:spPr>
+          <a:xfrm>
+            <a:off x="449713" y="269592"/>
+            <a:ext cx="2075265" cy="0"/>
+          </a:xfrm>
+          <a:prstGeom prst="line">
+            <a:avLst/>
+          </a:prstGeom>
+          <a:ln>
+            <a:solidFill>
+              <a:schemeClr val="accent4">
+                <a:lumMod val="60000"/>
+                <a:lumOff val="40000"/>
+              </a:schemeClr>
+            </a:solidFill>
+          </a:ln>
+        </p:spPr>
+        <p:style>
+          <a:lnRef idx="1">
+            <a:schemeClr val="accent1"/>
+          </a:lnRef>
+          <a:fillRef idx="0">
+            <a:schemeClr val="accent1"/>
+          </a:fillRef>
+          <a:effectRef idx="0">
+            <a:schemeClr val="accent1"/>
+          </a:effectRef>
+          <a:fontRef idx="minor">
+            <a:schemeClr val="tx1"/>
+          </a:fontRef>
+        </p:style>
+      </p:cxnSp>
+      <p:sp>
+        <p:nvSpPr>
+          <p:cNvPr id="11" name="TextBox 10">
+            <a:extLst>
+              <a:ext uri="{FF2B5EF4-FFF2-40B4-BE49-F238E27FC236}">
+                <a16:creationId xmlns:a16="http://schemas.microsoft.com/office/drawing/2014/main" id="{8366595E-AA01-4080-BB87-6B32E147C7E9}"/>
+              </a:ext>
+            </a:extLst>
+          </p:cNvPr>
+          <p:cNvSpPr txBox="1"/>
+          <p:nvPr/>
+        </p:nvSpPr>
+        <p:spPr>
+          <a:xfrm>
+            <a:off x="292716" y="463177"/>
+            <a:ext cx="718466" cy="369332"/>
+          </a:xfrm>
+          <a:prstGeom prst="rect">
+            <a:avLst/>
+          </a:prstGeom>
+          <a:noFill/>
+        </p:spPr>
+        <p:txBody>
+          <a:bodyPr wrap="none" rtlCol="0">
+            <a:spAutoFit/>
+          </a:bodyPr>
+          <a:lstStyle/>
+          <a:p>
+            <a:r>
               <a:rPr lang="en-US" dirty="0"/>
-              <a:t>Client-side</a:t>
-            </a:r>
+              <a:t>Halal:</a:t>
+            </a:r>
+            <a:endParaRPr lang="LID4096" dirty="0"/>
+          </a:p>
+        </p:txBody>
+      </p:sp>
+      <p:sp>
+        <p:nvSpPr>
+          <p:cNvPr id="26" name="Rectangle 25">
+            <a:extLst>
+              <a:ext uri="{FF2B5EF4-FFF2-40B4-BE49-F238E27FC236}">
+                <a16:creationId xmlns:a16="http://schemas.microsoft.com/office/drawing/2014/main" id="{1076C366-D320-452F-AA3F-FB2954D1A4FA}"/>
+              </a:ext>
+            </a:extLst>
+          </p:cNvPr>
+          <p:cNvSpPr/>
+          <p:nvPr/>
+        </p:nvSpPr>
+        <p:spPr>
+          <a:xfrm>
+            <a:off x="9008758" y="-326082"/>
+            <a:ext cx="2974694" cy="1490905"/>
+          </a:xfrm>
+          <a:prstGeom prst="rect">
+            <a:avLst/>
+          </a:prstGeom>
+          <a:solidFill>
+            <a:schemeClr val="bg1"/>
+          </a:solidFill>
+          <a:ln>
+            <a:noFill/>
+          </a:ln>
+          <a:effectLst>
+            <a:outerShdw blurRad="50800" dist="38100" sx="101000" sy="101000" algn="l" rotWithShape="0">
+              <a:prstClr val="black">
+                <a:alpha val="40000"/>
+              </a:prstClr>
+            </a:outerShdw>
+          </a:effectLst>
+        </p:spPr>
+        <p:style>
+          <a:lnRef idx="2">
+            <a:schemeClr val="accent1">
+              <a:shade val="50000"/>
+            </a:schemeClr>
+          </a:lnRef>
+          <a:fillRef idx="1">
+            <a:schemeClr val="accent1"/>
+          </a:fillRef>
+          <a:effectRef idx="0">
+            <a:schemeClr val="accent1"/>
+          </a:effectRef>
+          <a:fontRef idx="minor">
+            <a:schemeClr val="lt1"/>
+          </a:fontRef>
+        </p:style>
+        <p:txBody>
+          <a:bodyPr rtlCol="0" anchor="ctr"/>
+          <a:lstStyle/>
+          <a:p>
+            <a:endParaRPr lang="LID4096" dirty="0"/>
+          </a:p>
+        </p:txBody>
+      </p:sp>
+      <p:sp>
+        <p:nvSpPr>
+          <p:cNvPr id="27" name="Rectangle 26">
+            <a:extLst>
+              <a:ext uri="{FF2B5EF4-FFF2-40B4-BE49-F238E27FC236}">
+                <a16:creationId xmlns:a16="http://schemas.microsoft.com/office/drawing/2014/main" id="{DFB212FF-75A5-4BA7-801B-C28801629291}"/>
+              </a:ext>
+            </a:extLst>
+          </p:cNvPr>
+          <p:cNvSpPr/>
+          <p:nvPr/>
+        </p:nvSpPr>
+        <p:spPr>
+          <a:xfrm>
+            <a:off x="9008758" y="1380976"/>
+            <a:ext cx="2974694" cy="1490905"/>
+          </a:xfrm>
+          <a:prstGeom prst="rect">
+            <a:avLst/>
+          </a:prstGeom>
+          <a:solidFill>
+            <a:schemeClr val="bg1"/>
+          </a:solidFill>
+          <a:ln>
+            <a:noFill/>
+          </a:ln>
+          <a:effectLst>
+            <a:outerShdw blurRad="50800" dist="38100" sx="101000" sy="101000" algn="l" rotWithShape="0">
+              <a:prstClr val="black">
+                <a:alpha val="40000"/>
+              </a:prstClr>
+            </a:outerShdw>
+          </a:effectLst>
+        </p:spPr>
+        <p:style>
+          <a:lnRef idx="2">
+            <a:schemeClr val="accent1">
+              <a:shade val="50000"/>
+            </a:schemeClr>
+          </a:lnRef>
+          <a:fillRef idx="1">
+            <a:schemeClr val="accent1"/>
+          </a:fillRef>
+          <a:effectRef idx="0">
+            <a:schemeClr val="accent1"/>
+          </a:effectRef>
+          <a:fontRef idx="minor">
+            <a:schemeClr val="lt1"/>
+          </a:fontRef>
+        </p:style>
+        <p:txBody>
+          <a:bodyPr rtlCol="0" anchor="ctr"/>
+          <a:lstStyle/>
+          <a:p>
+            <a:endParaRPr lang="LID4096" dirty="0"/>
+          </a:p>
+        </p:txBody>
+      </p:sp>
+      <p:sp>
+        <p:nvSpPr>
+          <p:cNvPr id="28" name="Rectangle 27">
+            <a:extLst>
+              <a:ext uri="{FF2B5EF4-FFF2-40B4-BE49-F238E27FC236}">
+                <a16:creationId xmlns:a16="http://schemas.microsoft.com/office/drawing/2014/main" id="{9DE4F4C7-F8CD-4BB3-A527-AFD9EC6A35F8}"/>
+              </a:ext>
+            </a:extLst>
+          </p:cNvPr>
+          <p:cNvSpPr/>
+          <p:nvPr/>
+        </p:nvSpPr>
+        <p:spPr>
+          <a:xfrm>
+            <a:off x="9008758" y="3088034"/>
+            <a:ext cx="2974694" cy="1490905"/>
+          </a:xfrm>
+          <a:prstGeom prst="rect">
+            <a:avLst/>
+          </a:prstGeom>
+          <a:solidFill>
+            <a:schemeClr val="bg1"/>
+          </a:solidFill>
+          <a:ln>
+            <a:noFill/>
+          </a:ln>
+          <a:effectLst>
+            <a:outerShdw blurRad="50800" dist="38100" sx="101000" sy="101000" algn="l" rotWithShape="0">
+              <a:prstClr val="black">
+                <a:alpha val="40000"/>
+              </a:prstClr>
+            </a:outerShdw>
+          </a:effectLst>
+        </p:spPr>
+        <p:style>
+          <a:lnRef idx="2">
+            <a:schemeClr val="accent1">
+              <a:shade val="50000"/>
+            </a:schemeClr>
+          </a:lnRef>
+          <a:fillRef idx="1">
+            <a:schemeClr val="accent1"/>
+          </a:fillRef>
+          <a:effectRef idx="0">
+            <a:schemeClr val="accent1"/>
+          </a:effectRef>
+          <a:fontRef idx="minor">
+            <a:schemeClr val="lt1"/>
+          </a:fontRef>
+        </p:style>
+        <p:txBody>
+          <a:bodyPr rtlCol="0" anchor="ctr"/>
+          <a:lstStyle/>
+          <a:p>
+            <a:endParaRPr lang="LID4096" dirty="0"/>
+          </a:p>
+        </p:txBody>
+      </p:sp>
+      <p:sp>
+        <p:nvSpPr>
+          <p:cNvPr id="29" name="Rectangle 28">
+            <a:extLst>
+              <a:ext uri="{FF2B5EF4-FFF2-40B4-BE49-F238E27FC236}">
+                <a16:creationId xmlns:a16="http://schemas.microsoft.com/office/drawing/2014/main" id="{A91EB460-89A0-42B0-B678-7828D759334A}"/>
+              </a:ext>
+            </a:extLst>
+          </p:cNvPr>
+          <p:cNvSpPr/>
+          <p:nvPr/>
+        </p:nvSpPr>
+        <p:spPr>
+          <a:xfrm>
+            <a:off x="9008758" y="4818812"/>
+            <a:ext cx="2974694" cy="1490905"/>
+          </a:xfrm>
+          <a:prstGeom prst="rect">
+            <a:avLst/>
+          </a:prstGeom>
+          <a:solidFill>
+            <a:schemeClr val="bg1"/>
+          </a:solidFill>
+          <a:ln>
+            <a:noFill/>
+          </a:ln>
+          <a:effectLst>
+            <a:outerShdw blurRad="50800" dist="38100" sx="101000" sy="101000" algn="l" rotWithShape="0">
+              <a:prstClr val="black">
+                <a:alpha val="40000"/>
+              </a:prstClr>
+            </a:outerShdw>
+          </a:effectLst>
+        </p:spPr>
+        <p:style>
+          <a:lnRef idx="2">
+            <a:schemeClr val="accent1">
+              <a:shade val="50000"/>
+            </a:schemeClr>
+          </a:lnRef>
+          <a:fillRef idx="1">
+            <a:schemeClr val="accent1"/>
+          </a:fillRef>
+          <a:effectRef idx="0">
+            <a:schemeClr val="accent1"/>
+          </a:effectRef>
+          <a:fontRef idx="minor">
+            <a:schemeClr val="lt1"/>
+          </a:fontRef>
+        </p:style>
+        <p:txBody>
+          <a:bodyPr rtlCol="0" anchor="ctr"/>
+          <a:lstStyle/>
+          <a:p>
+            <a:endParaRPr lang="LID4096" dirty="0"/>
+          </a:p>
+        </p:txBody>
+      </p:sp>
+      <p:sp>
+        <p:nvSpPr>
+          <p:cNvPr id="30" name="Rectangle 29">
+            <a:extLst>
+              <a:ext uri="{FF2B5EF4-FFF2-40B4-BE49-F238E27FC236}">
+                <a16:creationId xmlns:a16="http://schemas.microsoft.com/office/drawing/2014/main" id="{2867A751-1CEE-42D6-AA9A-7A04B2371A98}"/>
+              </a:ext>
+            </a:extLst>
+          </p:cNvPr>
+          <p:cNvSpPr/>
+          <p:nvPr/>
+        </p:nvSpPr>
+        <p:spPr>
+          <a:xfrm>
+            <a:off x="9008758" y="6549591"/>
+            <a:ext cx="2974694" cy="1170624"/>
+          </a:xfrm>
+          <a:prstGeom prst="rect">
+            <a:avLst/>
+          </a:prstGeom>
+          <a:solidFill>
+            <a:schemeClr val="bg1"/>
+          </a:solidFill>
+          <a:ln>
+            <a:noFill/>
+          </a:ln>
+          <a:effectLst>
+            <a:outerShdw blurRad="50800" dist="38100" sx="101000" sy="101000" algn="l" rotWithShape="0">
+              <a:prstClr val="black">
+                <a:alpha val="40000"/>
+              </a:prstClr>
+            </a:outerShdw>
+          </a:effectLst>
+        </p:spPr>
+        <p:style>
+          <a:lnRef idx="2">
+            <a:schemeClr val="accent1">
+              <a:shade val="50000"/>
+            </a:schemeClr>
+          </a:lnRef>
+          <a:fillRef idx="1">
+            <a:schemeClr val="accent1"/>
+          </a:fillRef>
+          <a:effectRef idx="0">
+            <a:schemeClr val="accent1"/>
+          </a:effectRef>
+          <a:fontRef idx="minor">
+            <a:schemeClr val="lt1"/>
+          </a:fontRef>
+        </p:style>
+        <p:txBody>
+          <a:bodyPr rtlCol="0" anchor="ctr"/>
+          <a:lstStyle/>
+          <a:p>
+            <a:endParaRPr lang="LID4096" dirty="0"/>
+          </a:p>
+        </p:txBody>
+      </p:sp>
+      <p:sp>
+        <p:nvSpPr>
+          <p:cNvPr id="4" name="Rectangle: Rounded Corners 3">
+            <a:extLst>
+              <a:ext uri="{FF2B5EF4-FFF2-40B4-BE49-F238E27FC236}">
+                <a16:creationId xmlns:a16="http://schemas.microsoft.com/office/drawing/2014/main" id="{1A5180B9-B864-4716-A283-6299350C3961}"/>
+              </a:ext>
+            </a:extLst>
+          </p:cNvPr>
+          <p:cNvSpPr/>
+          <p:nvPr/>
+        </p:nvSpPr>
+        <p:spPr>
+          <a:xfrm>
+            <a:off x="213441" y="915923"/>
+            <a:ext cx="689306" cy="404266"/>
+          </a:xfrm>
+          <a:prstGeom prst="roundRect">
+            <a:avLst>
+              <a:gd name="adj" fmla="val 50000"/>
+            </a:avLst>
+          </a:prstGeom>
+          <a:solidFill>
+            <a:schemeClr val="accent4">
+              <a:lumMod val="40000"/>
+              <a:lumOff val="60000"/>
+            </a:schemeClr>
+          </a:solidFill>
+          <a:ln>
+            <a:noFill/>
+          </a:ln>
+        </p:spPr>
+        <p:style>
+          <a:lnRef idx="2">
+            <a:schemeClr val="accent1">
+              <a:shade val="50000"/>
+            </a:schemeClr>
+          </a:lnRef>
+          <a:fillRef idx="1">
+            <a:schemeClr val="accent1"/>
+          </a:fillRef>
+          <a:effectRef idx="0">
+            <a:schemeClr val="accent1"/>
+          </a:effectRef>
+          <a:fontRef idx="minor">
+            <a:schemeClr val="lt1"/>
+          </a:fontRef>
+        </p:style>
+        <p:txBody>
+          <a:bodyPr rtlCol="0" anchor="ctr"/>
+          <a:lstStyle/>
+          <a:p>
+            <a:pPr algn="ctr"/>
+            <a:r>
+              <a:rPr lang="en-SG" dirty="0">
+                <a:solidFill>
+                  <a:schemeClr val="tx1"/>
+                </a:solidFill>
+              </a:rPr>
+              <a:t>Yes</a:t>
+            </a:r>
+            <a:endParaRPr lang="LID4096" dirty="0">
+              <a:solidFill>
+                <a:schemeClr val="tx1"/>
+              </a:solidFill>
+            </a:endParaRPr>
+          </a:p>
+        </p:txBody>
+      </p:sp>
+      <p:sp>
+        <p:nvSpPr>
+          <p:cNvPr id="31" name="Rectangle: Rounded Corners 30">
+            <a:extLst>
+              <a:ext uri="{FF2B5EF4-FFF2-40B4-BE49-F238E27FC236}">
+                <a16:creationId xmlns:a16="http://schemas.microsoft.com/office/drawing/2014/main" id="{C3789098-F545-435E-A319-30B293DF8BEA}"/>
+              </a:ext>
+            </a:extLst>
+          </p:cNvPr>
+          <p:cNvSpPr/>
+          <p:nvPr/>
+        </p:nvSpPr>
+        <p:spPr>
+          <a:xfrm>
+            <a:off x="1038019" y="904045"/>
+            <a:ext cx="689306" cy="404266"/>
+          </a:xfrm>
+          <a:prstGeom prst="roundRect">
+            <a:avLst>
+              <a:gd name="adj" fmla="val 50000"/>
+            </a:avLst>
+          </a:prstGeom>
+          <a:solidFill>
+            <a:schemeClr val="accent4">
+              <a:lumMod val="40000"/>
+              <a:lumOff val="60000"/>
+            </a:schemeClr>
+          </a:solidFill>
+          <a:ln>
+            <a:noFill/>
+          </a:ln>
+        </p:spPr>
+        <p:style>
+          <a:lnRef idx="2">
+            <a:schemeClr val="accent1">
+              <a:shade val="50000"/>
+            </a:schemeClr>
+          </a:lnRef>
+          <a:fillRef idx="1">
+            <a:schemeClr val="accent1"/>
+          </a:fillRef>
+          <a:effectRef idx="0">
+            <a:schemeClr val="accent1"/>
+          </a:effectRef>
+          <a:fontRef idx="minor">
+            <a:schemeClr val="lt1"/>
+          </a:fontRef>
+        </p:style>
+        <p:txBody>
+          <a:bodyPr rtlCol="0" anchor="ctr"/>
+          <a:lstStyle/>
+          <a:p>
+            <a:pPr algn="ctr"/>
+            <a:r>
+              <a:rPr lang="en-SG" dirty="0">
+                <a:solidFill>
+                  <a:schemeClr val="tx1"/>
+                </a:solidFill>
+              </a:rPr>
+              <a:t>No</a:t>
+            </a:r>
+            <a:endParaRPr lang="LID4096" dirty="0">
+              <a:solidFill>
+                <a:schemeClr val="tx1"/>
+              </a:solidFill>
+            </a:endParaRPr>
+          </a:p>
+        </p:txBody>
+      </p:sp>
+      <p:sp>
+        <p:nvSpPr>
+          <p:cNvPr id="32" name="Rectangle: Rounded Corners 31">
+            <a:extLst>
+              <a:ext uri="{FF2B5EF4-FFF2-40B4-BE49-F238E27FC236}">
+                <a16:creationId xmlns:a16="http://schemas.microsoft.com/office/drawing/2014/main" id="{1ED7017C-AEA7-42DC-B107-ADC6CACF3015}"/>
+              </a:ext>
+            </a:extLst>
+          </p:cNvPr>
+          <p:cNvSpPr/>
+          <p:nvPr/>
+        </p:nvSpPr>
+        <p:spPr>
+          <a:xfrm>
+            <a:off x="1860915" y="904045"/>
+            <a:ext cx="892406" cy="404266"/>
+          </a:xfrm>
+          <a:prstGeom prst="roundRect">
+            <a:avLst>
+              <a:gd name="adj" fmla="val 50000"/>
+            </a:avLst>
+          </a:prstGeom>
+          <a:solidFill>
+            <a:schemeClr val="accent4">
+              <a:lumMod val="40000"/>
+              <a:lumOff val="60000"/>
+            </a:schemeClr>
+          </a:solidFill>
+          <a:ln w="38100">
+            <a:solidFill>
+              <a:srgbClr val="1A965B"/>
+            </a:solidFill>
+          </a:ln>
+        </p:spPr>
+        <p:style>
+          <a:lnRef idx="2">
+            <a:schemeClr val="accent1">
+              <a:shade val="50000"/>
+            </a:schemeClr>
+          </a:lnRef>
+          <a:fillRef idx="1">
+            <a:schemeClr val="accent1"/>
+          </a:fillRef>
+          <a:effectRef idx="0">
+            <a:schemeClr val="accent1"/>
+          </a:effectRef>
+          <a:fontRef idx="minor">
+            <a:schemeClr val="lt1"/>
+          </a:fontRef>
+        </p:style>
+        <p:txBody>
+          <a:bodyPr rtlCol="0" anchor="ctr"/>
+          <a:lstStyle/>
+          <a:p>
+            <a:pPr algn="ctr"/>
+            <a:r>
+              <a:rPr lang="en-SG" dirty="0">
+                <a:solidFill>
+                  <a:schemeClr val="tx1"/>
+                </a:solidFill>
+              </a:rPr>
+              <a:t>Either</a:t>
+            </a:r>
+            <a:endParaRPr lang="LID4096" dirty="0">
+              <a:solidFill>
+                <a:schemeClr val="tx1"/>
+              </a:solidFill>
+            </a:endParaRPr>
+          </a:p>
+        </p:txBody>
+      </p:sp>
+      <p:sp>
+        <p:nvSpPr>
+          <p:cNvPr id="33" name="Rectangle: Rounded Corners 32">
+            <a:extLst>
+              <a:ext uri="{FF2B5EF4-FFF2-40B4-BE49-F238E27FC236}">
+                <a16:creationId xmlns:a16="http://schemas.microsoft.com/office/drawing/2014/main" id="{E6514701-6063-4C8B-A7AF-D6F00B8A1CD1}"/>
+              </a:ext>
+            </a:extLst>
+          </p:cNvPr>
+          <p:cNvSpPr/>
+          <p:nvPr/>
+        </p:nvSpPr>
+        <p:spPr>
+          <a:xfrm>
+            <a:off x="213441" y="1890658"/>
+            <a:ext cx="689306" cy="404266"/>
+          </a:xfrm>
+          <a:prstGeom prst="roundRect">
+            <a:avLst>
+              <a:gd name="adj" fmla="val 50000"/>
+            </a:avLst>
+          </a:prstGeom>
+          <a:solidFill>
+            <a:schemeClr val="accent4">
+              <a:lumMod val="40000"/>
+              <a:lumOff val="60000"/>
+            </a:schemeClr>
+          </a:solidFill>
+          <a:ln w="38100">
+            <a:solidFill>
+              <a:srgbClr val="1A965B"/>
+            </a:solidFill>
+          </a:ln>
+        </p:spPr>
+        <p:style>
+          <a:lnRef idx="2">
+            <a:schemeClr val="accent1">
+              <a:shade val="50000"/>
+            </a:schemeClr>
+          </a:lnRef>
+          <a:fillRef idx="1">
+            <a:schemeClr val="accent1"/>
+          </a:fillRef>
+          <a:effectRef idx="0">
+            <a:schemeClr val="accent1"/>
+          </a:effectRef>
+          <a:fontRef idx="minor">
+            <a:schemeClr val="lt1"/>
+          </a:fontRef>
+        </p:style>
+        <p:txBody>
+          <a:bodyPr rtlCol="0" anchor="ctr"/>
+          <a:lstStyle/>
+          <a:p>
+            <a:pPr algn="ctr"/>
+            <a:r>
+              <a:rPr lang="en-SG" dirty="0">
+                <a:solidFill>
+                  <a:schemeClr val="tx1"/>
+                </a:solidFill>
+              </a:rPr>
+              <a:t>Yes</a:t>
+            </a:r>
+            <a:endParaRPr lang="LID4096" dirty="0">
+              <a:solidFill>
+                <a:schemeClr val="tx1"/>
+              </a:solidFill>
+            </a:endParaRPr>
+          </a:p>
+        </p:txBody>
+      </p:sp>
+      <p:sp>
+        <p:nvSpPr>
+          <p:cNvPr id="34" name="Rectangle: Rounded Corners 33">
+            <a:extLst>
+              <a:ext uri="{FF2B5EF4-FFF2-40B4-BE49-F238E27FC236}">
+                <a16:creationId xmlns:a16="http://schemas.microsoft.com/office/drawing/2014/main" id="{C5970592-96D1-464B-A586-BB575AC917D0}"/>
+              </a:ext>
+            </a:extLst>
+          </p:cNvPr>
+          <p:cNvSpPr/>
+          <p:nvPr/>
+        </p:nvSpPr>
+        <p:spPr>
+          <a:xfrm>
+            <a:off x="1038019" y="1878780"/>
+            <a:ext cx="689306" cy="404266"/>
+          </a:xfrm>
+          <a:prstGeom prst="roundRect">
+            <a:avLst>
+              <a:gd name="adj" fmla="val 50000"/>
+            </a:avLst>
+          </a:prstGeom>
+          <a:solidFill>
+            <a:schemeClr val="accent4">
+              <a:lumMod val="40000"/>
+              <a:lumOff val="60000"/>
+            </a:schemeClr>
+          </a:solidFill>
+          <a:ln>
+            <a:noFill/>
+          </a:ln>
+        </p:spPr>
+        <p:style>
+          <a:lnRef idx="2">
+            <a:schemeClr val="accent1">
+              <a:shade val="50000"/>
+            </a:schemeClr>
+          </a:lnRef>
+          <a:fillRef idx="1">
+            <a:schemeClr val="accent1"/>
+          </a:fillRef>
+          <a:effectRef idx="0">
+            <a:schemeClr val="accent1"/>
+          </a:effectRef>
+          <a:fontRef idx="minor">
+            <a:schemeClr val="lt1"/>
+          </a:fontRef>
+        </p:style>
+        <p:txBody>
+          <a:bodyPr rtlCol="0" anchor="ctr"/>
+          <a:lstStyle/>
+          <a:p>
+            <a:pPr algn="ctr"/>
+            <a:r>
+              <a:rPr lang="en-SG" dirty="0">
+                <a:solidFill>
+                  <a:schemeClr val="tx1"/>
+                </a:solidFill>
+              </a:rPr>
+              <a:t>No</a:t>
+            </a:r>
+            <a:endParaRPr lang="LID4096" dirty="0">
+              <a:solidFill>
+                <a:schemeClr val="tx1"/>
+              </a:solidFill>
+            </a:endParaRPr>
+          </a:p>
+        </p:txBody>
+      </p:sp>
+      <p:sp>
+        <p:nvSpPr>
+          <p:cNvPr id="36" name="TextBox 35">
+            <a:extLst>
+              <a:ext uri="{FF2B5EF4-FFF2-40B4-BE49-F238E27FC236}">
+                <a16:creationId xmlns:a16="http://schemas.microsoft.com/office/drawing/2014/main" id="{9BA6A38E-BD0F-4EEB-81CC-FC7CA3638E2E}"/>
+              </a:ext>
+            </a:extLst>
+          </p:cNvPr>
+          <p:cNvSpPr txBox="1"/>
+          <p:nvPr/>
+        </p:nvSpPr>
+        <p:spPr>
+          <a:xfrm>
+            <a:off x="292716" y="1459044"/>
+            <a:ext cx="729687" cy="369332"/>
+          </a:xfrm>
+          <a:prstGeom prst="rect">
+            <a:avLst/>
+          </a:prstGeom>
+          <a:noFill/>
+        </p:spPr>
+        <p:txBody>
+          <a:bodyPr wrap="none" rtlCol="0">
+            <a:spAutoFit/>
+          </a:bodyPr>
+          <a:lstStyle/>
+          <a:p>
+            <a:r>
+              <a:rPr lang="en-US" dirty="0"/>
+              <a:t>Spicy:</a:t>
+            </a:r>
+            <a:endParaRPr lang="LID4096" dirty="0"/>
+          </a:p>
+        </p:txBody>
+      </p:sp>
+      <p:sp>
+        <p:nvSpPr>
+          <p:cNvPr id="45" name="TextBox 44">
+            <a:extLst>
+              <a:ext uri="{FF2B5EF4-FFF2-40B4-BE49-F238E27FC236}">
+                <a16:creationId xmlns:a16="http://schemas.microsoft.com/office/drawing/2014/main" id="{92593016-EE68-4DB1-9FF9-ED36722BD3C3}"/>
+              </a:ext>
+            </a:extLst>
+          </p:cNvPr>
+          <p:cNvSpPr txBox="1"/>
+          <p:nvPr/>
+        </p:nvSpPr>
+        <p:spPr>
+          <a:xfrm>
+            <a:off x="291034" y="2422526"/>
+            <a:ext cx="567784" cy="369332"/>
+          </a:xfrm>
+          <a:prstGeom prst="rect">
+            <a:avLst/>
+          </a:prstGeom>
+          <a:noFill/>
+        </p:spPr>
+        <p:txBody>
+          <a:bodyPr wrap="none" rtlCol="0">
+            <a:spAutoFit/>
+          </a:bodyPr>
+          <a:lstStyle/>
+          <a:p>
+            <a:r>
+              <a:rPr lang="en-US" dirty="0"/>
+              <a:t>hot:</a:t>
+            </a:r>
+            <a:endParaRPr lang="LID4096" dirty="0"/>
+          </a:p>
+        </p:txBody>
+      </p:sp>
+      <p:sp>
+        <p:nvSpPr>
+          <p:cNvPr id="49" name="TextBox 48">
+            <a:extLst>
+              <a:ext uri="{FF2B5EF4-FFF2-40B4-BE49-F238E27FC236}">
+                <a16:creationId xmlns:a16="http://schemas.microsoft.com/office/drawing/2014/main" id="{B6FA3526-3206-4087-994E-D0BD19A4ECE2}"/>
+              </a:ext>
+            </a:extLst>
+          </p:cNvPr>
+          <p:cNvSpPr txBox="1"/>
+          <p:nvPr/>
+        </p:nvSpPr>
+        <p:spPr>
+          <a:xfrm>
+            <a:off x="291034" y="3374130"/>
+            <a:ext cx="1236044" cy="369332"/>
+          </a:xfrm>
+          <a:prstGeom prst="rect">
+            <a:avLst/>
+          </a:prstGeom>
+          <a:noFill/>
+        </p:spPr>
+        <p:txBody>
+          <a:bodyPr wrap="none" rtlCol="0">
+            <a:spAutoFit/>
+          </a:bodyPr>
+          <a:lstStyle/>
+          <a:p>
+            <a:r>
+              <a:rPr lang="en-US" dirty="0"/>
+              <a:t>vegetarian:</a:t>
+            </a:r>
+            <a:endParaRPr lang="LID4096" dirty="0"/>
+          </a:p>
+        </p:txBody>
+      </p:sp>
+      <p:sp>
+        <p:nvSpPr>
+          <p:cNvPr id="50" name="Rectangle: Rounded Corners 49">
+            <a:extLst>
+              <a:ext uri="{FF2B5EF4-FFF2-40B4-BE49-F238E27FC236}">
+                <a16:creationId xmlns:a16="http://schemas.microsoft.com/office/drawing/2014/main" id="{DC7BBA36-9667-4BD9-84B1-6F547E17CFBB}"/>
+              </a:ext>
+            </a:extLst>
+          </p:cNvPr>
+          <p:cNvSpPr/>
+          <p:nvPr/>
+        </p:nvSpPr>
+        <p:spPr>
+          <a:xfrm>
+            <a:off x="1860915" y="1878780"/>
+            <a:ext cx="892406" cy="404266"/>
+          </a:xfrm>
+          <a:prstGeom prst="roundRect">
+            <a:avLst>
+              <a:gd name="adj" fmla="val 50000"/>
+            </a:avLst>
+          </a:prstGeom>
+          <a:solidFill>
+            <a:schemeClr val="accent4">
+              <a:lumMod val="40000"/>
+              <a:lumOff val="60000"/>
+            </a:schemeClr>
+          </a:solidFill>
+          <a:ln>
+            <a:noFill/>
+          </a:ln>
+        </p:spPr>
+        <p:style>
+          <a:lnRef idx="2">
+            <a:schemeClr val="accent1">
+              <a:shade val="50000"/>
+            </a:schemeClr>
+          </a:lnRef>
+          <a:fillRef idx="1">
+            <a:schemeClr val="accent1"/>
+          </a:fillRef>
+          <a:effectRef idx="0">
+            <a:schemeClr val="accent1"/>
+          </a:effectRef>
+          <a:fontRef idx="minor">
+            <a:schemeClr val="lt1"/>
+          </a:fontRef>
+        </p:style>
+        <p:txBody>
+          <a:bodyPr rtlCol="0" anchor="ctr"/>
+          <a:lstStyle/>
+          <a:p>
+            <a:pPr algn="ctr"/>
+            <a:r>
+              <a:rPr lang="en-SG" dirty="0">
+                <a:solidFill>
+                  <a:schemeClr val="tx1"/>
+                </a:solidFill>
+              </a:rPr>
+              <a:t>Either</a:t>
+            </a:r>
+            <a:endParaRPr lang="LID4096" dirty="0">
+              <a:solidFill>
+                <a:schemeClr val="tx1"/>
+              </a:solidFill>
+            </a:endParaRPr>
+          </a:p>
+        </p:txBody>
+      </p:sp>
+      <p:sp>
+        <p:nvSpPr>
+          <p:cNvPr id="51" name="Rectangle: Rounded Corners 50">
+            <a:extLst>
+              <a:ext uri="{FF2B5EF4-FFF2-40B4-BE49-F238E27FC236}">
+                <a16:creationId xmlns:a16="http://schemas.microsoft.com/office/drawing/2014/main" id="{4662BAE4-F19E-4E0F-B0C0-2B1EDA08CA7A}"/>
+              </a:ext>
+            </a:extLst>
+          </p:cNvPr>
+          <p:cNvSpPr/>
+          <p:nvPr/>
+        </p:nvSpPr>
+        <p:spPr>
+          <a:xfrm>
+            <a:off x="213441" y="2849663"/>
+            <a:ext cx="689306" cy="404266"/>
+          </a:xfrm>
+          <a:prstGeom prst="roundRect">
+            <a:avLst>
+              <a:gd name="adj" fmla="val 50000"/>
+            </a:avLst>
+          </a:prstGeom>
+          <a:solidFill>
+            <a:schemeClr val="accent4">
+              <a:lumMod val="40000"/>
+              <a:lumOff val="60000"/>
+            </a:schemeClr>
+          </a:solidFill>
+          <a:ln>
+            <a:noFill/>
+          </a:ln>
+        </p:spPr>
+        <p:style>
+          <a:lnRef idx="2">
+            <a:schemeClr val="accent1">
+              <a:shade val="50000"/>
+            </a:schemeClr>
+          </a:lnRef>
+          <a:fillRef idx="1">
+            <a:schemeClr val="accent1"/>
+          </a:fillRef>
+          <a:effectRef idx="0">
+            <a:schemeClr val="accent1"/>
+          </a:effectRef>
+          <a:fontRef idx="minor">
+            <a:schemeClr val="lt1"/>
+          </a:fontRef>
+        </p:style>
+        <p:txBody>
+          <a:bodyPr rtlCol="0" anchor="ctr"/>
+          <a:lstStyle/>
+          <a:p>
+            <a:pPr algn="ctr"/>
+            <a:r>
+              <a:rPr lang="en-SG" dirty="0">
+                <a:solidFill>
+                  <a:schemeClr val="tx1"/>
+                </a:solidFill>
+              </a:rPr>
+              <a:t>Yes</a:t>
+            </a:r>
+            <a:endParaRPr lang="LID4096" dirty="0">
+              <a:solidFill>
+                <a:schemeClr val="tx1"/>
+              </a:solidFill>
+            </a:endParaRPr>
+          </a:p>
+        </p:txBody>
+      </p:sp>
+      <p:sp>
+        <p:nvSpPr>
+          <p:cNvPr id="52" name="Rectangle: Rounded Corners 51">
+            <a:extLst>
+              <a:ext uri="{FF2B5EF4-FFF2-40B4-BE49-F238E27FC236}">
+                <a16:creationId xmlns:a16="http://schemas.microsoft.com/office/drawing/2014/main" id="{CB652221-1DC6-46F3-A961-7ED63E405064}"/>
+              </a:ext>
+            </a:extLst>
+          </p:cNvPr>
+          <p:cNvSpPr/>
+          <p:nvPr/>
+        </p:nvSpPr>
+        <p:spPr>
+          <a:xfrm>
+            <a:off x="1038019" y="2837785"/>
+            <a:ext cx="689306" cy="404266"/>
+          </a:xfrm>
+          <a:prstGeom prst="roundRect">
+            <a:avLst>
+              <a:gd name="adj" fmla="val 50000"/>
+            </a:avLst>
+          </a:prstGeom>
+          <a:solidFill>
+            <a:schemeClr val="accent4">
+              <a:lumMod val="40000"/>
+              <a:lumOff val="60000"/>
+            </a:schemeClr>
+          </a:solidFill>
+          <a:ln w="38100">
+            <a:solidFill>
+              <a:srgbClr val="1A965B"/>
+            </a:solidFill>
+          </a:ln>
+        </p:spPr>
+        <p:style>
+          <a:lnRef idx="2">
+            <a:schemeClr val="accent1">
+              <a:shade val="50000"/>
+            </a:schemeClr>
+          </a:lnRef>
+          <a:fillRef idx="1">
+            <a:schemeClr val="accent1"/>
+          </a:fillRef>
+          <a:effectRef idx="0">
+            <a:schemeClr val="accent1"/>
+          </a:effectRef>
+          <a:fontRef idx="minor">
+            <a:schemeClr val="lt1"/>
+          </a:fontRef>
+        </p:style>
+        <p:txBody>
+          <a:bodyPr rtlCol="0" anchor="ctr"/>
+          <a:lstStyle/>
+          <a:p>
+            <a:pPr algn="ctr"/>
+            <a:r>
+              <a:rPr lang="en-SG" dirty="0">
+                <a:solidFill>
+                  <a:schemeClr val="tx1"/>
+                </a:solidFill>
+              </a:rPr>
+              <a:t>No</a:t>
+            </a:r>
+            <a:endParaRPr lang="LID4096" dirty="0">
+              <a:solidFill>
+                <a:schemeClr val="tx1"/>
+              </a:solidFill>
+            </a:endParaRPr>
+          </a:p>
+        </p:txBody>
+      </p:sp>
+      <p:sp>
+        <p:nvSpPr>
+          <p:cNvPr id="53" name="Rectangle: Rounded Corners 52">
+            <a:extLst>
+              <a:ext uri="{FF2B5EF4-FFF2-40B4-BE49-F238E27FC236}">
+                <a16:creationId xmlns:a16="http://schemas.microsoft.com/office/drawing/2014/main" id="{E7C0D39D-40D2-4B19-902F-193713EED3D8}"/>
+              </a:ext>
+            </a:extLst>
+          </p:cNvPr>
+          <p:cNvSpPr/>
+          <p:nvPr/>
+        </p:nvSpPr>
+        <p:spPr>
+          <a:xfrm>
+            <a:off x="1860915" y="2837785"/>
+            <a:ext cx="892406" cy="404266"/>
+          </a:xfrm>
+          <a:prstGeom prst="roundRect">
+            <a:avLst>
+              <a:gd name="adj" fmla="val 50000"/>
+            </a:avLst>
+          </a:prstGeom>
+          <a:solidFill>
+            <a:schemeClr val="accent4">
+              <a:lumMod val="40000"/>
+              <a:lumOff val="60000"/>
+            </a:schemeClr>
+          </a:solidFill>
+          <a:ln>
+            <a:noFill/>
+          </a:ln>
+        </p:spPr>
+        <p:style>
+          <a:lnRef idx="2">
+            <a:schemeClr val="accent1">
+              <a:shade val="50000"/>
+            </a:schemeClr>
+          </a:lnRef>
+          <a:fillRef idx="1">
+            <a:schemeClr val="accent1"/>
+          </a:fillRef>
+          <a:effectRef idx="0">
+            <a:schemeClr val="accent1"/>
+          </a:effectRef>
+          <a:fontRef idx="minor">
+            <a:schemeClr val="lt1"/>
+          </a:fontRef>
+        </p:style>
+        <p:txBody>
+          <a:bodyPr rtlCol="0" anchor="ctr"/>
+          <a:lstStyle/>
+          <a:p>
+            <a:pPr algn="ctr"/>
+            <a:r>
+              <a:rPr lang="en-SG" dirty="0">
+                <a:solidFill>
+                  <a:schemeClr val="tx1"/>
+                </a:solidFill>
+              </a:rPr>
+              <a:t>Either</a:t>
+            </a:r>
+            <a:endParaRPr lang="LID4096" dirty="0">
+              <a:solidFill>
+                <a:schemeClr val="tx1"/>
+              </a:solidFill>
+            </a:endParaRPr>
+          </a:p>
+        </p:txBody>
+      </p:sp>
+      <p:sp>
+        <p:nvSpPr>
+          <p:cNvPr id="54" name="Rectangle: Rounded Corners 53">
+            <a:extLst>
+              <a:ext uri="{FF2B5EF4-FFF2-40B4-BE49-F238E27FC236}">
+                <a16:creationId xmlns:a16="http://schemas.microsoft.com/office/drawing/2014/main" id="{2D8735B8-9DB6-4CA9-9726-28D15C9CA92F}"/>
+              </a:ext>
+            </a:extLst>
+          </p:cNvPr>
+          <p:cNvSpPr/>
+          <p:nvPr/>
+        </p:nvSpPr>
+        <p:spPr>
+          <a:xfrm>
+            <a:off x="213441" y="3808668"/>
+            <a:ext cx="689306" cy="404266"/>
+          </a:xfrm>
+          <a:prstGeom prst="roundRect">
+            <a:avLst>
+              <a:gd name="adj" fmla="val 50000"/>
+            </a:avLst>
+          </a:prstGeom>
+          <a:solidFill>
+            <a:schemeClr val="accent4">
+              <a:lumMod val="40000"/>
+              <a:lumOff val="60000"/>
+            </a:schemeClr>
+          </a:solidFill>
+          <a:ln>
+            <a:noFill/>
+          </a:ln>
+        </p:spPr>
+        <p:style>
+          <a:lnRef idx="2">
+            <a:schemeClr val="accent1">
+              <a:shade val="50000"/>
+            </a:schemeClr>
+          </a:lnRef>
+          <a:fillRef idx="1">
+            <a:schemeClr val="accent1"/>
+          </a:fillRef>
+          <a:effectRef idx="0">
+            <a:schemeClr val="accent1"/>
+          </a:effectRef>
+          <a:fontRef idx="minor">
+            <a:schemeClr val="lt1"/>
+          </a:fontRef>
+        </p:style>
+        <p:txBody>
+          <a:bodyPr rtlCol="0" anchor="ctr"/>
+          <a:lstStyle/>
+          <a:p>
+            <a:pPr algn="ctr"/>
+            <a:r>
+              <a:rPr lang="en-SG" dirty="0">
+                <a:solidFill>
+                  <a:schemeClr val="tx1"/>
+                </a:solidFill>
+              </a:rPr>
+              <a:t>Yes</a:t>
+            </a:r>
+            <a:endParaRPr lang="LID4096" dirty="0">
+              <a:solidFill>
+                <a:schemeClr val="tx1"/>
+              </a:solidFill>
+            </a:endParaRPr>
+          </a:p>
+        </p:txBody>
+      </p:sp>
+      <p:sp>
+        <p:nvSpPr>
+          <p:cNvPr id="55" name="Rectangle: Rounded Corners 54">
+            <a:extLst>
+              <a:ext uri="{FF2B5EF4-FFF2-40B4-BE49-F238E27FC236}">
+                <a16:creationId xmlns:a16="http://schemas.microsoft.com/office/drawing/2014/main" id="{3390F872-F7AA-4DBE-94B5-F514F0D53CDE}"/>
+              </a:ext>
+            </a:extLst>
+          </p:cNvPr>
+          <p:cNvSpPr/>
+          <p:nvPr/>
+        </p:nvSpPr>
+        <p:spPr>
+          <a:xfrm>
+            <a:off x="1038019" y="3796790"/>
+            <a:ext cx="689306" cy="404266"/>
+          </a:xfrm>
+          <a:prstGeom prst="roundRect">
+            <a:avLst>
+              <a:gd name="adj" fmla="val 50000"/>
+            </a:avLst>
+          </a:prstGeom>
+          <a:solidFill>
+            <a:schemeClr val="accent4">
+              <a:lumMod val="40000"/>
+              <a:lumOff val="60000"/>
+            </a:schemeClr>
+          </a:solidFill>
+          <a:ln>
+            <a:noFill/>
+          </a:ln>
+        </p:spPr>
+        <p:style>
+          <a:lnRef idx="2">
+            <a:schemeClr val="accent1">
+              <a:shade val="50000"/>
+            </a:schemeClr>
+          </a:lnRef>
+          <a:fillRef idx="1">
+            <a:schemeClr val="accent1"/>
+          </a:fillRef>
+          <a:effectRef idx="0">
+            <a:schemeClr val="accent1"/>
+          </a:effectRef>
+          <a:fontRef idx="minor">
+            <a:schemeClr val="lt1"/>
+          </a:fontRef>
+        </p:style>
+        <p:txBody>
+          <a:bodyPr rtlCol="0" anchor="ctr"/>
+          <a:lstStyle/>
+          <a:p>
+            <a:pPr algn="ctr"/>
+            <a:r>
+              <a:rPr lang="en-SG" dirty="0">
+                <a:solidFill>
+                  <a:schemeClr val="tx1"/>
+                </a:solidFill>
+              </a:rPr>
+              <a:t>No</a:t>
+            </a:r>
+            <a:endParaRPr lang="LID4096" dirty="0">
+              <a:solidFill>
+                <a:schemeClr val="tx1"/>
+              </a:solidFill>
+            </a:endParaRPr>
+          </a:p>
+        </p:txBody>
+      </p:sp>
+      <p:sp>
+        <p:nvSpPr>
+          <p:cNvPr id="56" name="Rectangle: Rounded Corners 55">
+            <a:extLst>
+              <a:ext uri="{FF2B5EF4-FFF2-40B4-BE49-F238E27FC236}">
+                <a16:creationId xmlns:a16="http://schemas.microsoft.com/office/drawing/2014/main" id="{4BAEB185-3F8B-4A09-BBAA-2A5A93EB73B4}"/>
+              </a:ext>
+            </a:extLst>
+          </p:cNvPr>
+          <p:cNvSpPr/>
+          <p:nvPr/>
+        </p:nvSpPr>
+        <p:spPr>
+          <a:xfrm>
+            <a:off x="1860915" y="3796790"/>
+            <a:ext cx="892406" cy="404266"/>
+          </a:xfrm>
+          <a:prstGeom prst="roundRect">
+            <a:avLst>
+              <a:gd name="adj" fmla="val 50000"/>
+            </a:avLst>
+          </a:prstGeom>
+          <a:solidFill>
+            <a:schemeClr val="accent4">
+              <a:lumMod val="40000"/>
+              <a:lumOff val="60000"/>
+            </a:schemeClr>
+          </a:solidFill>
+          <a:ln w="38100">
+            <a:solidFill>
+              <a:srgbClr val="1A965B"/>
+            </a:solidFill>
+          </a:ln>
+        </p:spPr>
+        <p:style>
+          <a:lnRef idx="2">
+            <a:schemeClr val="accent1">
+              <a:shade val="50000"/>
+            </a:schemeClr>
+          </a:lnRef>
+          <a:fillRef idx="1">
+            <a:schemeClr val="accent1"/>
+          </a:fillRef>
+          <a:effectRef idx="0">
+            <a:schemeClr val="accent1"/>
+          </a:effectRef>
+          <a:fontRef idx="minor">
+            <a:schemeClr val="lt1"/>
+          </a:fontRef>
+        </p:style>
+        <p:txBody>
+          <a:bodyPr rtlCol="0" anchor="ctr"/>
+          <a:lstStyle/>
+          <a:p>
+            <a:pPr algn="ctr"/>
+            <a:r>
+              <a:rPr lang="en-SG" dirty="0">
+                <a:solidFill>
+                  <a:schemeClr val="tx1"/>
+                </a:solidFill>
+              </a:rPr>
+              <a:t>Either</a:t>
+            </a:r>
+            <a:endParaRPr lang="LID4096" dirty="0">
+              <a:solidFill>
+                <a:schemeClr val="tx1"/>
+              </a:solidFill>
+            </a:endParaRPr>
           </a:p>
         </p:txBody>
       </p:sp>
     </p:spTree>
     <p:extLst>
       <p:ext uri="{BB962C8B-B14F-4D97-AF65-F5344CB8AC3E}">
-        <p14:creationId xmlns:p14="http://schemas.microsoft.com/office/powerpoint/2010/main" val="723555658"/>
+        <p14:creationId xmlns:p14="http://schemas.microsoft.com/office/powerpoint/2010/main" val="666255775"/>
       </p:ext>
     </p:extLst>
   </p:cSld>
@@ -5430,258 +7066,42 @@
           <a:chExt cx="0" cy="0"/>
         </a:xfrm>
       </p:grpSpPr>
-      <p:sp>
-        <p:nvSpPr>
-          <p:cNvPr id="2" name="Title 1">
-            <a:extLst>
-              <a:ext uri="{FF2B5EF4-FFF2-40B4-BE49-F238E27FC236}">
-                <a16:creationId xmlns:a16="http://schemas.microsoft.com/office/drawing/2014/main" id="{CECD7753-200C-4BC6-A903-A523C540B60D}"/>
-              </a:ext>
-            </a:extLst>
-          </p:cNvPr>
-          <p:cNvSpPr>
-            <a:spLocks noGrp="1"/>
-          </p:cNvSpPr>
-          <p:nvPr>
-            <p:ph type="title"/>
-          </p:nvPr>
-        </p:nvSpPr>
-        <p:spPr/>
-        <p:txBody>
-          <a:bodyPr/>
-          <a:lstStyle/>
-          <a:p>
-            <a:endParaRPr lang="en-GB" dirty="0"/>
-          </a:p>
-        </p:txBody>
-      </p:sp>
-      <p:sp>
-        <p:nvSpPr>
-          <p:cNvPr id="3" name="Content Placeholder 2">
-            <a:extLst>
-              <a:ext uri="{FF2B5EF4-FFF2-40B4-BE49-F238E27FC236}">
-                <a16:creationId xmlns:a16="http://schemas.microsoft.com/office/drawing/2014/main" id="{067DDC76-B3EC-4DFB-87BE-AB817AD96F04}"/>
-              </a:ext>
-            </a:extLst>
-          </p:cNvPr>
-          <p:cNvSpPr>
-            <a:spLocks noGrp="1"/>
-          </p:cNvSpPr>
-          <p:nvPr>
-            <p:ph idx="1"/>
-          </p:nvPr>
-        </p:nvSpPr>
-        <p:spPr/>
-        <p:txBody>
-          <a:bodyPr/>
-          <a:lstStyle/>
-          <a:p>
-            <a:endParaRPr lang="en-GB" dirty="0"/>
-          </a:p>
-        </p:txBody>
-      </p:sp>
-      <p:sp>
-        <p:nvSpPr>
-          <p:cNvPr id="4" name="Rectangle: Rounded Corners 3">
-            <a:extLst>
-              <a:ext uri="{FF2B5EF4-FFF2-40B4-BE49-F238E27FC236}">
-                <a16:creationId xmlns:a16="http://schemas.microsoft.com/office/drawing/2014/main" id="{55D99FD5-7981-4A79-A135-04BA07BF39DE}"/>
-              </a:ext>
-            </a:extLst>
-          </p:cNvPr>
-          <p:cNvSpPr/>
+      <p:pic>
+        <p:nvPicPr>
+          <p:cNvPr id="5" name="Picture 4">
+            <a:extLst>
+              <a:ext uri="{FF2B5EF4-FFF2-40B4-BE49-F238E27FC236}">
+                <a16:creationId xmlns:a16="http://schemas.microsoft.com/office/drawing/2014/main" id="{B10385B6-97EE-45F8-AEF1-4E55F71E8839}"/>
+              </a:ext>
+            </a:extLst>
+          </p:cNvPr>
+          <p:cNvPicPr>
+            <a:picLocks noChangeAspect="1"/>
+          </p:cNvPicPr>
           <p:nvPr/>
-        </p:nvSpPr>
+        </p:nvPicPr>
+        <p:blipFill>
+          <a:blip r:embed="rId2"/>
+          <a:stretch>
+            <a:fillRect/>
+          </a:stretch>
+        </p:blipFill>
         <p:spPr>
           <a:xfrm>
-            <a:off x="523528" y="201295"/>
-            <a:ext cx="289367" cy="45719"/>
-          </a:xfrm>
-          <a:prstGeom prst="roundRect">
-            <a:avLst/>
-          </a:prstGeom>
-        </p:spPr>
-        <p:style>
-          <a:lnRef idx="2">
-            <a:schemeClr val="accent1">
-              <a:shade val="50000"/>
-            </a:schemeClr>
-          </a:lnRef>
-          <a:fillRef idx="1">
-            <a:schemeClr val="accent1"/>
-          </a:fillRef>
-          <a:effectRef idx="0">
-            <a:schemeClr val="accent1"/>
-          </a:effectRef>
-          <a:fontRef idx="minor">
-            <a:schemeClr val="lt1"/>
-          </a:fontRef>
-        </p:style>
-        <p:txBody>
-          <a:bodyPr rtlCol="0" anchor="ctr"/>
-          <a:lstStyle/>
-          <a:p>
-            <a:pPr algn="ctr"/>
-            <a:endParaRPr lang="LID4096"/>
-          </a:p>
-        </p:txBody>
-      </p:sp>
-      <p:sp>
-        <p:nvSpPr>
-          <p:cNvPr id="5" name="Rectangle: Rounded Corners 4">
-            <a:extLst>
-              <a:ext uri="{FF2B5EF4-FFF2-40B4-BE49-F238E27FC236}">
-                <a16:creationId xmlns:a16="http://schemas.microsoft.com/office/drawing/2014/main" id="{CF88AA70-6ABC-44B1-8C33-6F892A2BA19E}"/>
-              </a:ext>
-            </a:extLst>
-          </p:cNvPr>
-          <p:cNvSpPr/>
-          <p:nvPr/>
-        </p:nvSpPr>
-        <p:spPr>
-          <a:xfrm>
-            <a:off x="523529" y="307976"/>
-            <a:ext cx="289367" cy="45719"/>
-          </a:xfrm>
-          <a:prstGeom prst="roundRect">
-            <a:avLst/>
-          </a:prstGeom>
-        </p:spPr>
-        <p:style>
-          <a:lnRef idx="2">
-            <a:schemeClr val="accent1">
-              <a:shade val="50000"/>
-            </a:schemeClr>
-          </a:lnRef>
-          <a:fillRef idx="1">
-            <a:schemeClr val="accent1"/>
-          </a:fillRef>
-          <a:effectRef idx="0">
-            <a:schemeClr val="accent1"/>
-          </a:effectRef>
-          <a:fontRef idx="minor">
-            <a:schemeClr val="lt1"/>
-          </a:fontRef>
-        </p:style>
-        <p:txBody>
-          <a:bodyPr rtlCol="0" anchor="ctr"/>
-          <a:lstStyle/>
-          <a:p>
-            <a:pPr algn="ctr"/>
-            <a:endParaRPr lang="LID4096"/>
-          </a:p>
-        </p:txBody>
-      </p:sp>
-      <p:sp>
-        <p:nvSpPr>
-          <p:cNvPr id="6" name="Rectangle: Rounded Corners 5">
-            <a:extLst>
-              <a:ext uri="{FF2B5EF4-FFF2-40B4-BE49-F238E27FC236}">
-                <a16:creationId xmlns:a16="http://schemas.microsoft.com/office/drawing/2014/main" id="{E655C7BA-406F-4030-A9E4-BC624F0C4280}"/>
-              </a:ext>
-            </a:extLst>
-          </p:cNvPr>
-          <p:cNvSpPr/>
-          <p:nvPr/>
-        </p:nvSpPr>
-        <p:spPr>
-          <a:xfrm>
-            <a:off x="523528" y="414657"/>
-            <a:ext cx="289367" cy="45719"/>
-          </a:xfrm>
-          <a:prstGeom prst="roundRect">
-            <a:avLst/>
-          </a:prstGeom>
-        </p:spPr>
-        <p:style>
-          <a:lnRef idx="2">
-            <a:schemeClr val="accent1">
-              <a:shade val="50000"/>
-            </a:schemeClr>
-          </a:lnRef>
-          <a:fillRef idx="1">
-            <a:schemeClr val="accent1"/>
-          </a:fillRef>
-          <a:effectRef idx="0">
-            <a:schemeClr val="accent1"/>
-          </a:effectRef>
-          <a:fontRef idx="minor">
-            <a:schemeClr val="lt1"/>
-          </a:fontRef>
-        </p:style>
-        <p:txBody>
-          <a:bodyPr rtlCol="0" anchor="ctr"/>
-          <a:lstStyle/>
-          <a:p>
-            <a:pPr algn="ctr"/>
-            <a:endParaRPr lang="LID4096"/>
-          </a:p>
-        </p:txBody>
-      </p:sp>
-      <p:sp>
-        <p:nvSpPr>
-          <p:cNvPr id="7" name="Rectangle 6">
-            <a:extLst>
-              <a:ext uri="{FF2B5EF4-FFF2-40B4-BE49-F238E27FC236}">
-                <a16:creationId xmlns:a16="http://schemas.microsoft.com/office/drawing/2014/main" id="{A01050D9-0E2A-4DD6-8E40-8EA7AF99A35A}"/>
-              </a:ext>
-            </a:extLst>
-          </p:cNvPr>
-          <p:cNvSpPr/>
-          <p:nvPr/>
-        </p:nvSpPr>
-        <p:spPr>
-          <a:xfrm>
-            <a:off x="0" y="-403412"/>
-            <a:ext cx="2974694" cy="8123626"/>
+            <a:off x="791455" y="1713052"/>
+            <a:ext cx="3658811" cy="2472637"/>
           </a:xfrm>
           <a:prstGeom prst="rect">
             <a:avLst/>
           </a:prstGeom>
-          <a:solidFill>
-            <a:schemeClr val="bg1"/>
-          </a:solidFill>
-          <a:ln>
-            <a:noFill/>
-          </a:ln>
-          <a:effectLst>
-            <a:outerShdw blurRad="50800" dist="38100" sx="101000" sy="101000" algn="l" rotWithShape="0">
-              <a:prstClr val="black">
-                <a:alpha val="40000"/>
-              </a:prstClr>
-            </a:outerShdw>
-          </a:effectLst>
-        </p:spPr>
-        <p:style>
-          <a:lnRef idx="2">
-            <a:schemeClr val="accent1">
-              <a:shade val="50000"/>
-            </a:schemeClr>
-          </a:lnRef>
-          <a:fillRef idx="1">
-            <a:schemeClr val="accent1"/>
-          </a:fillRef>
-          <a:effectRef idx="0">
-            <a:schemeClr val="accent1"/>
-          </a:effectRef>
-          <a:fontRef idx="minor">
-            <a:schemeClr val="lt1"/>
-          </a:fontRef>
-        </p:style>
-        <p:txBody>
-          <a:bodyPr rtlCol="0" anchor="ctr"/>
-          <a:lstStyle/>
-          <a:p>
-            <a:endParaRPr lang="LID4096" dirty="0"/>
-          </a:p>
-        </p:txBody>
-      </p:sp>
-      <p:sp>
-        <p:nvSpPr>
-          <p:cNvPr id="8" name="TextBox 7">
-            <a:extLst>
-              <a:ext uri="{FF2B5EF4-FFF2-40B4-BE49-F238E27FC236}">
-                <a16:creationId xmlns:a16="http://schemas.microsoft.com/office/drawing/2014/main" id="{47EAC040-7759-41C7-A987-B5BC306EE7F3}"/>
+        </p:spPr>
+      </p:pic>
+      <p:sp>
+        <p:nvSpPr>
+          <p:cNvPr id="6" name="TextBox 5">
+            <a:extLst>
+              <a:ext uri="{FF2B5EF4-FFF2-40B4-BE49-F238E27FC236}">
+                <a16:creationId xmlns:a16="http://schemas.microsoft.com/office/drawing/2014/main" id="{64EB9670-728D-4FD4-B856-1404B9C4036A}"/>
               </a:ext>
             </a:extLst>
           </p:cNvPr>
@@ -5690,8 +7110,8 @@
         </p:nvSpPr>
         <p:spPr>
           <a:xfrm>
-            <a:off x="540613" y="-253628"/>
-            <a:ext cx="1893467" cy="523220"/>
+            <a:off x="2032654" y="4185689"/>
+            <a:ext cx="1176412" cy="369332"/>
           </a:xfrm>
           <a:prstGeom prst="rect">
             <a:avLst/>
@@ -5699,603 +7119,22 @@
           <a:noFill/>
         </p:spPr>
         <p:txBody>
-          <a:bodyPr wrap="square" rtlCol="0">
+          <a:bodyPr wrap="none" rtlCol="0">
             <a:spAutoFit/>
           </a:bodyPr>
           <a:lstStyle/>
           <a:p>
             <a:r>
-              <a:rPr lang="en-US" sz="2800" b="1" dirty="0">
-                <a:solidFill>
-                  <a:schemeClr val="accent4">
-                    <a:lumMod val="40000"/>
-                    <a:lumOff val="60000"/>
-                  </a:schemeClr>
-                </a:solidFill>
-                <a:latin typeface="Aharoni" panose="02010803020104030203" pitchFamily="2" charset="-79"/>
-                <a:cs typeface="Aharoni" panose="02010803020104030203" pitchFamily="2" charset="-79"/>
-              </a:rPr>
-              <a:t>WhaToEat</a:t>
-            </a:r>
-            <a:endParaRPr lang="LID4096" sz="2800" b="1" dirty="0">
-              <a:solidFill>
-                <a:schemeClr val="accent4">
-                  <a:lumMod val="40000"/>
-                  <a:lumOff val="60000"/>
-                </a:schemeClr>
-              </a:solidFill>
-              <a:latin typeface="Aharoni" panose="02010803020104030203" pitchFamily="2" charset="-79"/>
-              <a:cs typeface="Aharoni" panose="02010803020104030203" pitchFamily="2" charset="-79"/>
-            </a:endParaRPr>
-          </a:p>
-        </p:txBody>
-      </p:sp>
-      <p:cxnSp>
-        <p:nvCxnSpPr>
-          <p:cNvPr id="9" name="Straight Connector 8">
-            <a:extLst>
-              <a:ext uri="{FF2B5EF4-FFF2-40B4-BE49-F238E27FC236}">
-                <a16:creationId xmlns:a16="http://schemas.microsoft.com/office/drawing/2014/main" id="{B3B1026C-9C3A-4AEE-8CF8-C6069871B386}"/>
-              </a:ext>
-            </a:extLst>
-          </p:cNvPr>
-          <p:cNvCxnSpPr>
-            <a:cxnSpLocks/>
-          </p:cNvCxnSpPr>
-          <p:nvPr/>
-        </p:nvCxnSpPr>
-        <p:spPr>
-          <a:xfrm>
-            <a:off x="449713" y="269592"/>
-            <a:ext cx="2075265" cy="0"/>
-          </a:xfrm>
-          <a:prstGeom prst="line">
-            <a:avLst/>
-          </a:prstGeom>
-          <a:ln>
-            <a:solidFill>
-              <a:schemeClr val="accent4">
-                <a:lumMod val="60000"/>
-                <a:lumOff val="40000"/>
-              </a:schemeClr>
-            </a:solidFill>
-          </a:ln>
-        </p:spPr>
-        <p:style>
-          <a:lnRef idx="1">
-            <a:schemeClr val="accent1"/>
-          </a:lnRef>
-          <a:fillRef idx="0">
-            <a:schemeClr val="accent1"/>
-          </a:fillRef>
-          <a:effectRef idx="0">
-            <a:schemeClr val="accent1"/>
-          </a:effectRef>
-          <a:fontRef idx="minor">
-            <a:schemeClr val="tx1"/>
-          </a:fontRef>
-        </p:style>
-      </p:cxnSp>
-      <p:sp>
-        <p:nvSpPr>
-          <p:cNvPr id="10" name="Rectangle: Rounded Corners 9">
-            <a:extLst>
-              <a:ext uri="{FF2B5EF4-FFF2-40B4-BE49-F238E27FC236}">
-                <a16:creationId xmlns:a16="http://schemas.microsoft.com/office/drawing/2014/main" id="{E44E1CCF-1CBC-43FF-9789-76808B4E516E}"/>
-              </a:ext>
-            </a:extLst>
-          </p:cNvPr>
-          <p:cNvSpPr/>
-          <p:nvPr/>
-        </p:nvSpPr>
-        <p:spPr>
-          <a:xfrm>
-            <a:off x="449713" y="857736"/>
-            <a:ext cx="2075265" cy="523240"/>
-          </a:xfrm>
-          <a:prstGeom prst="roundRect">
-            <a:avLst>
-              <a:gd name="adj" fmla="val 11400"/>
-            </a:avLst>
-          </a:prstGeom>
-          <a:solidFill>
-            <a:schemeClr val="bg1"/>
-          </a:solidFill>
-          <a:ln>
-            <a:solidFill>
-              <a:schemeClr val="tx1"/>
-            </a:solidFill>
-          </a:ln>
-        </p:spPr>
-        <p:style>
-          <a:lnRef idx="2">
-            <a:schemeClr val="accent1">
-              <a:shade val="50000"/>
-            </a:schemeClr>
-          </a:lnRef>
-          <a:fillRef idx="1">
-            <a:schemeClr val="accent1"/>
-          </a:fillRef>
-          <a:effectRef idx="0">
-            <a:schemeClr val="accent1"/>
-          </a:effectRef>
-          <a:fontRef idx="minor">
-            <a:schemeClr val="lt1"/>
-          </a:fontRef>
-        </p:style>
-        <p:txBody>
-          <a:bodyPr rtlCol="0" anchor="ctr"/>
-          <a:lstStyle/>
-          <a:p>
-            <a:r>
-              <a:rPr lang="en-US" sz="2000" dirty="0">
-                <a:solidFill>
-                  <a:schemeClr val="bg1">
-                    <a:lumMod val="65000"/>
-                  </a:schemeClr>
-                </a:solidFill>
-              </a:rPr>
-              <a:t>Food Type</a:t>
-            </a:r>
-            <a:endParaRPr lang="LID4096" sz="2000" dirty="0">
-              <a:solidFill>
-                <a:schemeClr val="bg1">
-                  <a:lumMod val="65000"/>
-                </a:schemeClr>
-              </a:solidFill>
-            </a:endParaRPr>
-          </a:p>
-        </p:txBody>
-      </p:sp>
-      <p:sp>
-        <p:nvSpPr>
-          <p:cNvPr id="11" name="TextBox 10">
-            <a:extLst>
-              <a:ext uri="{FF2B5EF4-FFF2-40B4-BE49-F238E27FC236}">
-                <a16:creationId xmlns:a16="http://schemas.microsoft.com/office/drawing/2014/main" id="{2497D38E-59D1-4890-9D46-A5777F0C9758}"/>
-              </a:ext>
-            </a:extLst>
-          </p:cNvPr>
-          <p:cNvSpPr txBox="1"/>
-          <p:nvPr/>
-        </p:nvSpPr>
-        <p:spPr>
-          <a:xfrm>
-            <a:off x="358815" y="456354"/>
-            <a:ext cx="752065" cy="369332"/>
-          </a:xfrm>
-          <a:prstGeom prst="rect">
-            <a:avLst/>
-          </a:prstGeom>
-          <a:noFill/>
-        </p:spPr>
-        <p:txBody>
-          <a:bodyPr wrap="square" rtlCol="0">
-            <a:spAutoFit/>
-          </a:bodyPr>
-          <a:lstStyle/>
-          <a:p>
-            <a:r>
               <a:rPr lang="en-US" dirty="0"/>
-              <a:t>Filters</a:t>
-            </a:r>
-            <a:endParaRPr lang="LID4096" dirty="0"/>
-          </a:p>
-        </p:txBody>
-      </p:sp>
-      <p:sp>
-        <p:nvSpPr>
-          <p:cNvPr id="12" name="Rectangle: Rounded Corners 11">
-            <a:extLst>
-              <a:ext uri="{FF2B5EF4-FFF2-40B4-BE49-F238E27FC236}">
-                <a16:creationId xmlns:a16="http://schemas.microsoft.com/office/drawing/2014/main" id="{4D825D4A-BDD8-48BE-BA76-5430EC08C5B3}"/>
-              </a:ext>
-            </a:extLst>
-          </p:cNvPr>
-          <p:cNvSpPr/>
-          <p:nvPr/>
-        </p:nvSpPr>
-        <p:spPr>
-          <a:xfrm>
-            <a:off x="449713" y="1507847"/>
-            <a:ext cx="2075265" cy="523240"/>
-          </a:xfrm>
-          <a:prstGeom prst="roundRect">
-            <a:avLst>
-              <a:gd name="adj" fmla="val 11400"/>
-            </a:avLst>
-          </a:prstGeom>
-          <a:solidFill>
-            <a:schemeClr val="bg1"/>
-          </a:solidFill>
-          <a:ln>
-            <a:solidFill>
-              <a:schemeClr val="tx1"/>
-            </a:solidFill>
-          </a:ln>
-        </p:spPr>
-        <p:style>
-          <a:lnRef idx="2">
-            <a:schemeClr val="accent1">
-              <a:shade val="50000"/>
-            </a:schemeClr>
-          </a:lnRef>
-          <a:fillRef idx="1">
-            <a:schemeClr val="accent1"/>
-          </a:fillRef>
-          <a:effectRef idx="0">
-            <a:schemeClr val="accent1"/>
-          </a:effectRef>
-          <a:fontRef idx="minor">
-            <a:schemeClr val="lt1"/>
-          </a:fontRef>
-        </p:style>
-        <p:txBody>
-          <a:bodyPr rtlCol="0" anchor="ctr"/>
-          <a:lstStyle/>
-          <a:p>
-            <a:r>
-              <a:rPr lang="en-US" sz="2000" dirty="0">
-                <a:solidFill>
-                  <a:schemeClr val="bg1">
-                    <a:lumMod val="65000"/>
-                  </a:schemeClr>
-                </a:solidFill>
-              </a:rPr>
-              <a:t>Spiciness</a:t>
-            </a:r>
-            <a:endParaRPr lang="LID4096" sz="2000" dirty="0">
-              <a:solidFill>
-                <a:schemeClr val="bg1">
-                  <a:lumMod val="65000"/>
-                </a:schemeClr>
-              </a:solidFill>
-            </a:endParaRPr>
-          </a:p>
-        </p:txBody>
-      </p:sp>
-      <p:sp>
-        <p:nvSpPr>
-          <p:cNvPr id="13" name="Rectangle: Rounded Corners 12">
-            <a:extLst>
-              <a:ext uri="{FF2B5EF4-FFF2-40B4-BE49-F238E27FC236}">
-                <a16:creationId xmlns:a16="http://schemas.microsoft.com/office/drawing/2014/main" id="{C8B15CC4-61A3-4C26-8D2B-B71EA5E45D32}"/>
-              </a:ext>
-            </a:extLst>
-          </p:cNvPr>
-          <p:cNvSpPr/>
-          <p:nvPr/>
-        </p:nvSpPr>
-        <p:spPr>
-          <a:xfrm>
-            <a:off x="449711" y="2157958"/>
-            <a:ext cx="2075265" cy="523240"/>
-          </a:xfrm>
-          <a:prstGeom prst="roundRect">
-            <a:avLst>
-              <a:gd name="adj" fmla="val 11400"/>
-            </a:avLst>
-          </a:prstGeom>
-          <a:solidFill>
-            <a:schemeClr val="bg1"/>
-          </a:solidFill>
-          <a:ln>
-            <a:solidFill>
-              <a:schemeClr val="tx1"/>
-            </a:solidFill>
-          </a:ln>
-        </p:spPr>
-        <p:style>
-          <a:lnRef idx="2">
-            <a:schemeClr val="accent1">
-              <a:shade val="50000"/>
-            </a:schemeClr>
-          </a:lnRef>
-          <a:fillRef idx="1">
-            <a:schemeClr val="accent1"/>
-          </a:fillRef>
-          <a:effectRef idx="0">
-            <a:schemeClr val="accent1"/>
-          </a:effectRef>
-          <a:fontRef idx="minor">
-            <a:schemeClr val="lt1"/>
-          </a:fontRef>
-        </p:style>
-        <p:txBody>
-          <a:bodyPr rtlCol="0" anchor="ctr"/>
-          <a:lstStyle/>
-          <a:p>
-            <a:r>
-              <a:rPr lang="en-US" sz="2000" dirty="0">
-                <a:solidFill>
-                  <a:schemeClr val="bg1">
-                    <a:lumMod val="65000"/>
-                  </a:schemeClr>
-                </a:solidFill>
-              </a:rPr>
-              <a:t>Soup or Dry</a:t>
-            </a:r>
-            <a:endParaRPr lang="LID4096" sz="2000" dirty="0">
-              <a:solidFill>
-                <a:schemeClr val="bg1">
-                  <a:lumMod val="65000"/>
-                </a:schemeClr>
-              </a:solidFill>
-            </a:endParaRPr>
-          </a:p>
-        </p:txBody>
-      </p:sp>
-      <p:sp>
-        <p:nvSpPr>
-          <p:cNvPr id="14" name="Rectangle: Rounded Corners 13">
-            <a:extLst>
-              <a:ext uri="{FF2B5EF4-FFF2-40B4-BE49-F238E27FC236}">
-                <a16:creationId xmlns:a16="http://schemas.microsoft.com/office/drawing/2014/main" id="{37CA127F-A6E4-473E-ADE4-0821FC377D5F}"/>
-              </a:ext>
-            </a:extLst>
-          </p:cNvPr>
-          <p:cNvSpPr/>
-          <p:nvPr/>
-        </p:nvSpPr>
-        <p:spPr>
-          <a:xfrm>
-            <a:off x="449710" y="2850343"/>
-            <a:ext cx="2075265" cy="523240"/>
-          </a:xfrm>
-          <a:prstGeom prst="roundRect">
-            <a:avLst>
-              <a:gd name="adj" fmla="val 11400"/>
-            </a:avLst>
-          </a:prstGeom>
-          <a:solidFill>
-            <a:schemeClr val="bg1"/>
-          </a:solidFill>
-          <a:ln>
-            <a:solidFill>
-              <a:schemeClr val="tx1"/>
-            </a:solidFill>
-          </a:ln>
-        </p:spPr>
-        <p:style>
-          <a:lnRef idx="2">
-            <a:schemeClr val="accent1">
-              <a:shade val="50000"/>
-            </a:schemeClr>
-          </a:lnRef>
-          <a:fillRef idx="1">
-            <a:schemeClr val="accent1"/>
-          </a:fillRef>
-          <a:effectRef idx="0">
-            <a:schemeClr val="accent1"/>
-          </a:effectRef>
-          <a:fontRef idx="minor">
-            <a:schemeClr val="lt1"/>
-          </a:fontRef>
-        </p:style>
-        <p:txBody>
-          <a:bodyPr rtlCol="0" anchor="ctr"/>
-          <a:lstStyle/>
-          <a:p>
-            <a:r>
-              <a:rPr lang="en-US" sz="2000" dirty="0">
-                <a:solidFill>
-                  <a:schemeClr val="bg1">
-                    <a:lumMod val="65000"/>
-                  </a:schemeClr>
-                </a:solidFill>
-              </a:rPr>
-              <a:t>Hot or Cold</a:t>
-            </a:r>
-            <a:endParaRPr lang="LID4096" sz="2000" dirty="0">
-              <a:solidFill>
-                <a:schemeClr val="bg1">
-                  <a:lumMod val="65000"/>
-                </a:schemeClr>
-              </a:solidFill>
-            </a:endParaRPr>
-          </a:p>
-        </p:txBody>
-      </p:sp>
-      <p:sp>
-        <p:nvSpPr>
-          <p:cNvPr id="15" name="Isosceles Triangle 14">
-            <a:extLst>
-              <a:ext uri="{FF2B5EF4-FFF2-40B4-BE49-F238E27FC236}">
-                <a16:creationId xmlns:a16="http://schemas.microsoft.com/office/drawing/2014/main" id="{13E6E3DD-DFF9-49A4-9E52-39FC72630958}"/>
-              </a:ext>
-            </a:extLst>
-          </p:cNvPr>
-          <p:cNvSpPr/>
-          <p:nvPr/>
-        </p:nvSpPr>
-        <p:spPr>
-          <a:xfrm rot="10800000">
-            <a:off x="2281905" y="1088848"/>
-            <a:ext cx="142293" cy="92658"/>
-          </a:xfrm>
-          <a:prstGeom prst="triangle">
-            <a:avLst/>
-          </a:prstGeom>
-          <a:solidFill>
-            <a:schemeClr val="tx1"/>
-          </a:solidFill>
-        </p:spPr>
-        <p:style>
-          <a:lnRef idx="2">
-            <a:schemeClr val="accent1">
-              <a:shade val="50000"/>
-            </a:schemeClr>
-          </a:lnRef>
-          <a:fillRef idx="1">
-            <a:schemeClr val="accent1"/>
-          </a:fillRef>
-          <a:effectRef idx="0">
-            <a:schemeClr val="accent1"/>
-          </a:effectRef>
-          <a:fontRef idx="minor">
-            <a:schemeClr val="lt1"/>
-          </a:fontRef>
-        </p:style>
-        <p:txBody>
-          <a:bodyPr rtlCol="0" anchor="ctr"/>
-          <a:lstStyle/>
-          <a:p>
-            <a:pPr algn="ctr"/>
-            <a:endParaRPr lang="LID4096"/>
-          </a:p>
-        </p:txBody>
-      </p:sp>
-      <p:sp>
-        <p:nvSpPr>
-          <p:cNvPr id="16" name="Isosceles Triangle 15">
-            <a:extLst>
-              <a:ext uri="{FF2B5EF4-FFF2-40B4-BE49-F238E27FC236}">
-                <a16:creationId xmlns:a16="http://schemas.microsoft.com/office/drawing/2014/main" id="{86EE309D-D885-4ADC-A817-7330CE5D33F4}"/>
-              </a:ext>
-            </a:extLst>
-          </p:cNvPr>
-          <p:cNvSpPr/>
-          <p:nvPr/>
-        </p:nvSpPr>
-        <p:spPr>
-          <a:xfrm rot="10800000">
-            <a:off x="2281906" y="1738959"/>
-            <a:ext cx="142293" cy="92658"/>
-          </a:xfrm>
-          <a:prstGeom prst="triangle">
-            <a:avLst/>
-          </a:prstGeom>
-          <a:solidFill>
-            <a:schemeClr val="tx1"/>
-          </a:solidFill>
-        </p:spPr>
-        <p:style>
-          <a:lnRef idx="2">
-            <a:schemeClr val="accent1">
-              <a:shade val="50000"/>
-            </a:schemeClr>
-          </a:lnRef>
-          <a:fillRef idx="1">
-            <a:schemeClr val="accent1"/>
-          </a:fillRef>
-          <a:effectRef idx="0">
-            <a:schemeClr val="accent1"/>
-          </a:effectRef>
-          <a:fontRef idx="minor">
-            <a:schemeClr val="lt1"/>
-          </a:fontRef>
-        </p:style>
-        <p:txBody>
-          <a:bodyPr rtlCol="0" anchor="ctr"/>
-          <a:lstStyle/>
-          <a:p>
-            <a:pPr algn="ctr"/>
-            <a:endParaRPr lang="LID4096"/>
-          </a:p>
-        </p:txBody>
-      </p:sp>
-      <p:sp>
-        <p:nvSpPr>
-          <p:cNvPr id="17" name="Isosceles Triangle 16">
-            <a:extLst>
-              <a:ext uri="{FF2B5EF4-FFF2-40B4-BE49-F238E27FC236}">
-                <a16:creationId xmlns:a16="http://schemas.microsoft.com/office/drawing/2014/main" id="{FF60BFF8-8DEB-42FC-B3BE-0B68AC77397D}"/>
-              </a:ext>
-            </a:extLst>
-          </p:cNvPr>
-          <p:cNvSpPr/>
-          <p:nvPr/>
-        </p:nvSpPr>
-        <p:spPr>
-          <a:xfrm rot="10800000">
-            <a:off x="2281906" y="2394386"/>
-            <a:ext cx="142293" cy="92658"/>
-          </a:xfrm>
-          <a:prstGeom prst="triangle">
-            <a:avLst/>
-          </a:prstGeom>
-          <a:solidFill>
-            <a:schemeClr val="tx1"/>
-          </a:solidFill>
-        </p:spPr>
-        <p:style>
-          <a:lnRef idx="2">
-            <a:schemeClr val="accent1">
-              <a:shade val="50000"/>
-            </a:schemeClr>
-          </a:lnRef>
-          <a:fillRef idx="1">
-            <a:schemeClr val="accent1"/>
-          </a:fillRef>
-          <a:effectRef idx="0">
-            <a:schemeClr val="accent1"/>
-          </a:effectRef>
-          <a:fontRef idx="minor">
-            <a:schemeClr val="lt1"/>
-          </a:fontRef>
-        </p:style>
-        <p:txBody>
-          <a:bodyPr rtlCol="0" anchor="ctr"/>
-          <a:lstStyle/>
-          <a:p>
-            <a:pPr algn="ctr"/>
-            <a:endParaRPr lang="LID4096"/>
-          </a:p>
-        </p:txBody>
-      </p:sp>
-      <p:sp>
-        <p:nvSpPr>
-          <p:cNvPr id="18" name="Isosceles Triangle 17">
-            <a:extLst>
-              <a:ext uri="{FF2B5EF4-FFF2-40B4-BE49-F238E27FC236}">
-                <a16:creationId xmlns:a16="http://schemas.microsoft.com/office/drawing/2014/main" id="{1D7D370B-69B1-413B-9A9C-9F48ECDE4B72}"/>
-              </a:ext>
-            </a:extLst>
-          </p:cNvPr>
-          <p:cNvSpPr/>
-          <p:nvPr/>
-        </p:nvSpPr>
-        <p:spPr>
-          <a:xfrm rot="10800000">
-            <a:off x="2281906" y="3065634"/>
-            <a:ext cx="142293" cy="92658"/>
-          </a:xfrm>
-          <a:prstGeom prst="triangle">
-            <a:avLst/>
-          </a:prstGeom>
-          <a:solidFill>
-            <a:schemeClr val="tx1"/>
-          </a:solidFill>
-        </p:spPr>
-        <p:style>
-          <a:lnRef idx="2">
-            <a:schemeClr val="accent1">
-              <a:shade val="50000"/>
-            </a:schemeClr>
-          </a:lnRef>
-          <a:fillRef idx="1">
-            <a:schemeClr val="accent1"/>
-          </a:fillRef>
-          <a:effectRef idx="0">
-            <a:schemeClr val="accent1"/>
-          </a:effectRef>
-          <a:fontRef idx="minor">
-            <a:schemeClr val="lt1"/>
-          </a:fontRef>
-        </p:style>
-        <p:txBody>
-          <a:bodyPr rtlCol="0" anchor="ctr"/>
-          <a:lstStyle/>
-          <a:p>
-            <a:pPr algn="ctr"/>
-            <a:endParaRPr lang="LID4096"/>
+              <a:t>Client-side</a:t>
+            </a:r>
           </a:p>
         </p:txBody>
       </p:sp>
     </p:spTree>
     <p:extLst>
       <p:ext uri="{BB962C8B-B14F-4D97-AF65-F5344CB8AC3E}">
-        <p14:creationId xmlns:p14="http://schemas.microsoft.com/office/powerpoint/2010/main" val="931832636"/>
+        <p14:creationId xmlns:p14="http://schemas.microsoft.com/office/powerpoint/2010/main" val="723555658"/>
       </p:ext>
     </p:extLst>
   </p:cSld>

</xml_diff>

<commit_message>
cleaned up some code
</commit_message>
<xml_diff>
--- a/WhaToEat Concept.pptx
+++ b/WhaToEat Concept.pptx
@@ -668,7 +668,7 @@
           <a:p>
             <a:fld id="{51803F4B-9C4D-4BE8-8CC0-3C3D11FC2AA4}" type="datetimeFigureOut">
               <a:rPr lang="LID4096" smtClean="0"/>
-              <a:t>04/11/2022</a:t>
+              <a:t>05/31/2022</a:t>
             </a:fld>
             <a:endParaRPr lang="LID4096"/>
           </a:p>
@@ -868,7 +868,7 @@
           <a:p>
             <a:fld id="{51803F4B-9C4D-4BE8-8CC0-3C3D11FC2AA4}" type="datetimeFigureOut">
               <a:rPr lang="LID4096" smtClean="0"/>
-              <a:t>04/11/2022</a:t>
+              <a:t>05/31/2022</a:t>
             </a:fld>
             <a:endParaRPr lang="LID4096"/>
           </a:p>
@@ -1078,7 +1078,7 @@
           <a:p>
             <a:fld id="{51803F4B-9C4D-4BE8-8CC0-3C3D11FC2AA4}" type="datetimeFigureOut">
               <a:rPr lang="LID4096" smtClean="0"/>
-              <a:t>04/11/2022</a:t>
+              <a:t>05/31/2022</a:t>
             </a:fld>
             <a:endParaRPr lang="LID4096"/>
           </a:p>
@@ -1278,7 +1278,7 @@
           <a:p>
             <a:fld id="{51803F4B-9C4D-4BE8-8CC0-3C3D11FC2AA4}" type="datetimeFigureOut">
               <a:rPr lang="LID4096" smtClean="0"/>
-              <a:t>04/11/2022</a:t>
+              <a:t>05/31/2022</a:t>
             </a:fld>
             <a:endParaRPr lang="LID4096"/>
           </a:p>
@@ -1554,7 +1554,7 @@
           <a:p>
             <a:fld id="{51803F4B-9C4D-4BE8-8CC0-3C3D11FC2AA4}" type="datetimeFigureOut">
               <a:rPr lang="LID4096" smtClean="0"/>
-              <a:t>04/11/2022</a:t>
+              <a:t>05/31/2022</a:t>
             </a:fld>
             <a:endParaRPr lang="LID4096"/>
           </a:p>
@@ -1822,7 +1822,7 @@
           <a:p>
             <a:fld id="{51803F4B-9C4D-4BE8-8CC0-3C3D11FC2AA4}" type="datetimeFigureOut">
               <a:rPr lang="LID4096" smtClean="0"/>
-              <a:t>04/11/2022</a:t>
+              <a:t>05/31/2022</a:t>
             </a:fld>
             <a:endParaRPr lang="LID4096"/>
           </a:p>
@@ -2237,7 +2237,7 @@
           <a:p>
             <a:fld id="{51803F4B-9C4D-4BE8-8CC0-3C3D11FC2AA4}" type="datetimeFigureOut">
               <a:rPr lang="LID4096" smtClean="0"/>
-              <a:t>04/11/2022</a:t>
+              <a:t>05/31/2022</a:t>
             </a:fld>
             <a:endParaRPr lang="LID4096"/>
           </a:p>
@@ -2379,7 +2379,7 @@
           <a:p>
             <a:fld id="{51803F4B-9C4D-4BE8-8CC0-3C3D11FC2AA4}" type="datetimeFigureOut">
               <a:rPr lang="LID4096" smtClean="0"/>
-              <a:t>04/11/2022</a:t>
+              <a:t>05/31/2022</a:t>
             </a:fld>
             <a:endParaRPr lang="LID4096"/>
           </a:p>
@@ -2492,7 +2492,7 @@
           <a:p>
             <a:fld id="{51803F4B-9C4D-4BE8-8CC0-3C3D11FC2AA4}" type="datetimeFigureOut">
               <a:rPr lang="LID4096" smtClean="0"/>
-              <a:t>04/11/2022</a:t>
+              <a:t>05/31/2022</a:t>
             </a:fld>
             <a:endParaRPr lang="LID4096"/>
           </a:p>
@@ -2805,7 +2805,7 @@
           <a:p>
             <a:fld id="{51803F4B-9C4D-4BE8-8CC0-3C3D11FC2AA4}" type="datetimeFigureOut">
               <a:rPr lang="LID4096" smtClean="0"/>
-              <a:t>04/11/2022</a:t>
+              <a:t>05/31/2022</a:t>
             </a:fld>
             <a:endParaRPr lang="LID4096"/>
           </a:p>
@@ -3094,7 +3094,7 @@
           <a:p>
             <a:fld id="{51803F4B-9C4D-4BE8-8CC0-3C3D11FC2AA4}" type="datetimeFigureOut">
               <a:rPr lang="LID4096" smtClean="0"/>
-              <a:t>04/11/2022</a:t>
+              <a:t>05/31/2022</a:t>
             </a:fld>
             <a:endParaRPr lang="LID4096"/>
           </a:p>
@@ -3337,7 +3337,7 @@
           <a:p>
             <a:fld id="{51803F4B-9C4D-4BE8-8CC0-3C3D11FC2AA4}" type="datetimeFigureOut">
               <a:rPr lang="LID4096" smtClean="0"/>
-              <a:t>04/11/2022</a:t>
+              <a:t>05/31/2022</a:t>
             </a:fld>
             <a:endParaRPr lang="LID4096"/>
           </a:p>
@@ -7175,10 +7175,10 @@
         </p:nvGrpSpPr>
         <p:grpSpPr>
           <a:xfrm>
-            <a:off x="1223931" y="2197849"/>
-            <a:ext cx="10319985" cy="2317001"/>
+            <a:off x="1427971" y="229090"/>
+            <a:ext cx="10319985" cy="1995772"/>
             <a:chOff x="1223931" y="2197849"/>
-            <a:chExt cx="10319985" cy="2317001"/>
+            <a:chExt cx="10319985" cy="1995772"/>
           </a:xfrm>
         </p:grpSpPr>
         <p:grpSp>
@@ -7196,9 +7196,9 @@
           <p:grpSpPr>
             <a:xfrm>
               <a:off x="1223931" y="2197849"/>
-              <a:ext cx="2979956" cy="2317001"/>
+              <a:ext cx="2979956" cy="1995772"/>
               <a:chOff x="3337262" y="1688099"/>
-              <a:chExt cx="3266211" cy="2539573"/>
+              <a:chExt cx="3266211" cy="2187487"/>
             </a:xfrm>
           </p:grpSpPr>
           <p:sp>
@@ -7551,9 +7551,9 @@
             <p:grpSpPr>
               <a:xfrm>
                 <a:off x="3769046" y="1688099"/>
-                <a:ext cx="2319325" cy="2539573"/>
+                <a:ext cx="2319325" cy="2187487"/>
                 <a:chOff x="3769046" y="1688099"/>
-                <a:chExt cx="2319325" cy="2539573"/>
+                <a:chExt cx="2319325" cy="2187487"/>
               </a:xfrm>
             </p:grpSpPr>
             <p:sp>
@@ -7718,318 +7718,6 @@
                 </a:p>
               </p:txBody>
             </p:sp>
-            <p:grpSp>
-              <p:nvGrpSpPr>
-                <p:cNvPr id="14" name="Group 13">
-                  <a:extLst>
-                    <a:ext uri="{FF2B5EF4-FFF2-40B4-BE49-F238E27FC236}">
-                      <a16:creationId xmlns:a16="http://schemas.microsoft.com/office/drawing/2014/main" id="{74AD9CC1-D223-4619-B665-B615ECE10661}"/>
-                    </a:ext>
-                  </a:extLst>
-                </p:cNvPr>
-                <p:cNvGrpSpPr/>
-                <p:nvPr/>
-              </p:nvGrpSpPr>
-              <p:grpSpPr>
-                <a:xfrm>
-                  <a:off x="4528445" y="3210264"/>
-                  <a:ext cx="1336911" cy="1017408"/>
-                  <a:chOff x="4616788" y="3185709"/>
-                  <a:chExt cx="1336911" cy="1017408"/>
-                </a:xfrm>
-              </p:grpSpPr>
-              <p:grpSp>
-                <p:nvGrpSpPr>
-                  <p:cNvPr id="15" name="Group 14">
-                    <a:extLst>
-                      <a:ext uri="{FF2B5EF4-FFF2-40B4-BE49-F238E27FC236}">
-                        <a16:creationId xmlns:a16="http://schemas.microsoft.com/office/drawing/2014/main" id="{2B7E2776-C4EF-45DF-869A-EF81D99A5B2E}"/>
-                      </a:ext>
-                    </a:extLst>
-                  </p:cNvPr>
-                  <p:cNvGrpSpPr/>
-                  <p:nvPr/>
-                </p:nvGrpSpPr>
-                <p:grpSpPr>
-                  <a:xfrm rot="20814620">
-                    <a:off x="4616788" y="3185709"/>
-                    <a:ext cx="1336911" cy="753283"/>
-                    <a:chOff x="4394285" y="3218982"/>
-                    <a:chExt cx="1336911" cy="753283"/>
-                  </a:xfrm>
-                </p:grpSpPr>
-                <p:sp>
-                  <p:nvSpPr>
-                    <p:cNvPr id="17" name="Oval 16">
-                      <a:extLst>
-                        <a:ext uri="{FF2B5EF4-FFF2-40B4-BE49-F238E27FC236}">
-                          <a16:creationId xmlns:a16="http://schemas.microsoft.com/office/drawing/2014/main" id="{8F1C702F-22CB-4E26-80CA-1673BB8C97BB}"/>
-                        </a:ext>
-                      </a:extLst>
-                    </p:cNvPr>
-                    <p:cNvSpPr/>
-                    <p:nvPr/>
-                  </p:nvSpPr>
-                  <p:spPr>
-                    <a:xfrm rot="2502191">
-                      <a:off x="4394285" y="3484179"/>
-                      <a:ext cx="686735" cy="488086"/>
-                    </a:xfrm>
-                    <a:prstGeom prst="ellipse">
-                      <a:avLst/>
-                    </a:prstGeom>
-                    <a:solidFill>
-                      <a:schemeClr val="bg1"/>
-                    </a:solidFill>
-                    <a:ln>
-                      <a:solidFill>
-                        <a:schemeClr val="bg1"/>
-                      </a:solidFill>
-                    </a:ln>
-                  </p:spPr>
-                  <p:style>
-                    <a:lnRef idx="2">
-                      <a:schemeClr val="accent1">
-                        <a:shade val="50000"/>
-                      </a:schemeClr>
-                    </a:lnRef>
-                    <a:fillRef idx="1">
-                      <a:schemeClr val="accent1"/>
-                    </a:fillRef>
-                    <a:effectRef idx="0">
-                      <a:schemeClr val="accent1"/>
-                    </a:effectRef>
-                    <a:fontRef idx="minor">
-                      <a:schemeClr val="lt1"/>
-                    </a:fontRef>
-                  </p:style>
-                  <p:txBody>
-                    <a:bodyPr rtlCol="0" anchor="ctr"/>
-                    <a:lstStyle/>
-                    <a:p>
-                      <a:pPr algn="ctr"/>
-                      <a:endParaRPr lang="en-GB"/>
-                    </a:p>
-                  </p:txBody>
-                </p:sp>
-                <p:sp>
-                  <p:nvSpPr>
-                    <p:cNvPr id="18" name="Oval 17">
-                      <a:extLst>
-                        <a:ext uri="{FF2B5EF4-FFF2-40B4-BE49-F238E27FC236}">
-                          <a16:creationId xmlns:a16="http://schemas.microsoft.com/office/drawing/2014/main" id="{2323797F-0CFA-4F7C-BC48-DE5BFFA2427D}"/>
-                        </a:ext>
-                      </a:extLst>
-                    </p:cNvPr>
-                    <p:cNvSpPr/>
-                    <p:nvPr/>
-                  </p:nvSpPr>
-                  <p:spPr>
-                    <a:xfrm rot="4311166">
-                      <a:off x="4601303" y="3318307"/>
-                      <a:ext cx="686735" cy="488086"/>
-                    </a:xfrm>
-                    <a:prstGeom prst="ellipse">
-                      <a:avLst/>
-                    </a:prstGeom>
-                    <a:solidFill>
-                      <a:schemeClr val="bg1"/>
-                    </a:solidFill>
-                    <a:ln>
-                      <a:solidFill>
-                        <a:schemeClr val="bg1"/>
-                      </a:solidFill>
-                    </a:ln>
-                  </p:spPr>
-                  <p:style>
-                    <a:lnRef idx="2">
-                      <a:schemeClr val="accent1">
-                        <a:shade val="50000"/>
-                      </a:schemeClr>
-                    </a:lnRef>
-                    <a:fillRef idx="1">
-                      <a:schemeClr val="accent1"/>
-                    </a:fillRef>
-                    <a:effectRef idx="0">
-                      <a:schemeClr val="accent1"/>
-                    </a:effectRef>
-                    <a:fontRef idx="minor">
-                      <a:schemeClr val="lt1"/>
-                    </a:fontRef>
-                  </p:style>
-                  <p:txBody>
-                    <a:bodyPr rtlCol="0" anchor="ctr"/>
-                    <a:lstStyle/>
-                    <a:p>
-                      <a:pPr algn="ctr"/>
-                      <a:endParaRPr lang="en-GB"/>
-                    </a:p>
-                  </p:txBody>
-                </p:sp>
-                <p:sp>
-                  <p:nvSpPr>
-                    <p:cNvPr id="19" name="Oval 18">
-                      <a:extLst>
-                        <a:ext uri="{FF2B5EF4-FFF2-40B4-BE49-F238E27FC236}">
-                          <a16:creationId xmlns:a16="http://schemas.microsoft.com/office/drawing/2014/main" id="{433A8925-06C1-4261-95C0-449A655C5427}"/>
-                        </a:ext>
-                      </a:extLst>
-                    </p:cNvPr>
-                    <p:cNvSpPr/>
-                    <p:nvPr/>
-                  </p:nvSpPr>
-                  <p:spPr>
-                    <a:xfrm rot="5400000">
-                      <a:off x="4876576" y="3331518"/>
-                      <a:ext cx="686735" cy="488086"/>
-                    </a:xfrm>
-                    <a:prstGeom prst="ellipse">
-                      <a:avLst/>
-                    </a:prstGeom>
-                    <a:solidFill>
-                      <a:schemeClr val="bg1"/>
-                    </a:solidFill>
-                    <a:ln>
-                      <a:solidFill>
-                        <a:schemeClr val="bg1"/>
-                      </a:solidFill>
-                    </a:ln>
-                  </p:spPr>
-                  <p:style>
-                    <a:lnRef idx="2">
-                      <a:schemeClr val="accent1">
-                        <a:shade val="50000"/>
-                      </a:schemeClr>
-                    </a:lnRef>
-                    <a:fillRef idx="1">
-                      <a:schemeClr val="accent1"/>
-                    </a:fillRef>
-                    <a:effectRef idx="0">
-                      <a:schemeClr val="accent1"/>
-                    </a:effectRef>
-                    <a:fontRef idx="minor">
-                      <a:schemeClr val="lt1"/>
-                    </a:fontRef>
-                  </p:style>
-                  <p:txBody>
-                    <a:bodyPr rtlCol="0" anchor="ctr"/>
-                    <a:lstStyle/>
-                    <a:p>
-                      <a:pPr algn="ctr"/>
-                      <a:endParaRPr lang="en-GB"/>
-                    </a:p>
-                  </p:txBody>
-                </p:sp>
-                <p:sp>
-                  <p:nvSpPr>
-                    <p:cNvPr id="20" name="Oval 19">
-                      <a:extLst>
-                        <a:ext uri="{FF2B5EF4-FFF2-40B4-BE49-F238E27FC236}">
-                          <a16:creationId xmlns:a16="http://schemas.microsoft.com/office/drawing/2014/main" id="{0761F922-46A2-4494-A023-0C2B1A6BFAF9}"/>
-                        </a:ext>
-                      </a:extLst>
-                    </p:cNvPr>
-                    <p:cNvSpPr/>
-                    <p:nvPr/>
-                  </p:nvSpPr>
-                  <p:spPr>
-                    <a:xfrm rot="8646639">
-                      <a:off x="5044461" y="3419131"/>
-                      <a:ext cx="686735" cy="488086"/>
-                    </a:xfrm>
-                    <a:prstGeom prst="ellipse">
-                      <a:avLst/>
-                    </a:prstGeom>
-                    <a:solidFill>
-                      <a:schemeClr val="bg1"/>
-                    </a:solidFill>
-                    <a:ln>
-                      <a:solidFill>
-                        <a:schemeClr val="bg1"/>
-                      </a:solidFill>
-                    </a:ln>
-                  </p:spPr>
-                  <p:style>
-                    <a:lnRef idx="2">
-                      <a:schemeClr val="accent1">
-                        <a:shade val="50000"/>
-                      </a:schemeClr>
-                    </a:lnRef>
-                    <a:fillRef idx="1">
-                      <a:schemeClr val="accent1"/>
-                    </a:fillRef>
-                    <a:effectRef idx="0">
-                      <a:schemeClr val="accent1"/>
-                    </a:effectRef>
-                    <a:fontRef idx="minor">
-                      <a:schemeClr val="lt1"/>
-                    </a:fontRef>
-                  </p:style>
-                  <p:txBody>
-                    <a:bodyPr rtlCol="0" anchor="ctr"/>
-                    <a:lstStyle/>
-                    <a:p>
-                      <a:pPr algn="ctr"/>
-                      <a:endParaRPr lang="en-GB"/>
-                    </a:p>
-                  </p:txBody>
-                </p:sp>
-              </p:grpSp>
-              <p:sp>
-                <p:nvSpPr>
-                  <p:cNvPr id="16" name="Oval 15">
-                    <a:extLst>
-                      <a:ext uri="{FF2B5EF4-FFF2-40B4-BE49-F238E27FC236}">
-                        <a16:creationId xmlns:a16="http://schemas.microsoft.com/office/drawing/2014/main" id="{C2192827-509A-4D02-95E7-2C788E9B89BF}"/>
-                      </a:ext>
-                    </a:extLst>
-                  </p:cNvPr>
-                  <p:cNvSpPr/>
-                  <p:nvPr/>
-                </p:nvSpPr>
-                <p:spPr>
-                  <a:xfrm rot="10189688">
-                    <a:off x="5074047" y="3715031"/>
-                    <a:ext cx="686735" cy="488086"/>
-                  </a:xfrm>
-                  <a:prstGeom prst="ellipse">
-                    <a:avLst/>
-                  </a:prstGeom>
-                  <a:solidFill>
-                    <a:schemeClr val="bg1"/>
-                  </a:solidFill>
-                  <a:ln>
-                    <a:solidFill>
-                      <a:schemeClr val="bg1"/>
-                    </a:solidFill>
-                  </a:ln>
-                </p:spPr>
-                <p:style>
-                  <a:lnRef idx="2">
-                    <a:schemeClr val="accent1">
-                      <a:shade val="50000"/>
-                    </a:schemeClr>
-                  </a:lnRef>
-                  <a:fillRef idx="1">
-                    <a:schemeClr val="accent1"/>
-                  </a:fillRef>
-                  <a:effectRef idx="0">
-                    <a:schemeClr val="accent1"/>
-                  </a:effectRef>
-                  <a:fontRef idx="minor">
-                    <a:schemeClr val="lt1"/>
-                  </a:fontRef>
-                </p:style>
-                <p:txBody>
-                  <a:bodyPr rtlCol="0" anchor="ctr"/>
-                  <a:lstStyle/>
-                  <a:p>
-                    <a:pPr algn="ctr"/>
-                    <a:endParaRPr lang="en-GB"/>
-                  </a:p>
-                </p:txBody>
-              </p:sp>
-            </p:grpSp>
           </p:grpSp>
         </p:grpSp>
         <p:sp>
@@ -8078,6 +7766,545 @@
             </a:p>
           </p:txBody>
         </p:sp>
+      </p:grpSp>
+      <p:grpSp>
+        <p:nvGrpSpPr>
+          <p:cNvPr id="24" name="Group 23">
+            <a:extLst>
+              <a:ext uri="{FF2B5EF4-FFF2-40B4-BE49-F238E27FC236}">
+                <a16:creationId xmlns:a16="http://schemas.microsoft.com/office/drawing/2014/main" id="{C199C63C-F710-2DD8-6145-B5005BF663DC}"/>
+              </a:ext>
+            </a:extLst>
+          </p:cNvPr>
+          <p:cNvGrpSpPr/>
+          <p:nvPr/>
+        </p:nvGrpSpPr>
+        <p:grpSpPr>
+          <a:xfrm>
+            <a:off x="3608008" y="4377876"/>
+            <a:ext cx="2979956" cy="1995772"/>
+            <a:chOff x="3337262" y="1688099"/>
+            <a:chExt cx="3266211" cy="2187487"/>
+          </a:xfrm>
+        </p:grpSpPr>
+        <p:sp>
+          <p:nvSpPr>
+            <p:cNvPr id="27" name="Rectangle: Rounded Corners 26">
+              <a:extLst>
+                <a:ext uri="{FF2B5EF4-FFF2-40B4-BE49-F238E27FC236}">
+                  <a16:creationId xmlns:a16="http://schemas.microsoft.com/office/drawing/2014/main" id="{397F9C1A-DCD2-E305-AE57-6A5D315269FA}"/>
+                </a:ext>
+              </a:extLst>
+            </p:cNvPr>
+            <p:cNvSpPr/>
+            <p:nvPr/>
+          </p:nvSpPr>
+          <p:spPr>
+            <a:xfrm>
+              <a:off x="3536855" y="2173058"/>
+              <a:ext cx="115050" cy="1427933"/>
+            </a:xfrm>
+            <a:prstGeom prst="roundRect">
+              <a:avLst/>
+            </a:prstGeom>
+            <a:solidFill>
+              <a:srgbClr val="4A1D2E"/>
+            </a:solidFill>
+            <a:ln>
+              <a:noFill/>
+            </a:ln>
+          </p:spPr>
+          <p:style>
+            <a:lnRef idx="2">
+              <a:schemeClr val="accent1">
+                <a:shade val="50000"/>
+              </a:schemeClr>
+            </a:lnRef>
+            <a:fillRef idx="1">
+              <a:schemeClr val="accent1"/>
+            </a:fillRef>
+            <a:effectRef idx="0">
+              <a:schemeClr val="accent1"/>
+            </a:effectRef>
+            <a:fontRef idx="minor">
+              <a:schemeClr val="lt1"/>
+            </a:fontRef>
+          </p:style>
+          <p:txBody>
+            <a:bodyPr rtlCol="0" anchor="ctr"/>
+            <a:lstStyle/>
+            <a:p>
+              <a:pPr algn="ctr"/>
+              <a:endParaRPr lang="en-GB" dirty="0"/>
+            </a:p>
+          </p:txBody>
+        </p:sp>
+        <p:sp>
+          <p:nvSpPr>
+            <p:cNvPr id="28" name="Rectangle: Rounded Corners 27">
+              <a:extLst>
+                <a:ext uri="{FF2B5EF4-FFF2-40B4-BE49-F238E27FC236}">
+                  <a16:creationId xmlns:a16="http://schemas.microsoft.com/office/drawing/2014/main" id="{CB1F5E33-4472-6770-2BF6-5AC9FB4104D6}"/>
+                </a:ext>
+              </a:extLst>
+            </p:cNvPr>
+            <p:cNvSpPr/>
+            <p:nvPr/>
+          </p:nvSpPr>
+          <p:spPr>
+            <a:xfrm rot="5400000">
+              <a:off x="3514284" y="1998517"/>
+              <a:ext cx="160192" cy="509274"/>
+            </a:xfrm>
+            <a:prstGeom prst="roundRect">
+              <a:avLst>
+                <a:gd name="adj" fmla="val 50000"/>
+              </a:avLst>
+            </a:prstGeom>
+            <a:solidFill>
+              <a:srgbClr val="4A1D2E"/>
+            </a:solidFill>
+            <a:ln>
+              <a:noFill/>
+            </a:ln>
+          </p:spPr>
+          <p:style>
+            <a:lnRef idx="2">
+              <a:schemeClr val="accent1">
+                <a:shade val="50000"/>
+              </a:schemeClr>
+            </a:lnRef>
+            <a:fillRef idx="1">
+              <a:schemeClr val="accent1"/>
+            </a:fillRef>
+            <a:effectRef idx="0">
+              <a:schemeClr val="accent1"/>
+            </a:effectRef>
+            <a:fontRef idx="minor">
+              <a:schemeClr val="lt1"/>
+            </a:fontRef>
+          </p:style>
+          <p:txBody>
+            <a:bodyPr rtlCol="0" anchor="ctr"/>
+            <a:lstStyle/>
+            <a:p>
+              <a:pPr algn="ctr"/>
+              <a:endParaRPr lang="en-GB"/>
+            </a:p>
+          </p:txBody>
+        </p:sp>
+        <p:sp>
+          <p:nvSpPr>
+            <p:cNvPr id="29" name="Rectangle: Rounded Corners 28">
+              <a:extLst>
+                <a:ext uri="{FF2B5EF4-FFF2-40B4-BE49-F238E27FC236}">
+                  <a16:creationId xmlns:a16="http://schemas.microsoft.com/office/drawing/2014/main" id="{C682D3F8-FF2D-9660-AA65-844789F49157}"/>
+                </a:ext>
+              </a:extLst>
+            </p:cNvPr>
+            <p:cNvSpPr/>
+            <p:nvPr/>
+          </p:nvSpPr>
+          <p:spPr>
+            <a:xfrm>
+              <a:off x="3556486" y="1817372"/>
+              <a:ext cx="79971" cy="570389"/>
+            </a:xfrm>
+            <a:prstGeom prst="roundRect">
+              <a:avLst/>
+            </a:prstGeom>
+            <a:solidFill>
+              <a:srgbClr val="4A1D2E"/>
+            </a:solidFill>
+            <a:ln>
+              <a:noFill/>
+            </a:ln>
+          </p:spPr>
+          <p:style>
+            <a:lnRef idx="2">
+              <a:schemeClr val="accent1">
+                <a:shade val="50000"/>
+              </a:schemeClr>
+            </a:lnRef>
+            <a:fillRef idx="1">
+              <a:schemeClr val="accent1"/>
+            </a:fillRef>
+            <a:effectRef idx="0">
+              <a:schemeClr val="accent1"/>
+            </a:effectRef>
+            <a:fontRef idx="minor">
+              <a:schemeClr val="lt1"/>
+            </a:fontRef>
+          </p:style>
+          <p:txBody>
+            <a:bodyPr rtlCol="0" anchor="ctr"/>
+            <a:lstStyle/>
+            <a:p>
+              <a:pPr algn="ctr"/>
+              <a:endParaRPr lang="en-GB"/>
+            </a:p>
+          </p:txBody>
+        </p:sp>
+        <p:sp>
+          <p:nvSpPr>
+            <p:cNvPr id="30" name="Rectangle: Rounded Corners 29">
+              <a:extLst>
+                <a:ext uri="{FF2B5EF4-FFF2-40B4-BE49-F238E27FC236}">
+                  <a16:creationId xmlns:a16="http://schemas.microsoft.com/office/drawing/2014/main" id="{EED35E55-10C8-6540-FE01-FEC62E4E3105}"/>
+                </a:ext>
+              </a:extLst>
+            </p:cNvPr>
+            <p:cNvSpPr/>
+            <p:nvPr/>
+          </p:nvSpPr>
+          <p:spPr>
+            <a:xfrm>
+              <a:off x="3337262" y="1817372"/>
+              <a:ext cx="79971" cy="463404"/>
+            </a:xfrm>
+            <a:prstGeom prst="roundRect">
+              <a:avLst/>
+            </a:prstGeom>
+            <a:solidFill>
+              <a:srgbClr val="4A1D2E"/>
+            </a:solidFill>
+            <a:ln>
+              <a:noFill/>
+            </a:ln>
+          </p:spPr>
+          <p:style>
+            <a:lnRef idx="2">
+              <a:schemeClr val="accent1">
+                <a:shade val="50000"/>
+              </a:schemeClr>
+            </a:lnRef>
+            <a:fillRef idx="1">
+              <a:schemeClr val="accent1"/>
+            </a:fillRef>
+            <a:effectRef idx="0">
+              <a:schemeClr val="accent1"/>
+            </a:effectRef>
+            <a:fontRef idx="minor">
+              <a:schemeClr val="lt1"/>
+            </a:fontRef>
+          </p:style>
+          <p:txBody>
+            <a:bodyPr rtlCol="0" anchor="ctr"/>
+            <a:lstStyle/>
+            <a:p>
+              <a:pPr algn="ctr"/>
+              <a:endParaRPr lang="en-GB"/>
+            </a:p>
+          </p:txBody>
+        </p:sp>
+        <p:grpSp>
+          <p:nvGrpSpPr>
+            <p:cNvPr id="31" name="Group 30">
+              <a:extLst>
+                <a:ext uri="{FF2B5EF4-FFF2-40B4-BE49-F238E27FC236}">
+                  <a16:creationId xmlns:a16="http://schemas.microsoft.com/office/drawing/2014/main" id="{27BC0634-31CD-B30F-2B41-92F318DE82F6}"/>
+                </a:ext>
+              </a:extLst>
+            </p:cNvPr>
+            <p:cNvGrpSpPr/>
+            <p:nvPr/>
+          </p:nvGrpSpPr>
+          <p:grpSpPr>
+            <a:xfrm>
+              <a:off x="6103631" y="1817372"/>
+              <a:ext cx="499842" cy="1784161"/>
+              <a:chOff x="6103631" y="1817372"/>
+              <a:chExt cx="499842" cy="1784161"/>
+            </a:xfrm>
+          </p:grpSpPr>
+          <p:sp>
+            <p:nvSpPr>
+              <p:cNvPr id="43" name="Oval 42">
+                <a:extLst>
+                  <a:ext uri="{FF2B5EF4-FFF2-40B4-BE49-F238E27FC236}">
+                    <a16:creationId xmlns:a16="http://schemas.microsoft.com/office/drawing/2014/main" id="{001DF718-09E0-6A9E-FF2A-8757DA96FE87}"/>
+                  </a:ext>
+                </a:extLst>
+              </p:cNvPr>
+              <p:cNvSpPr/>
+              <p:nvPr/>
+            </p:nvSpPr>
+            <p:spPr>
+              <a:xfrm>
+                <a:off x="6103631" y="1817372"/>
+                <a:ext cx="499842" cy="621584"/>
+              </a:xfrm>
+              <a:prstGeom prst="ellipse">
+                <a:avLst/>
+              </a:prstGeom>
+              <a:solidFill>
+                <a:srgbClr val="4A1D2E"/>
+              </a:solidFill>
+              <a:ln>
+                <a:noFill/>
+              </a:ln>
+            </p:spPr>
+            <p:style>
+              <a:lnRef idx="2">
+                <a:schemeClr val="accent1">
+                  <a:shade val="50000"/>
+                </a:schemeClr>
+              </a:lnRef>
+              <a:fillRef idx="1">
+                <a:schemeClr val="accent1"/>
+              </a:fillRef>
+              <a:effectRef idx="0">
+                <a:schemeClr val="accent1"/>
+              </a:effectRef>
+              <a:fontRef idx="minor">
+                <a:schemeClr val="lt1"/>
+              </a:fontRef>
+            </p:style>
+            <p:txBody>
+              <a:bodyPr rtlCol="0" anchor="ctr"/>
+              <a:lstStyle/>
+              <a:p>
+                <a:pPr algn="ctr"/>
+                <a:endParaRPr lang="en-GB"/>
+              </a:p>
+            </p:txBody>
+          </p:sp>
+          <p:sp>
+            <p:nvSpPr>
+              <p:cNvPr id="44" name="Rectangle: Rounded Corners 43">
+                <a:extLst>
+                  <a:ext uri="{FF2B5EF4-FFF2-40B4-BE49-F238E27FC236}">
+                    <a16:creationId xmlns:a16="http://schemas.microsoft.com/office/drawing/2014/main" id="{B44D63E4-AE7D-37C6-2B2E-461FD2B15E6E}"/>
+                  </a:ext>
+                </a:extLst>
+              </p:cNvPr>
+              <p:cNvSpPr/>
+              <p:nvPr/>
+            </p:nvSpPr>
+            <p:spPr>
+              <a:xfrm>
+                <a:off x="6296027" y="2173600"/>
+                <a:ext cx="115050" cy="1427933"/>
+              </a:xfrm>
+              <a:prstGeom prst="roundRect">
+                <a:avLst/>
+              </a:prstGeom>
+              <a:solidFill>
+                <a:srgbClr val="4A1D2E"/>
+              </a:solidFill>
+              <a:ln>
+                <a:noFill/>
+              </a:ln>
+            </p:spPr>
+            <p:style>
+              <a:lnRef idx="2">
+                <a:schemeClr val="accent1">
+                  <a:shade val="50000"/>
+                </a:schemeClr>
+              </a:lnRef>
+              <a:fillRef idx="1">
+                <a:schemeClr val="accent1"/>
+              </a:fillRef>
+              <a:effectRef idx="0">
+                <a:schemeClr val="accent1"/>
+              </a:effectRef>
+              <a:fontRef idx="minor">
+                <a:schemeClr val="lt1"/>
+              </a:fontRef>
+            </p:style>
+            <p:txBody>
+              <a:bodyPr rtlCol="0" anchor="ctr"/>
+              <a:lstStyle/>
+              <a:p>
+                <a:pPr algn="ctr"/>
+                <a:endParaRPr lang="en-GB"/>
+              </a:p>
+            </p:txBody>
+          </p:sp>
+        </p:grpSp>
+        <p:grpSp>
+          <p:nvGrpSpPr>
+            <p:cNvPr id="32" name="Group 31">
+              <a:extLst>
+                <a:ext uri="{FF2B5EF4-FFF2-40B4-BE49-F238E27FC236}">
+                  <a16:creationId xmlns:a16="http://schemas.microsoft.com/office/drawing/2014/main" id="{3532C68D-AC2B-0AEE-1C78-06498407998D}"/>
+                </a:ext>
+              </a:extLst>
+            </p:cNvPr>
+            <p:cNvGrpSpPr/>
+            <p:nvPr/>
+          </p:nvGrpSpPr>
+          <p:grpSpPr>
+            <a:xfrm>
+              <a:off x="3769046" y="1688099"/>
+              <a:ext cx="2319325" cy="2187487"/>
+              <a:chOff x="3769046" y="1688099"/>
+              <a:chExt cx="2319325" cy="2187487"/>
+            </a:xfrm>
+          </p:grpSpPr>
+          <p:sp>
+            <p:nvSpPr>
+              <p:cNvPr id="33" name="Oval 32">
+                <a:extLst>
+                  <a:ext uri="{FF2B5EF4-FFF2-40B4-BE49-F238E27FC236}">
+                    <a16:creationId xmlns:a16="http://schemas.microsoft.com/office/drawing/2014/main" id="{6C20DAF3-3CCC-4F1B-5FB7-5F2294F145A1}"/>
+                  </a:ext>
+                </a:extLst>
+              </p:cNvPr>
+              <p:cNvSpPr/>
+              <p:nvPr/>
+            </p:nvSpPr>
+            <p:spPr>
+              <a:xfrm>
+                <a:off x="4208145" y="2001337"/>
+                <a:ext cx="1561013" cy="1561013"/>
+              </a:xfrm>
+              <a:prstGeom prst="ellipse">
+                <a:avLst/>
+              </a:prstGeom>
+              <a:solidFill>
+                <a:srgbClr val="4A1D2E"/>
+              </a:solidFill>
+              <a:ln>
+                <a:noFill/>
+              </a:ln>
+            </p:spPr>
+            <p:style>
+              <a:lnRef idx="2">
+                <a:schemeClr val="accent1">
+                  <a:shade val="50000"/>
+                </a:schemeClr>
+              </a:lnRef>
+              <a:fillRef idx="1">
+                <a:schemeClr val="accent1"/>
+              </a:fillRef>
+              <a:effectRef idx="0">
+                <a:schemeClr val="accent1"/>
+              </a:effectRef>
+              <a:fontRef idx="minor">
+                <a:schemeClr val="lt1"/>
+              </a:fontRef>
+            </p:style>
+            <p:txBody>
+              <a:bodyPr rtlCol="0" anchor="ctr"/>
+              <a:lstStyle/>
+              <a:p>
+                <a:pPr algn="ctr"/>
+                <a:endParaRPr lang="en-GB" dirty="0"/>
+              </a:p>
+            </p:txBody>
+          </p:sp>
+          <p:sp>
+            <p:nvSpPr>
+              <p:cNvPr id="34" name="Circle: Hollow 33">
+                <a:extLst>
+                  <a:ext uri="{FF2B5EF4-FFF2-40B4-BE49-F238E27FC236}">
+                    <a16:creationId xmlns:a16="http://schemas.microsoft.com/office/drawing/2014/main" id="{58F087D7-7C6C-6729-B8E3-F5A4C0DB8A0E}"/>
+                  </a:ext>
+                </a:extLst>
+              </p:cNvPr>
+              <p:cNvSpPr/>
+              <p:nvPr/>
+            </p:nvSpPr>
+            <p:spPr>
+              <a:xfrm>
+                <a:off x="3888930" y="1688099"/>
+                <a:ext cx="2199441" cy="2187487"/>
+              </a:xfrm>
+              <a:prstGeom prst="donut">
+                <a:avLst>
+                  <a:gd name="adj" fmla="val 12510"/>
+                </a:avLst>
+              </a:prstGeom>
+              <a:solidFill>
+                <a:srgbClr val="4A1D2E"/>
+              </a:solidFill>
+              <a:ln>
+                <a:noFill/>
+              </a:ln>
+            </p:spPr>
+            <p:style>
+              <a:lnRef idx="2">
+                <a:schemeClr val="accent1">
+                  <a:shade val="50000"/>
+                </a:schemeClr>
+              </a:lnRef>
+              <a:fillRef idx="1">
+                <a:schemeClr val="accent1"/>
+              </a:fillRef>
+              <a:effectRef idx="0">
+                <a:schemeClr val="accent1"/>
+              </a:effectRef>
+              <a:fontRef idx="minor">
+                <a:schemeClr val="lt1"/>
+              </a:fontRef>
+            </p:style>
+            <p:txBody>
+              <a:bodyPr rtlCol="0" anchor="ctr"/>
+              <a:lstStyle/>
+              <a:p>
+                <a:pPr algn="ctr"/>
+                <a:endParaRPr lang="en-GB" dirty="0">
+                  <a:solidFill>
+                    <a:schemeClr val="tx1"/>
+                  </a:solidFill>
+                </a:endParaRPr>
+              </a:p>
+            </p:txBody>
+          </p:sp>
+          <p:sp>
+            <p:nvSpPr>
+              <p:cNvPr id="35" name="Rectangle: Rounded Corners 34">
+                <a:extLst>
+                  <a:ext uri="{FF2B5EF4-FFF2-40B4-BE49-F238E27FC236}">
+                    <a16:creationId xmlns:a16="http://schemas.microsoft.com/office/drawing/2014/main" id="{8153DA31-AE0E-3028-4D7B-02B6F52CB831}"/>
+                  </a:ext>
+                </a:extLst>
+              </p:cNvPr>
+              <p:cNvSpPr/>
+              <p:nvPr/>
+            </p:nvSpPr>
+            <p:spPr>
+              <a:xfrm>
+                <a:off x="3769046" y="1817372"/>
+                <a:ext cx="79971" cy="463404"/>
+              </a:xfrm>
+              <a:prstGeom prst="roundRect">
+                <a:avLst/>
+              </a:prstGeom>
+              <a:solidFill>
+                <a:srgbClr val="4A1D2E"/>
+              </a:solidFill>
+              <a:ln>
+                <a:noFill/>
+              </a:ln>
+            </p:spPr>
+            <p:style>
+              <a:lnRef idx="2">
+                <a:schemeClr val="accent1">
+                  <a:shade val="50000"/>
+                </a:schemeClr>
+              </a:lnRef>
+              <a:fillRef idx="1">
+                <a:schemeClr val="accent1"/>
+              </a:fillRef>
+              <a:effectRef idx="0">
+                <a:schemeClr val="accent1"/>
+              </a:effectRef>
+              <a:fontRef idx="minor">
+                <a:schemeClr val="lt1"/>
+              </a:fontRef>
+            </p:style>
+            <p:txBody>
+              <a:bodyPr rtlCol="0" anchor="ctr"/>
+              <a:lstStyle/>
+              <a:p>
+                <a:pPr algn="ctr"/>
+                <a:endParaRPr lang="en-GB"/>
+              </a:p>
+            </p:txBody>
+          </p:sp>
+        </p:grpSp>
       </p:grpSp>
     </p:spTree>
     <p:extLst>

</xml_diff>